<commit_message>
atualizacao com insercao dos slides
</commit_message>
<xml_diff>
--- a/documentacao/G5_Apresentacao2sem2014.pptx
+++ b/documentacao/G5_Apresentacao2sem2014.pptx
@@ -5,16 +5,25 @@
     <p:sldMasterId id="2147483657" r:id="rId1"/>
   </p:sldMasterIdLst>
   <p:notesMasterIdLst>
-    <p:notesMasterId r:id="rId6"/>
+    <p:notesMasterId r:id="rId15"/>
   </p:notesMasterIdLst>
   <p:handoutMasterIdLst>
-    <p:handoutMasterId r:id="rId7"/>
+    <p:handoutMasterId r:id="rId16"/>
   </p:handoutMasterIdLst>
   <p:sldIdLst>
     <p:sldId id="256" r:id="rId2"/>
     <p:sldId id="258" r:id="rId3"/>
-    <p:sldId id="259" r:id="rId4"/>
-    <p:sldId id="263" r:id="rId5"/>
+    <p:sldId id="264" r:id="rId4"/>
+    <p:sldId id="265" r:id="rId5"/>
+    <p:sldId id="266" r:id="rId6"/>
+    <p:sldId id="267" r:id="rId7"/>
+    <p:sldId id="268" r:id="rId8"/>
+    <p:sldId id="259" r:id="rId9"/>
+    <p:sldId id="269" r:id="rId10"/>
+    <p:sldId id="270" r:id="rId11"/>
+    <p:sldId id="271" r:id="rId12"/>
+    <p:sldId id="272" r:id="rId13"/>
+    <p:sldId id="263" r:id="rId14"/>
   </p:sldIdLst>
   <p:sldSz cx="9144000" cy="6858000" type="screen4x3"/>
   <p:notesSz cx="7010400" cy="9296400"/>
@@ -229,7 +238,7 @@
             <a:fld id="{387DC7E4-63C1-42C9-AC56-2D8DD4349572}" type="datetimeFigureOut">
               <a:rPr lang="pt-BR" smtClean="0"/>
               <a:pPr/>
-              <a:t>10/03/2014</a:t>
+              <a:t>27/9/2014</a:t>
             </a:fld>
             <a:endParaRPr lang="pt-BR"/>
           </a:p>
@@ -305,7 +314,7 @@
     </p:spTree>
     <p:extLst>
       <p:ext uri="{BB962C8B-B14F-4D97-AF65-F5344CB8AC3E}">
-        <p14:creationId xmlns="" xmlns:p14="http://schemas.microsoft.com/office/powerpoint/2010/main" val="3690707936"/>
+        <p14:creationId xmlns:p14="http://schemas.microsoft.com/office/powerpoint/2010/main" xmlns="" val="3690707936"/>
       </p:ext>
     </p:extLst>
   </p:cSld>
@@ -619,7 +628,7 @@
     </p:spTree>
     <p:extLst>
       <p:ext uri="{BB962C8B-B14F-4D97-AF65-F5344CB8AC3E}">
-        <p14:creationId xmlns="" xmlns:p14="http://schemas.microsoft.com/office/powerpoint/2010/main" val="753547333"/>
+        <p14:creationId xmlns:p14="http://schemas.microsoft.com/office/powerpoint/2010/main" xmlns="" val="753547333"/>
       </p:ext>
     </p:extLst>
   </p:cSld>
@@ -4893,6 +4902,18 @@
           <a:bodyPr/>
           <a:lstStyle/>
           <a:p>
+            <a:r>
+              <a:rPr lang="pt-BR" dirty="0" smtClean="0"/>
+              <a:t>GAED – Gerenciamento de </a:t>
+            </a:r>
+            <a:r>
+              <a:rPr lang="pt-BR" dirty="0" smtClean="0"/>
+              <a:t>Atividade Escolar </a:t>
+            </a:r>
+            <a:r>
+              <a:rPr lang="pt-BR" dirty="0" smtClean="0"/>
+              <a:t>Digital</a:t>
+            </a:r>
             <a:endParaRPr lang="pt-BR" dirty="0"/>
           </a:p>
         </p:txBody>
@@ -4914,7 +4935,7 @@
           <a:p>
             <a:r>
               <a:rPr lang="pt-BR" dirty="0" smtClean="0"/>
-              <a:t>Grupo x:  integrante 1</a:t>
+              <a:t>Grupo 5:  Ana Siqueira</a:t>
             </a:r>
           </a:p>
           <a:p>
@@ -4924,7 +4945,15 @@
             </a:r>
             <a:r>
               <a:rPr lang="pt-BR" dirty="0" smtClean="0"/>
-              <a:t>               integrante 2</a:t>
+              <a:t>               </a:t>
+            </a:r>
+            <a:r>
+              <a:rPr lang="pt-BR" dirty="0" err="1" smtClean="0"/>
+              <a:t>Luis</a:t>
+            </a:r>
+            <a:r>
+              <a:rPr lang="pt-BR" dirty="0" smtClean="0"/>
+              <a:t> Brandão</a:t>
             </a:r>
           </a:p>
           <a:p>
@@ -4934,7 +4963,7 @@
             </a:r>
             <a:r>
               <a:rPr lang="pt-BR" dirty="0" smtClean="0"/>
-              <a:t>               integrante 3</a:t>
+              <a:t>               Luiza Favaretto</a:t>
             </a:r>
           </a:p>
           <a:p>
@@ -4943,12 +4972,12 @@
               <a:t>                </a:t>
             </a:r>
             <a:r>
-              <a:rPr lang="pt-BR" dirty="0"/>
-              <a:t>integrante </a:t>
-            </a:r>
-            <a:r>
-              <a:rPr lang="pt-BR" dirty="0" smtClean="0"/>
-              <a:t>4                  </a:t>
+              <a:rPr lang="pt-BR" dirty="0" err="1" smtClean="0"/>
+              <a:t>Waldinei</a:t>
+            </a:r>
+            <a:r>
+              <a:rPr lang="pt-BR" dirty="0" smtClean="0"/>
+              <a:t> Pereira</a:t>
             </a:r>
           </a:p>
         </p:txBody>
@@ -4968,7 +4997,11 @@
           <a:bodyPr/>
           <a:lstStyle/>
           <a:p>
-            <a:endParaRPr lang="pt-BR"/>
+            <a:r>
+              <a:rPr lang="pt-BR" dirty="0" smtClean="0"/>
+              <a:t>26/09/204</a:t>
+            </a:r>
+            <a:endParaRPr lang="pt-BR" dirty="0"/>
           </a:p>
         </p:txBody>
       </p:sp>
@@ -5013,17 +5046,1003 @@
           <a:p>
             <a:r>
               <a:rPr lang="pt-BR" dirty="0" smtClean="0"/>
-              <a:t>IBTA </a:t>
-            </a:r>
-            <a:r>
-              <a:rPr lang="pt-BR" dirty="0" smtClean="0"/>
-              <a:t>Faculdades</a:t>
+              <a:t>IBTA Faculdades</a:t>
             </a:r>
           </a:p>
           <a:p>
             <a:r>
               <a:rPr lang="pt-BR" dirty="0" smtClean="0"/>
               <a:t>TCM/3ADS</a:t>
+            </a:r>
+            <a:endParaRPr lang="pt-BR" dirty="0"/>
+          </a:p>
+        </p:txBody>
+      </p:sp>
+    </p:spTree>
+  </p:cSld>
+  <p:clrMapOvr>
+    <a:masterClrMapping/>
+  </p:clrMapOvr>
+  <p:transition spd="med">
+    <p:fade/>
+  </p:transition>
+  <p:timing>
+    <p:tnLst>
+      <p:par>
+        <p:cTn id="1" dur="indefinite" restart="never" nodeType="tmRoot"/>
+      </p:par>
+    </p:tnLst>
+  </p:timing>
+</p:sld>
+</file>
+
+<file path=ppt/slides/slide10.xml><?xml version="1.0" encoding="utf-8"?>
+<p:sld xmlns:a="http://schemas.openxmlformats.org/drawingml/2006/main" xmlns:r="http://schemas.openxmlformats.org/officeDocument/2006/relationships" xmlns:p="http://schemas.openxmlformats.org/presentationml/2006/main">
+  <p:cSld>
+    <p:spTree>
+      <p:nvGrpSpPr>
+        <p:cNvPr id="1" name=""/>
+        <p:cNvGrpSpPr/>
+        <p:nvPr/>
+      </p:nvGrpSpPr>
+      <p:grpSpPr>
+        <a:xfrm>
+          <a:off x="0" y="0"/>
+          <a:ext cx="0" cy="0"/>
+          <a:chOff x="0" y="0"/>
+          <a:chExt cx="0" cy="0"/>
+        </a:xfrm>
+      </p:grpSpPr>
+      <p:sp>
+        <p:nvSpPr>
+          <p:cNvPr id="19458" name="Rectangle 2"/>
+          <p:cNvSpPr>
+            <a:spLocks noGrp="1" noChangeArrowheads="1"/>
+          </p:cNvSpPr>
+          <p:nvPr>
+            <p:ph type="title"/>
+          </p:nvPr>
+        </p:nvSpPr>
+        <p:spPr/>
+        <p:txBody>
+          <a:bodyPr/>
+          <a:lstStyle/>
+          <a:p>
+            <a:r>
+              <a:rPr lang="pt-BR" dirty="0" smtClean="0"/>
+              <a:t>Diagrama Caso Uso</a:t>
+            </a:r>
+            <a:endParaRPr lang="pt-BR" dirty="0"/>
+          </a:p>
+        </p:txBody>
+      </p:sp>
+      <p:sp>
+        <p:nvSpPr>
+          <p:cNvPr id="19459" name="Rectangle 3"/>
+          <p:cNvSpPr>
+            <a:spLocks noGrp="1" noChangeArrowheads="1"/>
+          </p:cNvSpPr>
+          <p:nvPr>
+            <p:ph type="body" idx="1"/>
+          </p:nvPr>
+        </p:nvSpPr>
+        <p:spPr/>
+        <p:txBody>
+          <a:bodyPr/>
+          <a:lstStyle/>
+          <a:p>
+            <a:r>
+              <a:rPr lang="en-US" dirty="0" err="1" smtClean="0"/>
+              <a:t>Secretaria</a:t>
+            </a:r>
+            <a:endParaRPr lang="pt-BR" dirty="0"/>
+          </a:p>
+        </p:txBody>
+      </p:sp>
+      <p:sp>
+        <p:nvSpPr>
+          <p:cNvPr id="6" name="Espaço Reservado para Data 5"/>
+          <p:cNvSpPr>
+            <a:spLocks noGrp="1"/>
+          </p:cNvSpPr>
+          <p:nvPr>
+            <p:ph type="dt" sz="half" idx="10"/>
+          </p:nvPr>
+        </p:nvSpPr>
+        <p:spPr/>
+        <p:txBody>
+          <a:bodyPr/>
+          <a:lstStyle/>
+          <a:p>
+            <a:r>
+              <a:rPr lang="pt-BR" dirty="0"/>
+              <a:t>26/09/204</a:t>
+            </a:r>
+          </a:p>
+        </p:txBody>
+      </p:sp>
+      <p:sp>
+        <p:nvSpPr>
+          <p:cNvPr id="7" name="Espaço Reservado para Número de Slide 6"/>
+          <p:cNvSpPr>
+            <a:spLocks noGrp="1"/>
+          </p:cNvSpPr>
+          <p:nvPr>
+            <p:ph type="sldNum" sz="quarter" idx="12"/>
+          </p:nvPr>
+        </p:nvSpPr>
+        <p:spPr/>
+        <p:txBody>
+          <a:bodyPr/>
+          <a:lstStyle/>
+          <a:p>
+            <a:fld id="{516476CB-12D4-456A-BCEE-8469A8C40045}" type="slidenum">
+              <a:rPr lang="pt-BR" smtClean="0"/>
+              <a:pPr/>
+              <a:t>10</a:t>
+            </a:fld>
+            <a:endParaRPr lang="pt-BR" dirty="0"/>
+          </a:p>
+        </p:txBody>
+      </p:sp>
+      <p:sp>
+        <p:nvSpPr>
+          <p:cNvPr id="8" name="Espaço Reservado para Rodapé 7"/>
+          <p:cNvSpPr>
+            <a:spLocks noGrp="1"/>
+          </p:cNvSpPr>
+          <p:nvPr>
+            <p:ph type="ftr" sz="quarter" idx="11"/>
+          </p:nvPr>
+        </p:nvSpPr>
+        <p:spPr/>
+        <p:txBody>
+          <a:bodyPr/>
+          <a:lstStyle/>
+          <a:p>
+            <a:r>
+              <a:rPr lang="pt-BR" dirty="0" err="1" smtClean="0"/>
+              <a:t>Veris</a:t>
+            </a:r>
+            <a:r>
+              <a:rPr lang="pt-BR" dirty="0" smtClean="0"/>
+              <a:t> Faculdades TCM/3ADS</a:t>
+            </a:r>
+            <a:endParaRPr lang="pt-BR" dirty="0"/>
+          </a:p>
+        </p:txBody>
+      </p:sp>
+      <p:pic>
+        <p:nvPicPr>
+          <p:cNvPr id="9" name="Imagem 8"/>
+          <p:cNvPicPr/>
+          <p:nvPr/>
+        </p:nvPicPr>
+        <p:blipFill>
+          <a:blip r:embed="rId2" cstate="print">
+            <a:extLst>
+              <a:ext uri="{28A0092B-C50C-407E-A947-70E740481C1C}">
+                <a14:useLocalDpi xmlns:ve="http://schemas.openxmlformats.org/markup-compatibility/2006" xmlns:m="http://schemas.openxmlformats.org/officeDocument/2006/math" xmlns:wp="http://schemas.openxmlformats.org/drawingml/2006/wordprocessingDrawing" xmlns:wne="http://schemas.microsoft.com/office/word/2006/wordml" xmlns="" xmlns:wpc="http://schemas.microsoft.com/office/word/2010/wordprocessingCanvas" xmlns:mc="http://schemas.openxmlformats.org/markup-compatibility/2006" xmlns:o="urn:schemas-microsoft-com:office:office" xmlns:v="urn:schemas-microsoft-com:vml" xmlns:wp14="http://schemas.microsoft.com/office/word/2010/wordprocessingDrawing" xmlns:w10="urn:schemas-microsoft-com:office:word" xmlns:w="http://schemas.openxmlformats.org/wordprocessingml/2006/main" xmlns:w14="http://schemas.microsoft.com/office/word/2010/wordml" xmlns:w15="http://schemas.microsoft.com/office/word/2012/wordml" xmlns:wpg="http://schemas.microsoft.com/office/word/2010/wordprocessingGroup" xmlns:wpi="http://schemas.microsoft.com/office/word/2010/wordprocessingInk" xmlns:wps="http://schemas.microsoft.com/office/word/2010/wordprocessingShape" xmlns:a14="http://schemas.microsoft.com/office/drawing/2010/main" xmlns:pic="http://schemas.openxmlformats.org/drawingml/2006/picture" xmlns:lc="http://schemas.openxmlformats.org/drawingml/2006/lockedCanvas" val="0"/>
+              </a:ext>
+            </a:extLst>
+          </a:blip>
+          <a:stretch>
+            <a:fillRect/>
+          </a:stretch>
+        </p:blipFill>
+        <p:spPr>
+          <a:xfrm>
+            <a:off x="2771800" y="548680"/>
+            <a:ext cx="6048672" cy="5832647"/>
+          </a:xfrm>
+          <a:prstGeom prst="rect">
+            <a:avLst/>
+          </a:prstGeom>
+        </p:spPr>
+      </p:pic>
+    </p:spTree>
+  </p:cSld>
+  <p:clrMapOvr>
+    <a:masterClrMapping/>
+  </p:clrMapOvr>
+  <p:transition spd="med">
+    <p:fade/>
+  </p:transition>
+  <p:timing>
+    <p:tnLst>
+      <p:par>
+        <p:cTn id="1" dur="indefinite" restart="never" nodeType="tmRoot"/>
+      </p:par>
+    </p:tnLst>
+  </p:timing>
+</p:sld>
+</file>
+
+<file path=ppt/slides/slide11.xml><?xml version="1.0" encoding="utf-8"?>
+<p:sld xmlns:a="http://schemas.openxmlformats.org/drawingml/2006/main" xmlns:r="http://schemas.openxmlformats.org/officeDocument/2006/relationships" xmlns:p="http://schemas.openxmlformats.org/presentationml/2006/main">
+  <p:cSld>
+    <p:spTree>
+      <p:nvGrpSpPr>
+        <p:cNvPr id="1" name=""/>
+        <p:cNvGrpSpPr/>
+        <p:nvPr/>
+      </p:nvGrpSpPr>
+      <p:grpSpPr>
+        <a:xfrm>
+          <a:off x="0" y="0"/>
+          <a:ext cx="0" cy="0"/>
+          <a:chOff x="0" y="0"/>
+          <a:chExt cx="0" cy="0"/>
+        </a:xfrm>
+      </p:grpSpPr>
+      <p:sp>
+        <p:nvSpPr>
+          <p:cNvPr id="19458" name="Rectangle 2"/>
+          <p:cNvSpPr>
+            <a:spLocks noGrp="1" noChangeArrowheads="1"/>
+          </p:cNvSpPr>
+          <p:nvPr>
+            <p:ph type="title"/>
+          </p:nvPr>
+        </p:nvSpPr>
+        <p:spPr/>
+        <p:txBody>
+          <a:bodyPr/>
+          <a:lstStyle/>
+          <a:p>
+            <a:r>
+              <a:rPr lang="pt-BR" dirty="0" smtClean="0"/>
+              <a:t>Diagrama Caso Uso</a:t>
+            </a:r>
+            <a:endParaRPr lang="pt-BR" dirty="0"/>
+          </a:p>
+        </p:txBody>
+      </p:sp>
+      <p:sp>
+        <p:nvSpPr>
+          <p:cNvPr id="19459" name="Rectangle 3"/>
+          <p:cNvSpPr>
+            <a:spLocks noGrp="1" noChangeArrowheads="1"/>
+          </p:cNvSpPr>
+          <p:nvPr>
+            <p:ph type="body" idx="1"/>
+          </p:nvPr>
+        </p:nvSpPr>
+        <p:spPr/>
+        <p:txBody>
+          <a:bodyPr/>
+          <a:lstStyle/>
+          <a:p>
+            <a:r>
+              <a:rPr lang="en-US" dirty="0" smtClean="0"/>
+              <a:t>Professor</a:t>
+            </a:r>
+            <a:endParaRPr lang="pt-BR" dirty="0"/>
+          </a:p>
+        </p:txBody>
+      </p:sp>
+      <p:sp>
+        <p:nvSpPr>
+          <p:cNvPr id="6" name="Espaço Reservado para Data 5"/>
+          <p:cNvSpPr>
+            <a:spLocks noGrp="1"/>
+          </p:cNvSpPr>
+          <p:nvPr>
+            <p:ph type="dt" sz="half" idx="10"/>
+          </p:nvPr>
+        </p:nvSpPr>
+        <p:spPr/>
+        <p:txBody>
+          <a:bodyPr/>
+          <a:lstStyle/>
+          <a:p>
+            <a:r>
+              <a:rPr lang="pt-BR" dirty="0"/>
+              <a:t>26/09/204</a:t>
+            </a:r>
+          </a:p>
+        </p:txBody>
+      </p:sp>
+      <p:sp>
+        <p:nvSpPr>
+          <p:cNvPr id="7" name="Espaço Reservado para Número de Slide 6"/>
+          <p:cNvSpPr>
+            <a:spLocks noGrp="1"/>
+          </p:cNvSpPr>
+          <p:nvPr>
+            <p:ph type="sldNum" sz="quarter" idx="12"/>
+          </p:nvPr>
+        </p:nvSpPr>
+        <p:spPr/>
+        <p:txBody>
+          <a:bodyPr/>
+          <a:lstStyle/>
+          <a:p>
+            <a:fld id="{516476CB-12D4-456A-BCEE-8469A8C40045}" type="slidenum">
+              <a:rPr lang="pt-BR" smtClean="0"/>
+              <a:pPr/>
+              <a:t>11</a:t>
+            </a:fld>
+            <a:endParaRPr lang="pt-BR" dirty="0"/>
+          </a:p>
+        </p:txBody>
+      </p:sp>
+      <p:sp>
+        <p:nvSpPr>
+          <p:cNvPr id="8" name="Espaço Reservado para Rodapé 7"/>
+          <p:cNvSpPr>
+            <a:spLocks noGrp="1"/>
+          </p:cNvSpPr>
+          <p:nvPr>
+            <p:ph type="ftr" sz="quarter" idx="11"/>
+          </p:nvPr>
+        </p:nvSpPr>
+        <p:spPr/>
+        <p:txBody>
+          <a:bodyPr/>
+          <a:lstStyle/>
+          <a:p>
+            <a:r>
+              <a:rPr lang="pt-BR" dirty="0" err="1" smtClean="0"/>
+              <a:t>Veris</a:t>
+            </a:r>
+            <a:r>
+              <a:rPr lang="pt-BR" dirty="0" smtClean="0"/>
+              <a:t> Faculdades TCM/3ADS</a:t>
+            </a:r>
+            <a:endParaRPr lang="pt-BR" dirty="0"/>
+          </a:p>
+        </p:txBody>
+      </p:sp>
+      <p:pic>
+        <p:nvPicPr>
+          <p:cNvPr id="9" name="Imagem 8"/>
+          <p:cNvPicPr/>
+          <p:nvPr/>
+        </p:nvPicPr>
+        <p:blipFill>
+          <a:blip r:embed="rId2" cstate="print">
+            <a:extLst>
+              <a:ext uri="{28A0092B-C50C-407E-A947-70E740481C1C}">
+                <a14:useLocalDpi xmlns:ve="http://schemas.openxmlformats.org/markup-compatibility/2006" xmlns:m="http://schemas.openxmlformats.org/officeDocument/2006/math" xmlns:wp="http://schemas.openxmlformats.org/drawingml/2006/wordprocessingDrawing" xmlns:wne="http://schemas.microsoft.com/office/word/2006/wordml" xmlns="" xmlns:wpc="http://schemas.microsoft.com/office/word/2010/wordprocessingCanvas" xmlns:mc="http://schemas.openxmlformats.org/markup-compatibility/2006" xmlns:o="urn:schemas-microsoft-com:office:office" xmlns:v="urn:schemas-microsoft-com:vml" xmlns:wp14="http://schemas.microsoft.com/office/word/2010/wordprocessingDrawing" xmlns:w10="urn:schemas-microsoft-com:office:word" xmlns:w="http://schemas.openxmlformats.org/wordprocessingml/2006/main" xmlns:w14="http://schemas.microsoft.com/office/word/2010/wordml" xmlns:w15="http://schemas.microsoft.com/office/word/2012/wordml" xmlns:wpg="http://schemas.microsoft.com/office/word/2010/wordprocessingGroup" xmlns:wpi="http://schemas.microsoft.com/office/word/2010/wordprocessingInk" xmlns:wps="http://schemas.microsoft.com/office/word/2010/wordprocessingShape" xmlns:a14="http://schemas.microsoft.com/office/drawing/2010/main" xmlns:pic="http://schemas.openxmlformats.org/drawingml/2006/picture" xmlns:lc="http://schemas.openxmlformats.org/drawingml/2006/lockedCanvas" val="0"/>
+              </a:ext>
+            </a:extLst>
+          </a:blip>
+          <a:stretch>
+            <a:fillRect/>
+          </a:stretch>
+        </p:blipFill>
+        <p:spPr>
+          <a:xfrm>
+            <a:off x="2771800" y="476672"/>
+            <a:ext cx="5976664" cy="6120680"/>
+          </a:xfrm>
+          <a:prstGeom prst="rect">
+            <a:avLst/>
+          </a:prstGeom>
+        </p:spPr>
+      </p:pic>
+    </p:spTree>
+  </p:cSld>
+  <p:clrMapOvr>
+    <a:masterClrMapping/>
+  </p:clrMapOvr>
+  <p:transition spd="med">
+    <p:fade/>
+  </p:transition>
+  <p:timing>
+    <p:tnLst>
+      <p:par>
+        <p:cTn id="1" dur="indefinite" restart="never" nodeType="tmRoot"/>
+      </p:par>
+    </p:tnLst>
+  </p:timing>
+</p:sld>
+</file>
+
+<file path=ppt/slides/slide12.xml><?xml version="1.0" encoding="utf-8"?>
+<p:sld xmlns:a="http://schemas.openxmlformats.org/drawingml/2006/main" xmlns:r="http://schemas.openxmlformats.org/officeDocument/2006/relationships" xmlns:p="http://schemas.openxmlformats.org/presentationml/2006/main">
+  <p:cSld>
+    <p:spTree>
+      <p:nvGrpSpPr>
+        <p:cNvPr id="1" name=""/>
+        <p:cNvGrpSpPr/>
+        <p:nvPr/>
+      </p:nvGrpSpPr>
+      <p:grpSpPr>
+        <a:xfrm>
+          <a:off x="0" y="0"/>
+          <a:ext cx="0" cy="0"/>
+          <a:chOff x="0" y="0"/>
+          <a:chExt cx="0" cy="0"/>
+        </a:xfrm>
+      </p:grpSpPr>
+      <p:sp>
+        <p:nvSpPr>
+          <p:cNvPr id="19458" name="Rectangle 2"/>
+          <p:cNvSpPr>
+            <a:spLocks noGrp="1" noChangeArrowheads="1"/>
+          </p:cNvSpPr>
+          <p:nvPr>
+            <p:ph type="title"/>
+          </p:nvPr>
+        </p:nvSpPr>
+        <p:spPr/>
+        <p:txBody>
+          <a:bodyPr/>
+          <a:lstStyle/>
+          <a:p>
+            <a:r>
+              <a:rPr lang="pt-BR" dirty="0" smtClean="0"/>
+              <a:t>Diagrama Caso Uso</a:t>
+            </a:r>
+            <a:endParaRPr lang="pt-BR" dirty="0"/>
+          </a:p>
+        </p:txBody>
+      </p:sp>
+      <p:sp>
+        <p:nvSpPr>
+          <p:cNvPr id="19459" name="Rectangle 3"/>
+          <p:cNvSpPr>
+            <a:spLocks noGrp="1" noChangeArrowheads="1"/>
+          </p:cNvSpPr>
+          <p:nvPr>
+            <p:ph type="body" idx="1"/>
+          </p:nvPr>
+        </p:nvSpPr>
+        <p:spPr/>
+        <p:txBody>
+          <a:bodyPr/>
+          <a:lstStyle/>
+          <a:p>
+            <a:r>
+              <a:rPr lang="en-US" dirty="0" err="1" smtClean="0"/>
+              <a:t>Pai</a:t>
+            </a:r>
+            <a:r>
+              <a:rPr lang="en-US" dirty="0" smtClean="0"/>
+              <a:t> e/</a:t>
+            </a:r>
+            <a:r>
+              <a:rPr lang="en-US" dirty="0" err="1" smtClean="0"/>
+              <a:t>ou</a:t>
+            </a:r>
+            <a:r>
+              <a:rPr lang="en-US" dirty="0" smtClean="0"/>
+              <a:t> </a:t>
+            </a:r>
+            <a:r>
+              <a:rPr lang="en-US" dirty="0" err="1" smtClean="0"/>
+              <a:t>responsável</a:t>
+            </a:r>
+            <a:endParaRPr lang="pt-BR" dirty="0"/>
+          </a:p>
+        </p:txBody>
+      </p:sp>
+      <p:sp>
+        <p:nvSpPr>
+          <p:cNvPr id="6" name="Espaço Reservado para Data 5"/>
+          <p:cNvSpPr>
+            <a:spLocks noGrp="1"/>
+          </p:cNvSpPr>
+          <p:nvPr>
+            <p:ph type="dt" sz="half" idx="10"/>
+          </p:nvPr>
+        </p:nvSpPr>
+        <p:spPr/>
+        <p:txBody>
+          <a:bodyPr/>
+          <a:lstStyle/>
+          <a:p>
+            <a:r>
+              <a:rPr lang="pt-BR" dirty="0"/>
+              <a:t>26/09/204</a:t>
+            </a:r>
+          </a:p>
+        </p:txBody>
+      </p:sp>
+      <p:sp>
+        <p:nvSpPr>
+          <p:cNvPr id="7" name="Espaço Reservado para Número de Slide 6"/>
+          <p:cNvSpPr>
+            <a:spLocks noGrp="1"/>
+          </p:cNvSpPr>
+          <p:nvPr>
+            <p:ph type="sldNum" sz="quarter" idx="12"/>
+          </p:nvPr>
+        </p:nvSpPr>
+        <p:spPr/>
+        <p:txBody>
+          <a:bodyPr/>
+          <a:lstStyle/>
+          <a:p>
+            <a:fld id="{516476CB-12D4-456A-BCEE-8469A8C40045}" type="slidenum">
+              <a:rPr lang="pt-BR" smtClean="0"/>
+              <a:pPr/>
+              <a:t>12</a:t>
+            </a:fld>
+            <a:endParaRPr lang="pt-BR" dirty="0"/>
+          </a:p>
+        </p:txBody>
+      </p:sp>
+      <p:sp>
+        <p:nvSpPr>
+          <p:cNvPr id="8" name="Espaço Reservado para Rodapé 7"/>
+          <p:cNvSpPr>
+            <a:spLocks noGrp="1"/>
+          </p:cNvSpPr>
+          <p:nvPr>
+            <p:ph type="ftr" sz="quarter" idx="11"/>
+          </p:nvPr>
+        </p:nvSpPr>
+        <p:spPr/>
+        <p:txBody>
+          <a:bodyPr/>
+          <a:lstStyle/>
+          <a:p>
+            <a:r>
+              <a:rPr lang="pt-BR" dirty="0" err="1" smtClean="0"/>
+              <a:t>Veris</a:t>
+            </a:r>
+            <a:r>
+              <a:rPr lang="pt-BR" dirty="0" smtClean="0"/>
+              <a:t> Faculdades TCM/3ADS</a:t>
+            </a:r>
+            <a:endParaRPr lang="pt-BR" dirty="0"/>
+          </a:p>
+        </p:txBody>
+      </p:sp>
+      <p:pic>
+        <p:nvPicPr>
+          <p:cNvPr id="9" name="Imagem 8"/>
+          <p:cNvPicPr/>
+          <p:nvPr/>
+        </p:nvPicPr>
+        <p:blipFill>
+          <a:blip r:embed="rId2" cstate="print">
+            <a:extLst>
+              <a:ext uri="{28A0092B-C50C-407E-A947-70E740481C1C}">
+                <a14:useLocalDpi xmlns:ve="http://schemas.openxmlformats.org/markup-compatibility/2006" xmlns:m="http://schemas.openxmlformats.org/officeDocument/2006/math" xmlns:wp="http://schemas.openxmlformats.org/drawingml/2006/wordprocessingDrawing" xmlns:wne="http://schemas.microsoft.com/office/word/2006/wordml" xmlns="" xmlns:wpc="http://schemas.microsoft.com/office/word/2010/wordprocessingCanvas" xmlns:mc="http://schemas.openxmlformats.org/markup-compatibility/2006" xmlns:o="urn:schemas-microsoft-com:office:office" xmlns:v="urn:schemas-microsoft-com:vml" xmlns:wp14="http://schemas.microsoft.com/office/word/2010/wordprocessingDrawing" xmlns:w10="urn:schemas-microsoft-com:office:word" xmlns:w="http://schemas.openxmlformats.org/wordprocessingml/2006/main" xmlns:w14="http://schemas.microsoft.com/office/word/2010/wordml" xmlns:w15="http://schemas.microsoft.com/office/word/2012/wordml" xmlns:wpg="http://schemas.microsoft.com/office/word/2010/wordprocessingGroup" xmlns:wpi="http://schemas.microsoft.com/office/word/2010/wordprocessingInk" xmlns:wps="http://schemas.microsoft.com/office/word/2010/wordprocessingShape" xmlns:a14="http://schemas.microsoft.com/office/drawing/2010/main" xmlns:pic="http://schemas.openxmlformats.org/drawingml/2006/picture" xmlns:lc="http://schemas.openxmlformats.org/drawingml/2006/lockedCanvas" val="0"/>
+              </a:ext>
+            </a:extLst>
+          </a:blip>
+          <a:stretch>
+            <a:fillRect/>
+          </a:stretch>
+        </p:blipFill>
+        <p:spPr>
+          <a:xfrm>
+            <a:off x="1547664" y="2132856"/>
+            <a:ext cx="5940425" cy="4320480"/>
+          </a:xfrm>
+          <a:prstGeom prst="rect">
+            <a:avLst/>
+          </a:prstGeom>
+        </p:spPr>
+      </p:pic>
+    </p:spTree>
+  </p:cSld>
+  <p:clrMapOvr>
+    <a:masterClrMapping/>
+  </p:clrMapOvr>
+  <p:transition spd="med">
+    <p:fade/>
+  </p:transition>
+  <p:timing>
+    <p:tnLst>
+      <p:par>
+        <p:cTn id="1" dur="indefinite" restart="never" nodeType="tmRoot"/>
+      </p:par>
+    </p:tnLst>
+  </p:timing>
+</p:sld>
+</file>
+
+<file path=ppt/slides/slide13.xml><?xml version="1.0" encoding="utf-8"?>
+<p:sld xmlns:a="http://schemas.openxmlformats.org/drawingml/2006/main" xmlns:r="http://schemas.openxmlformats.org/officeDocument/2006/relationships" xmlns:p="http://schemas.openxmlformats.org/presentationml/2006/main">
+  <p:cSld>
+    <p:spTree>
+      <p:nvGrpSpPr>
+        <p:cNvPr id="1" name=""/>
+        <p:cNvGrpSpPr/>
+        <p:nvPr/>
+      </p:nvGrpSpPr>
+      <p:grpSpPr>
+        <a:xfrm>
+          <a:off x="0" y="0"/>
+          <a:ext cx="0" cy="0"/>
+          <a:chOff x="0" y="0"/>
+          <a:chExt cx="0" cy="0"/>
+        </a:xfrm>
+      </p:grpSpPr>
+      <p:sp>
+        <p:nvSpPr>
+          <p:cNvPr id="19458" name="Rectangle 2"/>
+          <p:cNvSpPr>
+            <a:spLocks noGrp="1" noChangeArrowheads="1"/>
+          </p:cNvSpPr>
+          <p:nvPr>
+            <p:ph type="title"/>
+          </p:nvPr>
+        </p:nvSpPr>
+        <p:spPr/>
+        <p:txBody>
+          <a:bodyPr/>
+          <a:lstStyle/>
+          <a:p>
+            <a:r>
+              <a:rPr lang="pt-BR" dirty="0" smtClean="0"/>
+              <a:t>Conclusão</a:t>
+            </a:r>
+            <a:endParaRPr lang="pt-BR" dirty="0"/>
+          </a:p>
+        </p:txBody>
+      </p:sp>
+      <p:sp>
+        <p:nvSpPr>
+          <p:cNvPr id="19459" name="Rectangle 3"/>
+          <p:cNvSpPr>
+            <a:spLocks noGrp="1" noChangeArrowheads="1"/>
+          </p:cNvSpPr>
+          <p:nvPr>
+            <p:ph type="body" idx="1"/>
+          </p:nvPr>
+        </p:nvSpPr>
+        <p:spPr/>
+        <p:txBody>
+          <a:bodyPr/>
+          <a:lstStyle/>
+          <a:p>
+            <a:r>
+              <a:rPr lang="pt-BR" dirty="0" smtClean="0"/>
+              <a:t>Os resultados esperados é a facilidade de comunicação entre a escola (</a:t>
+            </a:r>
+            <a:r>
+              <a:rPr lang="pt-BR" dirty="0" smtClean="0"/>
+              <a:t>gestores, professores) e os pais e/ou responsáveis</a:t>
+            </a:r>
+          </a:p>
+          <a:p>
+            <a:r>
+              <a:rPr lang="en-US" dirty="0" err="1" smtClean="0"/>
+              <a:t>Uma</a:t>
+            </a:r>
+            <a:r>
+              <a:rPr lang="en-US" dirty="0" smtClean="0"/>
+              <a:t> </a:t>
+            </a:r>
+            <a:r>
+              <a:rPr lang="en-US" dirty="0" err="1" smtClean="0"/>
+              <a:t>interação</a:t>
+            </a:r>
+            <a:r>
+              <a:rPr lang="en-US" dirty="0" smtClean="0"/>
+              <a:t> e </a:t>
+            </a:r>
+            <a:r>
+              <a:rPr lang="en-US" dirty="0" err="1" smtClean="0"/>
+              <a:t>organização</a:t>
+            </a:r>
+            <a:r>
+              <a:rPr lang="en-US" dirty="0" smtClean="0"/>
+              <a:t> dos </a:t>
+            </a:r>
+            <a:r>
+              <a:rPr lang="en-US" dirty="0" err="1" smtClean="0"/>
+              <a:t>alunos</a:t>
+            </a:r>
+            <a:r>
+              <a:rPr lang="en-US" dirty="0" smtClean="0"/>
+              <a:t> com as </a:t>
+            </a:r>
+            <a:r>
+              <a:rPr lang="en-US" dirty="0" err="1" smtClean="0"/>
+              <a:t>tarefas</a:t>
+            </a:r>
+            <a:r>
+              <a:rPr lang="en-US" dirty="0" smtClean="0"/>
+              <a:t> e </a:t>
+            </a:r>
+            <a:r>
+              <a:rPr lang="en-US" dirty="0" err="1" smtClean="0"/>
+              <a:t>trabalhos</a:t>
+            </a:r>
+            <a:r>
+              <a:rPr lang="en-US" dirty="0" smtClean="0"/>
+              <a:t> a </a:t>
+            </a:r>
+            <a:r>
+              <a:rPr lang="en-US" dirty="0" err="1" smtClean="0"/>
+              <a:t>serem</a:t>
+            </a:r>
+            <a:r>
+              <a:rPr lang="en-US" dirty="0" smtClean="0"/>
+              <a:t> </a:t>
+            </a:r>
+            <a:r>
+              <a:rPr lang="en-US" dirty="0" err="1" smtClean="0"/>
+              <a:t>integues</a:t>
+            </a:r>
+            <a:r>
+              <a:rPr lang="en-US" dirty="0" smtClean="0"/>
+              <a:t>.</a:t>
+            </a:r>
+          </a:p>
+          <a:p>
+            <a:r>
+              <a:rPr lang="en-US" dirty="0" err="1" smtClean="0"/>
+              <a:t>Pois</a:t>
+            </a:r>
+            <a:r>
+              <a:rPr lang="en-US" dirty="0" smtClean="0"/>
+              <a:t> </a:t>
+            </a:r>
+            <a:r>
+              <a:rPr lang="en-US" dirty="0" err="1" smtClean="0"/>
+              <a:t>sabemos</a:t>
+            </a:r>
+            <a:r>
+              <a:rPr lang="en-US" dirty="0" smtClean="0"/>
+              <a:t> </a:t>
+            </a:r>
+            <a:r>
+              <a:rPr lang="en-US" dirty="0" err="1" smtClean="0"/>
+              <a:t>que</a:t>
+            </a:r>
+            <a:r>
+              <a:rPr lang="en-US" dirty="0" smtClean="0"/>
+              <a:t> </a:t>
+            </a:r>
+            <a:r>
+              <a:rPr lang="en-US" dirty="0" err="1" smtClean="0"/>
+              <a:t>grande</a:t>
+            </a:r>
+            <a:r>
+              <a:rPr lang="en-US" dirty="0" smtClean="0"/>
+              <a:t> parte </a:t>
+            </a:r>
+            <a:r>
+              <a:rPr lang="en-US" dirty="0" err="1" smtClean="0"/>
+              <a:t>da</a:t>
+            </a:r>
+            <a:r>
+              <a:rPr lang="en-US" dirty="0" smtClean="0"/>
+              <a:t> </a:t>
+            </a:r>
+            <a:r>
+              <a:rPr lang="en-US" dirty="0" err="1" smtClean="0"/>
+              <a:t>população</a:t>
+            </a:r>
+            <a:r>
+              <a:rPr lang="en-US" dirty="0" smtClean="0"/>
+              <a:t> </a:t>
+            </a:r>
+            <a:r>
+              <a:rPr lang="en-US" dirty="0" err="1" smtClean="0"/>
+              <a:t>utiliza</a:t>
+            </a:r>
+            <a:r>
+              <a:rPr lang="en-US" dirty="0" smtClean="0"/>
+              <a:t> </a:t>
+            </a:r>
+            <a:r>
+              <a:rPr lang="en-US" dirty="0" err="1" smtClean="0"/>
+              <a:t>aplicativos</a:t>
+            </a:r>
+            <a:r>
+              <a:rPr lang="en-US" dirty="0" smtClean="0"/>
+              <a:t> </a:t>
+            </a:r>
+            <a:r>
+              <a:rPr lang="en-US" dirty="0" err="1" smtClean="0"/>
+              <a:t>móveis</a:t>
+            </a:r>
+            <a:r>
+              <a:rPr lang="en-US" dirty="0" smtClean="0"/>
+              <a:t> </a:t>
+            </a:r>
+            <a:r>
+              <a:rPr lang="en-US" dirty="0" err="1" smtClean="0"/>
+              <a:t>várias</a:t>
+            </a:r>
+            <a:r>
+              <a:rPr lang="en-US" dirty="0" smtClean="0"/>
+              <a:t> </a:t>
+            </a:r>
+            <a:r>
+              <a:rPr lang="en-US" dirty="0" err="1" smtClean="0"/>
+              <a:t>vezes</a:t>
+            </a:r>
+            <a:r>
+              <a:rPr lang="en-US" dirty="0" smtClean="0"/>
+              <a:t> </a:t>
+            </a:r>
+            <a:r>
+              <a:rPr lang="en-US" dirty="0" err="1" smtClean="0"/>
+              <a:t>por</a:t>
+            </a:r>
+            <a:r>
+              <a:rPr lang="en-US" dirty="0" smtClean="0"/>
+              <a:t> dia.</a:t>
+            </a:r>
+          </a:p>
+          <a:p>
+            <a:r>
+              <a:rPr lang="en-US" dirty="0" err="1" smtClean="0"/>
+              <a:t>Outro</a:t>
+            </a:r>
+            <a:r>
+              <a:rPr lang="en-US" dirty="0" smtClean="0"/>
+              <a:t> </a:t>
+            </a:r>
+            <a:r>
+              <a:rPr lang="en-US" dirty="0" err="1" smtClean="0"/>
+              <a:t>benefício</a:t>
+            </a:r>
+            <a:r>
+              <a:rPr lang="en-US" dirty="0" smtClean="0"/>
+              <a:t> é o </a:t>
+            </a:r>
+            <a:r>
+              <a:rPr lang="en-US" dirty="0" err="1" smtClean="0"/>
+              <a:t>registro</a:t>
+            </a:r>
+            <a:r>
+              <a:rPr lang="en-US" dirty="0" smtClean="0"/>
+              <a:t> de </a:t>
+            </a:r>
+            <a:r>
+              <a:rPr lang="en-US" dirty="0" err="1" smtClean="0"/>
+              <a:t>inserções</a:t>
+            </a:r>
+            <a:r>
+              <a:rPr lang="en-US" dirty="0" smtClean="0"/>
+              <a:t> e </a:t>
+            </a:r>
+            <a:r>
+              <a:rPr lang="en-US" dirty="0" err="1" smtClean="0"/>
+              <a:t>acessos</a:t>
+            </a:r>
+            <a:r>
+              <a:rPr lang="en-US" dirty="0" smtClean="0"/>
+              <a:t> </a:t>
+            </a:r>
+            <a:r>
+              <a:rPr lang="en-US" dirty="0" err="1" smtClean="0"/>
+              <a:t>aos</a:t>
+            </a:r>
+            <a:r>
+              <a:rPr lang="en-US" dirty="0" smtClean="0"/>
+              <a:t> </a:t>
+            </a:r>
+            <a:r>
+              <a:rPr lang="en-US" dirty="0" err="1" smtClean="0"/>
+              <a:t>sistema</a:t>
+            </a:r>
+            <a:r>
+              <a:rPr lang="en-US" dirty="0" smtClean="0"/>
+              <a:t> </a:t>
+            </a:r>
+            <a:r>
+              <a:rPr lang="en-US" dirty="0" err="1" smtClean="0"/>
+              <a:t>que</a:t>
+            </a:r>
+            <a:r>
+              <a:rPr lang="en-US" dirty="0" smtClean="0"/>
+              <a:t> </a:t>
+            </a:r>
+            <a:r>
+              <a:rPr lang="en-US" dirty="0" err="1" smtClean="0"/>
+              <a:t>permite</a:t>
+            </a:r>
+            <a:r>
+              <a:rPr lang="en-US" dirty="0" smtClean="0"/>
+              <a:t> um </a:t>
+            </a:r>
+            <a:r>
+              <a:rPr lang="en-US" dirty="0" err="1" smtClean="0"/>
+              <a:t>indicador</a:t>
+            </a:r>
+            <a:r>
+              <a:rPr lang="en-US" dirty="0" smtClean="0"/>
+              <a:t> </a:t>
+            </a:r>
+            <a:r>
+              <a:rPr lang="en-US" dirty="0" err="1" smtClean="0"/>
+              <a:t>que</a:t>
+            </a:r>
+            <a:r>
+              <a:rPr lang="en-US" dirty="0" smtClean="0"/>
+              <a:t> a </a:t>
+            </a:r>
+            <a:r>
+              <a:rPr lang="en-US" dirty="0" err="1" smtClean="0"/>
+              <a:t>comunicação</a:t>
+            </a:r>
+            <a:r>
+              <a:rPr lang="en-US" dirty="0" smtClean="0"/>
+              <a:t> </a:t>
+            </a:r>
+            <a:r>
+              <a:rPr lang="en-US" dirty="0" err="1" smtClean="0"/>
+              <a:t>ocorreu</a:t>
+            </a:r>
+            <a:r>
+              <a:rPr lang="en-US" smtClean="0"/>
+              <a:t>.</a:t>
+            </a:r>
+            <a:endParaRPr lang="pt-BR" dirty="0"/>
+          </a:p>
+        </p:txBody>
+      </p:sp>
+      <p:sp>
+        <p:nvSpPr>
+          <p:cNvPr id="6" name="Espaço Reservado para Data 5"/>
+          <p:cNvSpPr>
+            <a:spLocks noGrp="1"/>
+          </p:cNvSpPr>
+          <p:nvPr>
+            <p:ph type="dt" sz="half" idx="10"/>
+          </p:nvPr>
+        </p:nvSpPr>
+        <p:spPr/>
+        <p:txBody>
+          <a:bodyPr/>
+          <a:lstStyle/>
+          <a:p>
+            <a:r>
+              <a:rPr lang="pt-BR" dirty="0"/>
+              <a:t>26/09/204</a:t>
+            </a:r>
+          </a:p>
+        </p:txBody>
+      </p:sp>
+      <p:sp>
+        <p:nvSpPr>
+          <p:cNvPr id="7" name="Espaço Reservado para Número de Slide 6"/>
+          <p:cNvSpPr>
+            <a:spLocks noGrp="1"/>
+          </p:cNvSpPr>
+          <p:nvPr>
+            <p:ph type="sldNum" sz="quarter" idx="12"/>
+          </p:nvPr>
+        </p:nvSpPr>
+        <p:spPr/>
+        <p:txBody>
+          <a:bodyPr/>
+          <a:lstStyle/>
+          <a:p>
+            <a:fld id="{516476CB-12D4-456A-BCEE-8469A8C40045}" type="slidenum">
+              <a:rPr lang="pt-BR" smtClean="0"/>
+              <a:pPr/>
+              <a:t>13</a:t>
+            </a:fld>
+            <a:endParaRPr lang="pt-BR" dirty="0"/>
+          </a:p>
+        </p:txBody>
+      </p:sp>
+      <p:sp>
+        <p:nvSpPr>
+          <p:cNvPr id="8" name="Espaço Reservado para Rodapé 7"/>
+          <p:cNvSpPr>
+            <a:spLocks noGrp="1"/>
+          </p:cNvSpPr>
+          <p:nvPr>
+            <p:ph type="ftr" sz="quarter" idx="11"/>
+          </p:nvPr>
+        </p:nvSpPr>
+        <p:spPr/>
+        <p:txBody>
+          <a:bodyPr/>
+          <a:lstStyle/>
+          <a:p>
+            <a:r>
+              <a:rPr lang="pt-BR" dirty="0" err="1" smtClean="0"/>
+              <a:t>Veris</a:t>
+            </a:r>
+            <a:r>
+              <a:rPr lang="pt-BR" dirty="0" smtClean="0"/>
+              <a:t> Faculdades TCM/3ADS</a:t>
             </a:r>
             <a:endParaRPr lang="pt-BR" dirty="0"/>
           </a:p>
@@ -5102,17 +6121,50 @@
           <a:bodyPr/>
           <a:lstStyle/>
           <a:p>
-            <a:r>
-              <a:rPr lang="pt-BR" dirty="0" smtClean="0"/>
-              <a:t>Duas frases descrevendo o que o sistema faz.</a:t>
-            </a:r>
-          </a:p>
-          <a:p>
-            <a:r>
-              <a:rPr lang="pt-BR" dirty="0" smtClean="0"/>
-              <a:t>Identifique usuários para seu sistema</a:t>
-            </a:r>
-            <a:endParaRPr lang="pt-BR" dirty="0"/>
+            <a:endParaRPr lang="pt-BR" dirty="0" smtClean="0"/>
+          </a:p>
+          <a:p>
+            <a:r>
+              <a:rPr lang="pt-BR" dirty="0" smtClean="0"/>
+              <a:t>GAED - Gerenciamento de Atividades Escolar Digital para aperfeiçoar o </a:t>
+            </a:r>
+            <a:r>
+              <a:rPr lang="pt-BR" dirty="0" smtClean="0"/>
+              <a:t>processo de </a:t>
+            </a:r>
+            <a:r>
+              <a:rPr lang="pt-BR" dirty="0" smtClean="0"/>
+              <a:t>gestão, com registro de professores, alunos e turmas.</a:t>
+            </a:r>
+          </a:p>
+          <a:p>
+            <a:pPr>
+              <a:buNone/>
+            </a:pPr>
+            <a:endParaRPr lang="pt-BR" dirty="0" smtClean="0"/>
+          </a:p>
+          <a:p>
+            <a:r>
+              <a:rPr lang="pt-BR" dirty="0" smtClean="0"/>
+              <a:t>Maior comprometimento com o </a:t>
+            </a:r>
+            <a:r>
+              <a:rPr lang="pt-BR" dirty="0" smtClean="0"/>
+              <a:t>processo </a:t>
+            </a:r>
+            <a:r>
+              <a:rPr lang="pt-BR" dirty="0" smtClean="0"/>
+              <a:t>escolar dos alunos, pela </a:t>
+            </a:r>
+            <a:r>
+              <a:rPr lang="pt-BR" dirty="0" smtClean="0"/>
+              <a:t>transparência </a:t>
+            </a:r>
+            <a:r>
+              <a:rPr lang="pt-BR" dirty="0" smtClean="0"/>
+              <a:t>e agilidade na comunicação de notas, faltas, ocorrências e tarefas escolares, entre alunos, professores, pais/responsáveis.</a:t>
+            </a:r>
+            <a:endParaRPr lang="pt-BR" dirty="0" smtClean="0"/>
           </a:p>
         </p:txBody>
       </p:sp>
@@ -5131,7 +6183,10 @@
           <a:bodyPr/>
           <a:lstStyle/>
           <a:p>
-            <a:endParaRPr lang="pt-BR"/>
+            <a:r>
+              <a:rPr lang="pt-BR" dirty="0"/>
+              <a:t>26/09/204</a:t>
+            </a:r>
           </a:p>
         </p:txBody>
       </p:sp>
@@ -5180,11 +6235,7 @@
             </a:r>
             <a:r>
               <a:rPr lang="pt-BR" dirty="0" smtClean="0"/>
-              <a:t> </a:t>
-            </a:r>
-            <a:r>
-              <a:rPr lang="pt-BR" dirty="0" smtClean="0"/>
-              <a:t>TCM/3ADS</a:t>
+              <a:t> TCM/3ADS</a:t>
             </a:r>
             <a:endParaRPr lang="pt-BR" dirty="0"/>
           </a:p>
@@ -5227,7 +6278,7 @@
       </p:grpSpPr>
       <p:sp>
         <p:nvSpPr>
-          <p:cNvPr id="19458" name="Rectangle 2"/>
+          <p:cNvPr id="18434" name="Rectangle 2"/>
           <p:cNvSpPr>
             <a:spLocks noGrp="1" noChangeArrowheads="1"/>
           </p:cNvSpPr>
@@ -5242,7 +6293,7 @@
           <a:p>
             <a:r>
               <a:rPr lang="pt-BR" dirty="0" smtClean="0"/>
-              <a:t>Diagrama Caso Uso</a:t>
+              <a:t>Usuários </a:t>
             </a:r>
             <a:endParaRPr lang="pt-BR" dirty="0"/>
           </a:p>
@@ -5250,7 +6301,7 @@
       </p:sp>
       <p:sp>
         <p:nvSpPr>
-          <p:cNvPr id="19459" name="Rectangle 3"/>
+          <p:cNvPr id="18435" name="Rectangle 3"/>
           <p:cNvSpPr>
             <a:spLocks noGrp="1" noChangeArrowheads="1"/>
           </p:cNvSpPr>
@@ -5258,32 +6309,74 @@
             <p:ph type="body" idx="1"/>
           </p:nvPr>
         </p:nvSpPr>
-        <p:spPr/>
+        <p:spPr>
+          <a:xfrm>
+            <a:off x="539552" y="1556792"/>
+            <a:ext cx="8229600" cy="4530725"/>
+          </a:xfrm>
+        </p:spPr>
         <p:txBody>
           <a:bodyPr/>
           <a:lstStyle/>
           <a:p>
             <a:r>
               <a:rPr lang="pt-BR" dirty="0" smtClean="0"/>
-              <a:t>Apresente o diagrama de caso de uso de seu sistema</a:t>
-            </a:r>
-          </a:p>
-          <a:p>
-            <a:r>
-              <a:rPr lang="pt-BR" dirty="0" smtClean="0"/>
-              <a:t>Na apresentação ressalte as principais funcionalidades.</a:t>
-            </a:r>
-          </a:p>
-          <a:p>
-            <a:r>
-              <a:rPr lang="pt-BR" dirty="0" smtClean="0"/>
-              <a:t>Ressalte os que serão implementados</a:t>
-            </a:r>
-          </a:p>
-          <a:p>
-            <a:r>
-              <a:rPr lang="pt-BR" dirty="0" smtClean="0"/>
-              <a:t>Legível</a:t>
+              <a:t> </a:t>
+            </a:r>
+            <a:r>
+              <a:rPr lang="pt-BR" dirty="0" smtClean="0"/>
+              <a:t>Gestores</a:t>
+            </a:r>
+            <a:endParaRPr lang="pt-BR" dirty="0" smtClean="0"/>
+          </a:p>
+          <a:p>
+            <a:pPr>
+              <a:buNone/>
+            </a:pPr>
+            <a:endParaRPr lang="pt-BR" sz="1800" dirty="0" smtClean="0"/>
+          </a:p>
+          <a:p>
+            <a:pPr algn="ctr">
+              <a:buNone/>
+            </a:pPr>
+            <a:r>
+              <a:rPr lang="pt-BR" dirty="0" smtClean="0"/>
+              <a:t>   São os diretores, vice-diretores, e   coordenadores pedagógicos.</a:t>
+            </a:r>
+          </a:p>
+          <a:p>
+            <a:pPr>
+              <a:buNone/>
+            </a:pPr>
+            <a:endParaRPr lang="pt-BR" dirty="0" smtClean="0"/>
+          </a:p>
+          <a:p>
+            <a:pPr>
+              <a:buNone/>
+            </a:pPr>
+            <a:r>
+              <a:rPr lang="pt-BR" dirty="0" smtClean="0"/>
+              <a:t>   Responsáveis </a:t>
+            </a:r>
+            <a:r>
+              <a:rPr lang="pt-BR" dirty="0" smtClean="0"/>
+              <a:t>por gerir toda infraestrutura </a:t>
+            </a:r>
+            <a:r>
+              <a:rPr lang="pt-BR" dirty="0" smtClean="0"/>
+              <a:t>da escola</a:t>
+            </a:r>
+            <a:r>
+              <a:rPr lang="pt-BR" dirty="0" smtClean="0"/>
+              <a:t>, tanto de recursos materiais e humanos, bem com as informações da secretaria, professores e alunos, e atendimento aos pais</a:t>
+            </a:r>
+            <a:r>
+              <a:rPr lang="pt-BR" dirty="0" smtClean="0"/>
+              <a:t>.</a:t>
+            </a:r>
+            <a:r>
+              <a:rPr lang="pt-BR" dirty="0" smtClean="0"/>
+              <a:t> </a:t>
             </a:r>
           </a:p>
           <a:p>
@@ -5306,7 +6399,10 @@
           <a:bodyPr/>
           <a:lstStyle/>
           <a:p>
-            <a:endParaRPr lang="pt-BR"/>
+            <a:r>
+              <a:rPr lang="pt-BR" dirty="0"/>
+              <a:t>26/09/204</a:t>
+            </a:r>
           </a:p>
         </p:txBody>
       </p:sp>
@@ -5330,7 +6426,7 @@
               <a:pPr/>
               <a:t>3</a:t>
             </a:fld>
-            <a:endParaRPr lang="pt-BR" dirty="0"/>
+            <a:endParaRPr lang="pt-BR"/>
           </a:p>
         </p:txBody>
       </p:sp>
@@ -5351,11 +6447,11 @@
           <a:p>
             <a:r>
               <a:rPr lang="pt-BR" dirty="0" err="1" smtClean="0"/>
-              <a:t>Veris</a:t>
-            </a:r>
-            <a:r>
-              <a:rPr lang="pt-BR" dirty="0" smtClean="0"/>
-              <a:t> Faculdades TCM/3ADS</a:t>
+              <a:t>IBTAFaculdades</a:t>
+            </a:r>
+            <a:r>
+              <a:rPr lang="pt-BR" dirty="0" smtClean="0"/>
+              <a:t> TCM/3ADS</a:t>
             </a:r>
             <a:endParaRPr lang="pt-BR" dirty="0"/>
           </a:p>
@@ -5398,7 +6494,7 @@
       </p:grpSpPr>
       <p:sp>
         <p:nvSpPr>
-          <p:cNvPr id="19458" name="Rectangle 2"/>
+          <p:cNvPr id="18434" name="Rectangle 2"/>
           <p:cNvSpPr>
             <a:spLocks noGrp="1" noChangeArrowheads="1"/>
           </p:cNvSpPr>
@@ -5413,7 +6509,7 @@
           <a:p>
             <a:r>
               <a:rPr lang="pt-BR" dirty="0" smtClean="0"/>
-              <a:t>Conclusão</a:t>
+              <a:t>Usuários </a:t>
             </a:r>
             <a:endParaRPr lang="pt-BR" dirty="0"/>
           </a:p>
@@ -5421,7 +6517,7 @@
       </p:sp>
       <p:sp>
         <p:nvSpPr>
-          <p:cNvPr id="19459" name="Rectangle 3"/>
+          <p:cNvPr id="18435" name="Rectangle 3"/>
           <p:cNvSpPr>
             <a:spLocks noGrp="1" noChangeArrowheads="1"/>
           </p:cNvSpPr>
@@ -5429,15 +6525,132 @@
             <p:ph type="body" idx="1"/>
           </p:nvPr>
         </p:nvSpPr>
-        <p:spPr/>
+        <p:spPr>
+          <a:xfrm>
+            <a:off x="539552" y="1556792"/>
+            <a:ext cx="8229600" cy="4530725"/>
+          </a:xfrm>
+        </p:spPr>
         <p:txBody>
           <a:bodyPr/>
           <a:lstStyle/>
           <a:p>
             <a:r>
               <a:rPr lang="pt-BR" dirty="0" smtClean="0"/>
-              <a:t>Ressalte os resultados alcançados e futuras expansões.</a:t>
-            </a:r>
+              <a:t>Secretaria</a:t>
+            </a:r>
+          </a:p>
+          <a:p>
+            <a:pPr>
+              <a:buNone/>
+            </a:pPr>
+            <a:endParaRPr lang="pt-BR" sz="1100" dirty="0" smtClean="0"/>
+          </a:p>
+          <a:p>
+            <a:pPr algn="ctr">
+              <a:buNone/>
+            </a:pPr>
+            <a:r>
+              <a:rPr lang="pt-BR" dirty="0" smtClean="0"/>
+              <a:t>  </a:t>
+            </a:r>
+            <a:r>
+              <a:rPr lang="pt-BR" sz="2400" dirty="0" smtClean="0"/>
+              <a:t>Os </a:t>
+            </a:r>
+            <a:r>
+              <a:rPr lang="pt-BR" sz="2400" dirty="0" smtClean="0"/>
+              <a:t>secretários e agentes </a:t>
+            </a:r>
+            <a:r>
+              <a:rPr lang="pt-BR" sz="2400" dirty="0" smtClean="0"/>
+              <a:t>escolares </a:t>
+            </a:r>
+            <a:r>
+              <a:rPr lang="pt-BR" sz="2400" dirty="0" smtClean="0"/>
+              <a:t>atendem </a:t>
+            </a:r>
+            <a:r>
+              <a:rPr lang="pt-BR" sz="2400" dirty="0" smtClean="0"/>
+              <a:t>a toda comunidade escolar para receber e entregar informações e documentações. </a:t>
+            </a:r>
+            <a:endParaRPr lang="pt-BR" sz="2400" dirty="0" smtClean="0"/>
+          </a:p>
+          <a:p>
+            <a:pPr algn="ctr">
+              <a:buNone/>
+            </a:pPr>
+            <a:endParaRPr lang="pt-BR" sz="1800" dirty="0" smtClean="0"/>
+          </a:p>
+          <a:p>
+            <a:pPr>
+              <a:buNone/>
+            </a:pPr>
+            <a:r>
+              <a:rPr lang="pt-BR" dirty="0" smtClean="0"/>
+              <a:t> </a:t>
+            </a:r>
+            <a:r>
+              <a:rPr lang="pt-BR" dirty="0" smtClean="0"/>
+              <a:t>   - Organiza </a:t>
+            </a:r>
+            <a:r>
+              <a:rPr lang="pt-BR" dirty="0" smtClean="0"/>
+              <a:t>e </a:t>
+            </a:r>
+            <a:r>
+              <a:rPr lang="pt-BR" dirty="0" smtClean="0"/>
+              <a:t>arquiva </a:t>
+            </a:r>
+            <a:r>
+              <a:rPr lang="pt-BR" dirty="0" smtClean="0"/>
+              <a:t>informações </a:t>
+            </a:r>
+            <a:r>
+              <a:rPr lang="pt-BR" dirty="0" smtClean="0"/>
+              <a:t>de documentos escolares de alunos e professores.</a:t>
+            </a:r>
+            <a:endParaRPr lang="pt-BR" dirty="0" smtClean="0"/>
+          </a:p>
+          <a:p>
+            <a:pPr>
+              <a:buNone/>
+            </a:pPr>
+            <a:r>
+              <a:rPr lang="pt-BR" dirty="0" smtClean="0"/>
+              <a:t>   - Organiza a infraestrutura, recursos </a:t>
+            </a:r>
+            <a:r>
+              <a:rPr lang="pt-BR" dirty="0" smtClean="0"/>
+              <a:t>materiais e </a:t>
+            </a:r>
+            <a:r>
+              <a:rPr lang="pt-BR" dirty="0" smtClean="0"/>
+              <a:t>humanos.</a:t>
+            </a:r>
+          </a:p>
+          <a:p>
+            <a:pPr>
+              <a:buNone/>
+            </a:pPr>
+            <a:r>
+              <a:rPr lang="pt-BR" dirty="0" smtClean="0"/>
+              <a:t>   - Atende pais</a:t>
+            </a:r>
+            <a:r>
+              <a:rPr lang="pt-BR" dirty="0" smtClean="0"/>
+              <a:t> </a:t>
+            </a:r>
+            <a:r>
+              <a:rPr lang="pt-BR" dirty="0" smtClean="0"/>
+              <a:t>e comunidade</a:t>
+            </a:r>
+            <a:r>
+              <a:rPr lang="pt-BR" dirty="0" smtClean="0"/>
+              <a:t> </a:t>
+            </a:r>
+          </a:p>
+          <a:p>
             <a:endParaRPr lang="pt-BR" dirty="0"/>
           </a:p>
         </p:txBody>
@@ -5457,7 +6670,10 @@
           <a:bodyPr/>
           <a:lstStyle/>
           <a:p>
-            <a:endParaRPr lang="pt-BR"/>
+            <a:r>
+              <a:rPr lang="pt-BR" dirty="0"/>
+              <a:t>26/09/204</a:t>
+            </a:r>
           </a:p>
         </p:txBody>
       </p:sp>
@@ -5481,6 +6697,998 @@
               <a:pPr/>
               <a:t>4</a:t>
             </a:fld>
+            <a:endParaRPr lang="pt-BR"/>
+          </a:p>
+        </p:txBody>
+      </p:sp>
+      <p:sp>
+        <p:nvSpPr>
+          <p:cNvPr id="8" name="Espaço Reservado para Rodapé 7"/>
+          <p:cNvSpPr>
+            <a:spLocks noGrp="1"/>
+          </p:cNvSpPr>
+          <p:nvPr>
+            <p:ph type="ftr" sz="quarter" idx="11"/>
+          </p:nvPr>
+        </p:nvSpPr>
+        <p:spPr/>
+        <p:txBody>
+          <a:bodyPr/>
+          <a:lstStyle/>
+          <a:p>
+            <a:r>
+              <a:rPr lang="pt-BR" dirty="0" err="1" smtClean="0"/>
+              <a:t>IBTAFaculdades</a:t>
+            </a:r>
+            <a:r>
+              <a:rPr lang="pt-BR" dirty="0" smtClean="0"/>
+              <a:t> TCM/3ADS</a:t>
+            </a:r>
+            <a:endParaRPr lang="pt-BR" dirty="0"/>
+          </a:p>
+        </p:txBody>
+      </p:sp>
+    </p:spTree>
+  </p:cSld>
+  <p:clrMapOvr>
+    <a:masterClrMapping/>
+  </p:clrMapOvr>
+  <p:transition spd="med">
+    <p:fade/>
+  </p:transition>
+  <p:timing>
+    <p:tnLst>
+      <p:par>
+        <p:cTn id="1" dur="indefinite" restart="never" nodeType="tmRoot"/>
+      </p:par>
+    </p:tnLst>
+  </p:timing>
+</p:sld>
+</file>
+
+<file path=ppt/slides/slide5.xml><?xml version="1.0" encoding="utf-8"?>
+<p:sld xmlns:a="http://schemas.openxmlformats.org/drawingml/2006/main" xmlns:r="http://schemas.openxmlformats.org/officeDocument/2006/relationships" xmlns:p="http://schemas.openxmlformats.org/presentationml/2006/main">
+  <p:cSld>
+    <p:spTree>
+      <p:nvGrpSpPr>
+        <p:cNvPr id="1" name=""/>
+        <p:cNvGrpSpPr/>
+        <p:nvPr/>
+      </p:nvGrpSpPr>
+      <p:grpSpPr>
+        <a:xfrm>
+          <a:off x="0" y="0"/>
+          <a:ext cx="0" cy="0"/>
+          <a:chOff x="0" y="0"/>
+          <a:chExt cx="0" cy="0"/>
+        </a:xfrm>
+      </p:grpSpPr>
+      <p:sp>
+        <p:nvSpPr>
+          <p:cNvPr id="18434" name="Rectangle 2"/>
+          <p:cNvSpPr>
+            <a:spLocks noGrp="1" noChangeArrowheads="1"/>
+          </p:cNvSpPr>
+          <p:nvPr>
+            <p:ph type="title"/>
+          </p:nvPr>
+        </p:nvSpPr>
+        <p:spPr/>
+        <p:txBody>
+          <a:bodyPr/>
+          <a:lstStyle/>
+          <a:p>
+            <a:r>
+              <a:rPr lang="pt-BR" dirty="0" smtClean="0"/>
+              <a:t>Usuários </a:t>
+            </a:r>
+            <a:endParaRPr lang="pt-BR" dirty="0"/>
+          </a:p>
+        </p:txBody>
+      </p:sp>
+      <p:sp>
+        <p:nvSpPr>
+          <p:cNvPr id="18435" name="Rectangle 3"/>
+          <p:cNvSpPr>
+            <a:spLocks noGrp="1" noChangeArrowheads="1"/>
+          </p:cNvSpPr>
+          <p:nvPr>
+            <p:ph type="body" idx="1"/>
+          </p:nvPr>
+        </p:nvSpPr>
+        <p:spPr>
+          <a:xfrm>
+            <a:off x="539552" y="1556792"/>
+            <a:ext cx="8229600" cy="4530725"/>
+          </a:xfrm>
+        </p:spPr>
+        <p:txBody>
+          <a:bodyPr/>
+          <a:lstStyle/>
+          <a:p>
+            <a:r>
+              <a:rPr lang="pt-BR" dirty="0" smtClean="0"/>
+              <a:t>Professores</a:t>
+            </a:r>
+            <a:endParaRPr lang="pt-BR" dirty="0" smtClean="0"/>
+          </a:p>
+          <a:p>
+            <a:pPr>
+              <a:buNone/>
+            </a:pPr>
+            <a:endParaRPr lang="pt-BR" sz="1800" dirty="0" smtClean="0"/>
+          </a:p>
+          <a:p>
+            <a:pPr algn="ctr">
+              <a:buNone/>
+            </a:pPr>
+            <a:r>
+              <a:rPr lang="pt-BR" sz="2400" dirty="0" smtClean="0"/>
+              <a:t>  </a:t>
+            </a:r>
+            <a:r>
+              <a:rPr lang="pt-BR" sz="2400" dirty="0" smtClean="0"/>
+              <a:t>Profissionais com formação na área da educação, com documentação adequada para atuação em sala de aula</a:t>
+            </a:r>
+            <a:r>
+              <a:rPr lang="pt-BR" sz="2400" dirty="0" smtClean="0"/>
+              <a:t>.</a:t>
+            </a:r>
+          </a:p>
+          <a:p>
+            <a:pPr algn="ctr">
+              <a:buNone/>
+            </a:pPr>
+            <a:endParaRPr lang="pt-BR" sz="1800" dirty="0" smtClean="0"/>
+          </a:p>
+          <a:p>
+            <a:pPr>
+              <a:buNone/>
+            </a:pPr>
+            <a:r>
+              <a:rPr lang="pt-BR" dirty="0" smtClean="0"/>
+              <a:t>-</a:t>
+            </a:r>
+            <a:r>
+              <a:rPr lang="pt-BR" dirty="0" smtClean="0"/>
+              <a:t> </a:t>
+            </a:r>
+            <a:r>
+              <a:rPr lang="pt-BR" dirty="0" smtClean="0"/>
+              <a:t>Organizar </a:t>
+            </a:r>
+            <a:r>
+              <a:rPr lang="pt-BR" dirty="0" smtClean="0"/>
+              <a:t>e planejar o conteúdo curricular</a:t>
+            </a:r>
+            <a:r>
+              <a:rPr lang="pt-BR" dirty="0" smtClean="0"/>
+              <a:t>.</a:t>
+            </a:r>
+          </a:p>
+          <a:p>
+            <a:pPr>
+              <a:buNone/>
+            </a:pPr>
+            <a:r>
+              <a:rPr lang="en-US" dirty="0" smtClean="0"/>
+              <a:t>- </a:t>
+            </a:r>
+            <a:r>
+              <a:rPr lang="en-US" dirty="0" err="1" smtClean="0"/>
+              <a:t>Ministra</a:t>
+            </a:r>
+            <a:r>
+              <a:rPr lang="en-US" dirty="0" smtClean="0"/>
+              <a:t> </a:t>
+            </a:r>
+            <a:r>
+              <a:rPr lang="en-US" dirty="0" err="1" smtClean="0"/>
+              <a:t>aulas</a:t>
+            </a:r>
+            <a:r>
+              <a:rPr lang="en-US" dirty="0" smtClean="0"/>
+              <a:t> </a:t>
+            </a:r>
+          </a:p>
+          <a:p>
+            <a:pPr>
+              <a:buNone/>
+            </a:pPr>
+            <a:r>
+              <a:rPr lang="en-US" dirty="0" smtClean="0"/>
+              <a:t>- </a:t>
+            </a:r>
+            <a:r>
+              <a:rPr lang="en-US" dirty="0" err="1" smtClean="0"/>
+              <a:t>Acompanha</a:t>
+            </a:r>
+            <a:r>
+              <a:rPr lang="en-US" dirty="0" smtClean="0"/>
+              <a:t> a </a:t>
+            </a:r>
+            <a:r>
+              <a:rPr lang="en-US" dirty="0" err="1" smtClean="0"/>
+              <a:t>aprendizagem</a:t>
+            </a:r>
+            <a:r>
+              <a:rPr lang="en-US" dirty="0" smtClean="0"/>
+              <a:t> individual do </a:t>
+            </a:r>
+            <a:r>
+              <a:rPr lang="en-US" dirty="0" err="1" smtClean="0"/>
+              <a:t>aluno</a:t>
+            </a:r>
+            <a:endParaRPr lang="pt-BR" dirty="0" smtClean="0"/>
+          </a:p>
+          <a:p>
+            <a:pPr>
+              <a:buNone/>
+            </a:pPr>
+            <a:r>
+              <a:rPr lang="pt-BR" dirty="0" smtClean="0"/>
+              <a:t>- Registra notas</a:t>
+            </a:r>
+            <a:r>
+              <a:rPr lang="pt-BR" dirty="0" smtClean="0"/>
+              <a:t>, faltas, ocorrências e atividades curriculares como </a:t>
+            </a:r>
+            <a:r>
+              <a:rPr lang="pt-BR" dirty="0" smtClean="0"/>
+              <a:t>tarefa, trabalho </a:t>
+            </a:r>
+            <a:r>
+              <a:rPr lang="pt-BR" dirty="0" smtClean="0"/>
+              <a:t>e </a:t>
+            </a:r>
+            <a:r>
+              <a:rPr lang="pt-BR" dirty="0" smtClean="0"/>
+              <a:t>avaliação.</a:t>
+            </a:r>
+            <a:endParaRPr lang="pt-BR" dirty="0"/>
+          </a:p>
+        </p:txBody>
+      </p:sp>
+      <p:sp>
+        <p:nvSpPr>
+          <p:cNvPr id="6" name="Espaço Reservado para Data 5"/>
+          <p:cNvSpPr>
+            <a:spLocks noGrp="1"/>
+          </p:cNvSpPr>
+          <p:nvPr>
+            <p:ph type="dt" sz="half" idx="10"/>
+          </p:nvPr>
+        </p:nvSpPr>
+        <p:spPr/>
+        <p:txBody>
+          <a:bodyPr/>
+          <a:lstStyle/>
+          <a:p>
+            <a:r>
+              <a:rPr lang="pt-BR" dirty="0"/>
+              <a:t>26/09/204</a:t>
+            </a:r>
+          </a:p>
+        </p:txBody>
+      </p:sp>
+      <p:sp>
+        <p:nvSpPr>
+          <p:cNvPr id="7" name="Espaço Reservado para Número de Slide 6"/>
+          <p:cNvSpPr>
+            <a:spLocks noGrp="1"/>
+          </p:cNvSpPr>
+          <p:nvPr>
+            <p:ph type="sldNum" sz="quarter" idx="12"/>
+          </p:nvPr>
+        </p:nvSpPr>
+        <p:spPr/>
+        <p:txBody>
+          <a:bodyPr/>
+          <a:lstStyle/>
+          <a:p>
+            <a:fld id="{516476CB-12D4-456A-BCEE-8469A8C40045}" type="slidenum">
+              <a:rPr lang="pt-BR" smtClean="0"/>
+              <a:pPr/>
+              <a:t>5</a:t>
+            </a:fld>
+            <a:endParaRPr lang="pt-BR"/>
+          </a:p>
+        </p:txBody>
+      </p:sp>
+      <p:sp>
+        <p:nvSpPr>
+          <p:cNvPr id="8" name="Espaço Reservado para Rodapé 7"/>
+          <p:cNvSpPr>
+            <a:spLocks noGrp="1"/>
+          </p:cNvSpPr>
+          <p:nvPr>
+            <p:ph type="ftr" sz="quarter" idx="11"/>
+          </p:nvPr>
+        </p:nvSpPr>
+        <p:spPr/>
+        <p:txBody>
+          <a:bodyPr/>
+          <a:lstStyle/>
+          <a:p>
+            <a:r>
+              <a:rPr lang="pt-BR" dirty="0" err="1" smtClean="0"/>
+              <a:t>IBTAFaculdades</a:t>
+            </a:r>
+            <a:r>
+              <a:rPr lang="pt-BR" dirty="0" smtClean="0"/>
+              <a:t> TCM/3ADS</a:t>
+            </a:r>
+            <a:endParaRPr lang="pt-BR" dirty="0"/>
+          </a:p>
+        </p:txBody>
+      </p:sp>
+    </p:spTree>
+  </p:cSld>
+  <p:clrMapOvr>
+    <a:masterClrMapping/>
+  </p:clrMapOvr>
+  <p:transition spd="med">
+    <p:fade/>
+  </p:transition>
+  <p:timing>
+    <p:tnLst>
+      <p:par>
+        <p:cTn id="1" dur="indefinite" restart="never" nodeType="tmRoot"/>
+      </p:par>
+    </p:tnLst>
+  </p:timing>
+</p:sld>
+</file>
+
+<file path=ppt/slides/slide6.xml><?xml version="1.0" encoding="utf-8"?>
+<p:sld xmlns:a="http://schemas.openxmlformats.org/drawingml/2006/main" xmlns:r="http://schemas.openxmlformats.org/officeDocument/2006/relationships" xmlns:p="http://schemas.openxmlformats.org/presentationml/2006/main">
+  <p:cSld>
+    <p:spTree>
+      <p:nvGrpSpPr>
+        <p:cNvPr id="1" name=""/>
+        <p:cNvGrpSpPr/>
+        <p:nvPr/>
+      </p:nvGrpSpPr>
+      <p:grpSpPr>
+        <a:xfrm>
+          <a:off x="0" y="0"/>
+          <a:ext cx="0" cy="0"/>
+          <a:chOff x="0" y="0"/>
+          <a:chExt cx="0" cy="0"/>
+        </a:xfrm>
+      </p:grpSpPr>
+      <p:sp>
+        <p:nvSpPr>
+          <p:cNvPr id="18434" name="Rectangle 2"/>
+          <p:cNvSpPr>
+            <a:spLocks noGrp="1" noChangeArrowheads="1"/>
+          </p:cNvSpPr>
+          <p:nvPr>
+            <p:ph type="title"/>
+          </p:nvPr>
+        </p:nvSpPr>
+        <p:spPr/>
+        <p:txBody>
+          <a:bodyPr/>
+          <a:lstStyle/>
+          <a:p>
+            <a:r>
+              <a:rPr lang="pt-BR" dirty="0" smtClean="0"/>
+              <a:t>Usuários </a:t>
+            </a:r>
+            <a:endParaRPr lang="pt-BR" dirty="0"/>
+          </a:p>
+        </p:txBody>
+      </p:sp>
+      <p:sp>
+        <p:nvSpPr>
+          <p:cNvPr id="18435" name="Rectangle 3"/>
+          <p:cNvSpPr>
+            <a:spLocks noGrp="1" noChangeArrowheads="1"/>
+          </p:cNvSpPr>
+          <p:nvPr>
+            <p:ph type="body" idx="1"/>
+          </p:nvPr>
+        </p:nvSpPr>
+        <p:spPr>
+          <a:xfrm>
+            <a:off x="539552" y="1556792"/>
+            <a:ext cx="8229600" cy="4530725"/>
+          </a:xfrm>
+        </p:spPr>
+        <p:txBody>
+          <a:bodyPr/>
+          <a:lstStyle/>
+          <a:p>
+            <a:r>
+              <a:rPr lang="pt-BR" dirty="0" smtClean="0"/>
+              <a:t>Pais e/ou responsáveis</a:t>
+            </a:r>
+            <a:endParaRPr lang="pt-BR" dirty="0" smtClean="0"/>
+          </a:p>
+          <a:p>
+            <a:pPr>
+              <a:buNone/>
+            </a:pPr>
+            <a:endParaRPr lang="pt-BR" sz="1800" dirty="0" smtClean="0"/>
+          </a:p>
+          <a:p>
+            <a:pPr algn="ctr">
+              <a:buNone/>
+            </a:pPr>
+            <a:r>
+              <a:rPr lang="pt-BR" sz="2400" dirty="0" smtClean="0"/>
+              <a:t>  </a:t>
+            </a:r>
+            <a:r>
+              <a:rPr lang="pt-BR" sz="2400" dirty="0" smtClean="0"/>
+              <a:t>São os coadjuvantes no processo de aprendizado, </a:t>
+            </a:r>
+            <a:r>
+              <a:rPr lang="pt-BR" sz="2400" dirty="0" smtClean="0"/>
+              <a:t>fora da escola. Utilizam </a:t>
+            </a:r>
+            <a:r>
+              <a:rPr lang="pt-BR" sz="2400" dirty="0" smtClean="0"/>
+              <a:t>o sistema para acompanhar o </a:t>
+            </a:r>
+            <a:r>
+              <a:rPr lang="pt-BR" sz="2400" dirty="0" smtClean="0"/>
+              <a:t>processo escolar e </a:t>
+            </a:r>
+            <a:r>
+              <a:rPr lang="pt-BR" sz="2400" dirty="0" smtClean="0"/>
+              <a:t>comportamento d</a:t>
+            </a:r>
+            <a:r>
+              <a:rPr lang="pt-BR" sz="2400" dirty="0" smtClean="0"/>
+              <a:t>os alunos, seus filhos/responsáveis</a:t>
+            </a:r>
+          </a:p>
+          <a:p>
+            <a:pPr algn="ctr">
+              <a:buNone/>
+            </a:pPr>
+            <a:endParaRPr lang="pt-BR" sz="1800" dirty="0" smtClean="0"/>
+          </a:p>
+          <a:p>
+            <a:pPr>
+              <a:buNone/>
+            </a:pPr>
+            <a:r>
+              <a:rPr lang="pt-BR" dirty="0" smtClean="0"/>
+              <a:t>-</a:t>
+            </a:r>
+            <a:r>
+              <a:rPr lang="pt-BR" dirty="0" smtClean="0"/>
+              <a:t> Verificar: notas, frequência, ocorrências, comunicados e </a:t>
+            </a:r>
+            <a:r>
+              <a:rPr lang="pt-BR" dirty="0" smtClean="0"/>
+              <a:t>convites</a:t>
+            </a:r>
+            <a:r>
+              <a:rPr lang="pt-BR" dirty="0" smtClean="0"/>
+              <a:t> </a:t>
+            </a:r>
+            <a:r>
+              <a:rPr lang="pt-BR" dirty="0" smtClean="0"/>
+              <a:t>e notícias </a:t>
+            </a:r>
+            <a:r>
+              <a:rPr lang="pt-BR" dirty="0" smtClean="0"/>
+              <a:t>da escola</a:t>
+            </a:r>
+            <a:r>
+              <a:rPr lang="pt-BR" dirty="0" smtClean="0"/>
+              <a:t>.</a:t>
+            </a:r>
+            <a:endParaRPr lang="pt-BR" dirty="0"/>
+          </a:p>
+        </p:txBody>
+      </p:sp>
+      <p:sp>
+        <p:nvSpPr>
+          <p:cNvPr id="6" name="Espaço Reservado para Data 5"/>
+          <p:cNvSpPr>
+            <a:spLocks noGrp="1"/>
+          </p:cNvSpPr>
+          <p:nvPr>
+            <p:ph type="dt" sz="half" idx="10"/>
+          </p:nvPr>
+        </p:nvSpPr>
+        <p:spPr/>
+        <p:txBody>
+          <a:bodyPr/>
+          <a:lstStyle/>
+          <a:p>
+            <a:r>
+              <a:rPr lang="pt-BR" dirty="0"/>
+              <a:t>26/09/204</a:t>
+            </a:r>
+          </a:p>
+        </p:txBody>
+      </p:sp>
+      <p:sp>
+        <p:nvSpPr>
+          <p:cNvPr id="7" name="Espaço Reservado para Número de Slide 6"/>
+          <p:cNvSpPr>
+            <a:spLocks noGrp="1"/>
+          </p:cNvSpPr>
+          <p:nvPr>
+            <p:ph type="sldNum" sz="quarter" idx="12"/>
+          </p:nvPr>
+        </p:nvSpPr>
+        <p:spPr/>
+        <p:txBody>
+          <a:bodyPr/>
+          <a:lstStyle/>
+          <a:p>
+            <a:fld id="{516476CB-12D4-456A-BCEE-8469A8C40045}" type="slidenum">
+              <a:rPr lang="pt-BR" smtClean="0"/>
+              <a:pPr/>
+              <a:t>6</a:t>
+            </a:fld>
+            <a:endParaRPr lang="pt-BR"/>
+          </a:p>
+        </p:txBody>
+      </p:sp>
+      <p:sp>
+        <p:nvSpPr>
+          <p:cNvPr id="8" name="Espaço Reservado para Rodapé 7"/>
+          <p:cNvSpPr>
+            <a:spLocks noGrp="1"/>
+          </p:cNvSpPr>
+          <p:nvPr>
+            <p:ph type="ftr" sz="quarter" idx="11"/>
+          </p:nvPr>
+        </p:nvSpPr>
+        <p:spPr/>
+        <p:txBody>
+          <a:bodyPr/>
+          <a:lstStyle/>
+          <a:p>
+            <a:r>
+              <a:rPr lang="pt-BR" dirty="0" err="1" smtClean="0"/>
+              <a:t>IBTAFaculdades</a:t>
+            </a:r>
+            <a:r>
+              <a:rPr lang="pt-BR" dirty="0" smtClean="0"/>
+              <a:t> TCM/3ADS</a:t>
+            </a:r>
+            <a:endParaRPr lang="pt-BR" dirty="0"/>
+          </a:p>
+        </p:txBody>
+      </p:sp>
+    </p:spTree>
+  </p:cSld>
+  <p:clrMapOvr>
+    <a:masterClrMapping/>
+  </p:clrMapOvr>
+  <p:transition spd="med">
+    <p:fade/>
+  </p:transition>
+  <p:timing>
+    <p:tnLst>
+      <p:par>
+        <p:cTn id="1" dur="indefinite" restart="never" nodeType="tmRoot"/>
+      </p:par>
+    </p:tnLst>
+  </p:timing>
+</p:sld>
+</file>
+
+<file path=ppt/slides/slide7.xml><?xml version="1.0" encoding="utf-8"?>
+<p:sld xmlns:a="http://schemas.openxmlformats.org/drawingml/2006/main" xmlns:r="http://schemas.openxmlformats.org/officeDocument/2006/relationships" xmlns:p="http://schemas.openxmlformats.org/presentationml/2006/main">
+  <p:cSld>
+    <p:spTree>
+      <p:nvGrpSpPr>
+        <p:cNvPr id="1" name=""/>
+        <p:cNvGrpSpPr/>
+        <p:nvPr/>
+      </p:nvGrpSpPr>
+      <p:grpSpPr>
+        <a:xfrm>
+          <a:off x="0" y="0"/>
+          <a:ext cx="0" cy="0"/>
+          <a:chOff x="0" y="0"/>
+          <a:chExt cx="0" cy="0"/>
+        </a:xfrm>
+      </p:grpSpPr>
+      <p:sp>
+        <p:nvSpPr>
+          <p:cNvPr id="18434" name="Rectangle 2"/>
+          <p:cNvSpPr>
+            <a:spLocks noGrp="1" noChangeArrowheads="1"/>
+          </p:cNvSpPr>
+          <p:nvPr>
+            <p:ph type="title"/>
+          </p:nvPr>
+        </p:nvSpPr>
+        <p:spPr/>
+        <p:txBody>
+          <a:bodyPr/>
+          <a:lstStyle/>
+          <a:p>
+            <a:r>
+              <a:rPr lang="pt-BR" dirty="0" smtClean="0"/>
+              <a:t>Usuários </a:t>
+            </a:r>
+            <a:endParaRPr lang="pt-BR" dirty="0"/>
+          </a:p>
+        </p:txBody>
+      </p:sp>
+      <p:sp>
+        <p:nvSpPr>
+          <p:cNvPr id="18435" name="Rectangle 3"/>
+          <p:cNvSpPr>
+            <a:spLocks noGrp="1" noChangeArrowheads="1"/>
+          </p:cNvSpPr>
+          <p:nvPr>
+            <p:ph type="body" idx="1"/>
+          </p:nvPr>
+        </p:nvSpPr>
+        <p:spPr>
+          <a:xfrm>
+            <a:off x="539552" y="1556792"/>
+            <a:ext cx="8229600" cy="4530725"/>
+          </a:xfrm>
+        </p:spPr>
+        <p:txBody>
+          <a:bodyPr/>
+          <a:lstStyle/>
+          <a:p>
+            <a:r>
+              <a:rPr lang="pt-BR" dirty="0" smtClean="0"/>
+              <a:t>Alunos</a:t>
+            </a:r>
+            <a:endParaRPr lang="pt-BR" dirty="0" smtClean="0"/>
+          </a:p>
+          <a:p>
+            <a:pPr>
+              <a:buNone/>
+            </a:pPr>
+            <a:endParaRPr lang="pt-BR" sz="1800" dirty="0" smtClean="0"/>
+          </a:p>
+          <a:p>
+            <a:pPr algn="ctr">
+              <a:buNone/>
+            </a:pPr>
+            <a:r>
+              <a:rPr lang="pt-BR" sz="2400" dirty="0" smtClean="0"/>
+              <a:t> </a:t>
+            </a:r>
+            <a:r>
+              <a:rPr lang="pt-BR" sz="2400" dirty="0" smtClean="0"/>
+              <a:t>São a fonte que produzem os dados a serem administrados pelo sistema. O sistema é criado em função de sua existência. </a:t>
+            </a:r>
+            <a:endParaRPr lang="pt-BR" sz="2400" dirty="0" smtClean="0"/>
+          </a:p>
+          <a:p>
+            <a:pPr algn="ctr">
+              <a:buNone/>
+            </a:pPr>
+            <a:endParaRPr lang="pt-BR" sz="1800" dirty="0" smtClean="0"/>
+          </a:p>
+          <a:p>
+            <a:pPr>
+              <a:buNone/>
+            </a:pPr>
+            <a:r>
+              <a:rPr lang="pt-BR" dirty="0" smtClean="0"/>
+              <a:t>-</a:t>
+            </a:r>
+            <a:r>
+              <a:rPr lang="pt-BR" dirty="0" smtClean="0"/>
+              <a:t>  Acompanhar e verificar suas notas e </a:t>
+            </a:r>
+            <a:r>
+              <a:rPr lang="pt-BR" dirty="0" smtClean="0"/>
+              <a:t>frequência.</a:t>
+            </a:r>
+          </a:p>
+          <a:p>
+            <a:pPr>
+              <a:buNone/>
+            </a:pPr>
+            <a:r>
+              <a:rPr lang="en-US" dirty="0" smtClean="0"/>
+              <a:t>- </a:t>
+            </a:r>
+            <a:r>
+              <a:rPr lang="en-US" dirty="0" err="1" smtClean="0"/>
+              <a:t>Verificar</a:t>
+            </a:r>
+            <a:r>
+              <a:rPr lang="en-US" dirty="0" smtClean="0"/>
+              <a:t> as </a:t>
+            </a:r>
+            <a:r>
+              <a:rPr lang="en-US" dirty="0" err="1" smtClean="0"/>
+              <a:t>atividades</a:t>
+            </a:r>
+            <a:r>
+              <a:rPr lang="en-US" dirty="0" smtClean="0"/>
+              <a:t> a </a:t>
+            </a:r>
+            <a:r>
+              <a:rPr lang="en-US" dirty="0" err="1" smtClean="0"/>
+              <a:t>serem</a:t>
+            </a:r>
+            <a:r>
+              <a:rPr lang="en-US" dirty="0" smtClean="0"/>
+              <a:t> </a:t>
+            </a:r>
+            <a:r>
+              <a:rPr lang="en-US" dirty="0" err="1" smtClean="0"/>
+              <a:t>realizadas</a:t>
+            </a:r>
+            <a:r>
+              <a:rPr lang="en-US" dirty="0" smtClean="0"/>
+              <a:t> </a:t>
+            </a:r>
+            <a:r>
+              <a:rPr lang="en-US" dirty="0" err="1" smtClean="0"/>
+              <a:t>fora</a:t>
+            </a:r>
+            <a:r>
+              <a:rPr lang="en-US" dirty="0" smtClean="0"/>
+              <a:t> </a:t>
+            </a:r>
+            <a:r>
+              <a:rPr lang="en-US" dirty="0" err="1" smtClean="0"/>
+              <a:t>da</a:t>
+            </a:r>
+            <a:r>
+              <a:rPr lang="en-US" dirty="0" smtClean="0"/>
+              <a:t> </a:t>
+            </a:r>
+            <a:r>
+              <a:rPr lang="en-US" dirty="0" err="1" smtClean="0"/>
+              <a:t>escola</a:t>
+            </a:r>
+            <a:r>
+              <a:rPr lang="en-US" dirty="0" smtClean="0"/>
+              <a:t>, </a:t>
+            </a:r>
+            <a:r>
+              <a:rPr lang="en-US" dirty="0" err="1" smtClean="0"/>
+              <a:t>como</a:t>
+            </a:r>
+            <a:r>
+              <a:rPr lang="en-US" dirty="0" smtClean="0"/>
+              <a:t> </a:t>
+            </a:r>
+            <a:r>
+              <a:rPr lang="en-US" dirty="0" err="1" smtClean="0"/>
+              <a:t>tarefas</a:t>
+            </a:r>
+            <a:r>
+              <a:rPr lang="en-US" dirty="0" smtClean="0"/>
+              <a:t>, </a:t>
+            </a:r>
+            <a:r>
+              <a:rPr lang="en-US" dirty="0" err="1" smtClean="0"/>
+              <a:t>seminários</a:t>
+            </a:r>
+            <a:r>
+              <a:rPr lang="en-US" dirty="0" smtClean="0"/>
+              <a:t>, </a:t>
+            </a:r>
+            <a:r>
+              <a:rPr lang="en-US" dirty="0" err="1" smtClean="0"/>
+              <a:t>trabalhos</a:t>
+            </a:r>
+            <a:r>
+              <a:rPr lang="en-US" dirty="0" smtClean="0"/>
+              <a:t>.</a:t>
+            </a:r>
+            <a:endParaRPr lang="pt-BR" dirty="0" smtClean="0"/>
+          </a:p>
+          <a:p>
+            <a:pPr>
+              <a:buNone/>
+            </a:pPr>
+            <a:endParaRPr lang="pt-BR" dirty="0"/>
+          </a:p>
+        </p:txBody>
+      </p:sp>
+      <p:sp>
+        <p:nvSpPr>
+          <p:cNvPr id="6" name="Espaço Reservado para Data 5"/>
+          <p:cNvSpPr>
+            <a:spLocks noGrp="1"/>
+          </p:cNvSpPr>
+          <p:nvPr>
+            <p:ph type="dt" sz="half" idx="10"/>
+          </p:nvPr>
+        </p:nvSpPr>
+        <p:spPr/>
+        <p:txBody>
+          <a:bodyPr/>
+          <a:lstStyle/>
+          <a:p>
+            <a:r>
+              <a:rPr lang="pt-BR" dirty="0"/>
+              <a:t>26/09/204</a:t>
+            </a:r>
+          </a:p>
+        </p:txBody>
+      </p:sp>
+      <p:sp>
+        <p:nvSpPr>
+          <p:cNvPr id="7" name="Espaço Reservado para Número de Slide 6"/>
+          <p:cNvSpPr>
+            <a:spLocks noGrp="1"/>
+          </p:cNvSpPr>
+          <p:nvPr>
+            <p:ph type="sldNum" sz="quarter" idx="12"/>
+          </p:nvPr>
+        </p:nvSpPr>
+        <p:spPr/>
+        <p:txBody>
+          <a:bodyPr/>
+          <a:lstStyle/>
+          <a:p>
+            <a:fld id="{516476CB-12D4-456A-BCEE-8469A8C40045}" type="slidenum">
+              <a:rPr lang="pt-BR" smtClean="0"/>
+              <a:pPr/>
+              <a:t>7</a:t>
+            </a:fld>
+            <a:endParaRPr lang="pt-BR"/>
+          </a:p>
+        </p:txBody>
+      </p:sp>
+      <p:sp>
+        <p:nvSpPr>
+          <p:cNvPr id="8" name="Espaço Reservado para Rodapé 7"/>
+          <p:cNvSpPr>
+            <a:spLocks noGrp="1"/>
+          </p:cNvSpPr>
+          <p:nvPr>
+            <p:ph type="ftr" sz="quarter" idx="11"/>
+          </p:nvPr>
+        </p:nvSpPr>
+        <p:spPr/>
+        <p:txBody>
+          <a:bodyPr/>
+          <a:lstStyle/>
+          <a:p>
+            <a:r>
+              <a:rPr lang="pt-BR" dirty="0" err="1" smtClean="0"/>
+              <a:t>IBTAFaculdades</a:t>
+            </a:r>
+            <a:r>
+              <a:rPr lang="pt-BR" dirty="0" smtClean="0"/>
+              <a:t> TCM/3ADS</a:t>
+            </a:r>
+            <a:endParaRPr lang="pt-BR" dirty="0"/>
+          </a:p>
+        </p:txBody>
+      </p:sp>
+    </p:spTree>
+  </p:cSld>
+  <p:clrMapOvr>
+    <a:masterClrMapping/>
+  </p:clrMapOvr>
+  <p:transition spd="med">
+    <p:fade/>
+  </p:transition>
+  <p:timing>
+    <p:tnLst>
+      <p:par>
+        <p:cTn id="1" dur="indefinite" restart="never" nodeType="tmRoot"/>
+      </p:par>
+    </p:tnLst>
+  </p:timing>
+</p:sld>
+</file>
+
+<file path=ppt/slides/slide8.xml><?xml version="1.0" encoding="utf-8"?>
+<p:sld xmlns:a="http://schemas.openxmlformats.org/drawingml/2006/main" xmlns:r="http://schemas.openxmlformats.org/officeDocument/2006/relationships" xmlns:p="http://schemas.openxmlformats.org/presentationml/2006/main">
+  <p:cSld>
+    <p:spTree>
+      <p:nvGrpSpPr>
+        <p:cNvPr id="1" name=""/>
+        <p:cNvGrpSpPr/>
+        <p:nvPr/>
+      </p:nvGrpSpPr>
+      <p:grpSpPr>
+        <a:xfrm>
+          <a:off x="0" y="0"/>
+          <a:ext cx="0" cy="0"/>
+          <a:chOff x="0" y="0"/>
+          <a:chExt cx="0" cy="0"/>
+        </a:xfrm>
+      </p:grpSpPr>
+      <p:sp>
+        <p:nvSpPr>
+          <p:cNvPr id="19458" name="Rectangle 2"/>
+          <p:cNvSpPr>
+            <a:spLocks noGrp="1" noChangeArrowheads="1"/>
+          </p:cNvSpPr>
+          <p:nvPr>
+            <p:ph type="title"/>
+          </p:nvPr>
+        </p:nvSpPr>
+        <p:spPr/>
+        <p:txBody>
+          <a:bodyPr/>
+          <a:lstStyle/>
+          <a:p>
+            <a:r>
+              <a:rPr lang="pt-BR" dirty="0" smtClean="0"/>
+              <a:t>Diagrama Caso Uso</a:t>
+            </a:r>
+            <a:endParaRPr lang="pt-BR" dirty="0"/>
+          </a:p>
+        </p:txBody>
+      </p:sp>
+      <p:sp>
+        <p:nvSpPr>
+          <p:cNvPr id="19459" name="Rectangle 3"/>
+          <p:cNvSpPr>
+            <a:spLocks noGrp="1" noChangeArrowheads="1"/>
+          </p:cNvSpPr>
+          <p:nvPr>
+            <p:ph type="body" idx="1"/>
+          </p:nvPr>
+        </p:nvSpPr>
+        <p:spPr/>
+        <p:txBody>
+          <a:bodyPr/>
+          <a:lstStyle/>
+          <a:p>
+            <a:r>
+              <a:rPr lang="en-US" dirty="0" smtClean="0"/>
+              <a:t>ALUNO</a:t>
+            </a:r>
+            <a:endParaRPr lang="pt-BR" dirty="0"/>
+          </a:p>
+        </p:txBody>
+      </p:sp>
+      <p:sp>
+        <p:nvSpPr>
+          <p:cNvPr id="6" name="Espaço Reservado para Data 5"/>
+          <p:cNvSpPr>
+            <a:spLocks noGrp="1"/>
+          </p:cNvSpPr>
+          <p:nvPr>
+            <p:ph type="dt" sz="half" idx="10"/>
+          </p:nvPr>
+        </p:nvSpPr>
+        <p:spPr/>
+        <p:txBody>
+          <a:bodyPr/>
+          <a:lstStyle/>
+          <a:p>
+            <a:r>
+              <a:rPr lang="pt-BR" dirty="0"/>
+              <a:t>26/09/204</a:t>
+            </a:r>
+          </a:p>
+        </p:txBody>
+      </p:sp>
+      <p:sp>
+        <p:nvSpPr>
+          <p:cNvPr id="7" name="Espaço Reservado para Número de Slide 6"/>
+          <p:cNvSpPr>
+            <a:spLocks noGrp="1"/>
+          </p:cNvSpPr>
+          <p:nvPr>
+            <p:ph type="sldNum" sz="quarter" idx="12"/>
+          </p:nvPr>
+        </p:nvSpPr>
+        <p:spPr/>
+        <p:txBody>
+          <a:bodyPr/>
+          <a:lstStyle/>
+          <a:p>
+            <a:fld id="{516476CB-12D4-456A-BCEE-8469A8C40045}" type="slidenum">
+              <a:rPr lang="pt-BR" smtClean="0"/>
+              <a:pPr/>
+              <a:t>8</a:t>
+            </a:fld>
             <a:endParaRPr lang="pt-BR" dirty="0"/>
           </a:p>
         </p:txBody>
@@ -5512,6 +7720,216 @@
           </a:p>
         </p:txBody>
       </p:sp>
+      <p:pic>
+        <p:nvPicPr>
+          <p:cNvPr id="9" name="Imagem 8"/>
+          <p:cNvPicPr/>
+          <p:nvPr/>
+        </p:nvPicPr>
+        <p:blipFill>
+          <a:blip r:embed="rId2" cstate="print">
+            <a:extLst>
+              <a:ext uri="{28A0092B-C50C-407E-A947-70E740481C1C}">
+                <a14:useLocalDpi xmlns:ve="http://schemas.openxmlformats.org/markup-compatibility/2006" xmlns:m="http://schemas.openxmlformats.org/officeDocument/2006/math" xmlns:wp="http://schemas.openxmlformats.org/drawingml/2006/wordprocessingDrawing" xmlns:wne="http://schemas.microsoft.com/office/word/2006/wordml" xmlns="" xmlns:wpc="http://schemas.microsoft.com/office/word/2010/wordprocessingCanvas" xmlns:mc="http://schemas.openxmlformats.org/markup-compatibility/2006" xmlns:o="urn:schemas-microsoft-com:office:office" xmlns:v="urn:schemas-microsoft-com:vml" xmlns:wp14="http://schemas.microsoft.com/office/word/2010/wordprocessingDrawing" xmlns:w10="urn:schemas-microsoft-com:office:word" xmlns:w="http://schemas.openxmlformats.org/wordprocessingml/2006/main" xmlns:w14="http://schemas.microsoft.com/office/word/2010/wordml" xmlns:w15="http://schemas.microsoft.com/office/word/2012/wordml" xmlns:wpg="http://schemas.microsoft.com/office/word/2010/wordprocessingGroup" xmlns:wpi="http://schemas.microsoft.com/office/word/2010/wordprocessingInk" xmlns:wps="http://schemas.microsoft.com/office/word/2010/wordprocessingShape" xmlns:a14="http://schemas.microsoft.com/office/drawing/2010/main" xmlns:pic="http://schemas.openxmlformats.org/drawingml/2006/picture" xmlns:lc="http://schemas.openxmlformats.org/drawingml/2006/lockedCanvas" val="0"/>
+              </a:ext>
+            </a:extLst>
+          </a:blip>
+          <a:stretch>
+            <a:fillRect/>
+          </a:stretch>
+        </p:blipFill>
+        <p:spPr>
+          <a:xfrm>
+            <a:off x="2555776" y="1628800"/>
+            <a:ext cx="5832648" cy="4606037"/>
+          </a:xfrm>
+          <a:prstGeom prst="rect">
+            <a:avLst/>
+          </a:prstGeom>
+        </p:spPr>
+      </p:pic>
+    </p:spTree>
+  </p:cSld>
+  <p:clrMapOvr>
+    <a:masterClrMapping/>
+  </p:clrMapOvr>
+  <p:transition spd="med">
+    <p:fade/>
+  </p:transition>
+  <p:timing>
+    <p:tnLst>
+      <p:par>
+        <p:cTn id="1" dur="indefinite" restart="never" nodeType="tmRoot"/>
+      </p:par>
+    </p:tnLst>
+  </p:timing>
+</p:sld>
+</file>
+
+<file path=ppt/slides/slide9.xml><?xml version="1.0" encoding="utf-8"?>
+<p:sld xmlns:a="http://schemas.openxmlformats.org/drawingml/2006/main" xmlns:r="http://schemas.openxmlformats.org/officeDocument/2006/relationships" xmlns:p="http://schemas.openxmlformats.org/presentationml/2006/main">
+  <p:cSld>
+    <p:spTree>
+      <p:nvGrpSpPr>
+        <p:cNvPr id="1" name=""/>
+        <p:cNvGrpSpPr/>
+        <p:nvPr/>
+      </p:nvGrpSpPr>
+      <p:grpSpPr>
+        <a:xfrm>
+          <a:off x="0" y="0"/>
+          <a:ext cx="0" cy="0"/>
+          <a:chOff x="0" y="0"/>
+          <a:chExt cx="0" cy="0"/>
+        </a:xfrm>
+      </p:grpSpPr>
+      <p:sp>
+        <p:nvSpPr>
+          <p:cNvPr id="19458" name="Rectangle 2"/>
+          <p:cNvSpPr>
+            <a:spLocks noGrp="1" noChangeArrowheads="1"/>
+          </p:cNvSpPr>
+          <p:nvPr>
+            <p:ph type="title"/>
+          </p:nvPr>
+        </p:nvSpPr>
+        <p:spPr/>
+        <p:txBody>
+          <a:bodyPr/>
+          <a:lstStyle/>
+          <a:p>
+            <a:r>
+              <a:rPr lang="pt-BR" dirty="0" smtClean="0"/>
+              <a:t>Diagrama Caso Uso</a:t>
+            </a:r>
+            <a:endParaRPr lang="pt-BR" dirty="0"/>
+          </a:p>
+        </p:txBody>
+      </p:sp>
+      <p:sp>
+        <p:nvSpPr>
+          <p:cNvPr id="19459" name="Rectangle 3"/>
+          <p:cNvSpPr>
+            <a:spLocks noGrp="1" noChangeArrowheads="1"/>
+          </p:cNvSpPr>
+          <p:nvPr>
+            <p:ph type="body" idx="1"/>
+          </p:nvPr>
+        </p:nvSpPr>
+        <p:spPr/>
+        <p:txBody>
+          <a:bodyPr/>
+          <a:lstStyle/>
+          <a:p>
+            <a:r>
+              <a:rPr lang="en-US" dirty="0" err="1" smtClean="0"/>
+              <a:t>Gestor</a:t>
+            </a:r>
+            <a:endParaRPr lang="pt-BR" dirty="0"/>
+          </a:p>
+        </p:txBody>
+      </p:sp>
+      <p:sp>
+        <p:nvSpPr>
+          <p:cNvPr id="6" name="Espaço Reservado para Data 5"/>
+          <p:cNvSpPr>
+            <a:spLocks noGrp="1"/>
+          </p:cNvSpPr>
+          <p:nvPr>
+            <p:ph type="dt" sz="half" idx="10"/>
+          </p:nvPr>
+        </p:nvSpPr>
+        <p:spPr/>
+        <p:txBody>
+          <a:bodyPr/>
+          <a:lstStyle/>
+          <a:p>
+            <a:r>
+              <a:rPr lang="pt-BR" dirty="0"/>
+              <a:t>26/09/204</a:t>
+            </a:r>
+          </a:p>
+        </p:txBody>
+      </p:sp>
+      <p:sp>
+        <p:nvSpPr>
+          <p:cNvPr id="7" name="Espaço Reservado para Número de Slide 6"/>
+          <p:cNvSpPr>
+            <a:spLocks noGrp="1"/>
+          </p:cNvSpPr>
+          <p:nvPr>
+            <p:ph type="sldNum" sz="quarter" idx="12"/>
+          </p:nvPr>
+        </p:nvSpPr>
+        <p:spPr/>
+        <p:txBody>
+          <a:bodyPr/>
+          <a:lstStyle/>
+          <a:p>
+            <a:fld id="{516476CB-12D4-456A-BCEE-8469A8C40045}" type="slidenum">
+              <a:rPr lang="pt-BR" smtClean="0"/>
+              <a:pPr/>
+              <a:t>9</a:t>
+            </a:fld>
+            <a:endParaRPr lang="pt-BR" dirty="0"/>
+          </a:p>
+        </p:txBody>
+      </p:sp>
+      <p:sp>
+        <p:nvSpPr>
+          <p:cNvPr id="8" name="Espaço Reservado para Rodapé 7"/>
+          <p:cNvSpPr>
+            <a:spLocks noGrp="1"/>
+          </p:cNvSpPr>
+          <p:nvPr>
+            <p:ph type="ftr" sz="quarter" idx="11"/>
+          </p:nvPr>
+        </p:nvSpPr>
+        <p:spPr/>
+        <p:txBody>
+          <a:bodyPr/>
+          <a:lstStyle/>
+          <a:p>
+            <a:r>
+              <a:rPr lang="pt-BR" dirty="0" err="1" smtClean="0"/>
+              <a:t>Veris</a:t>
+            </a:r>
+            <a:r>
+              <a:rPr lang="pt-BR" dirty="0" smtClean="0"/>
+              <a:t> Faculdades TCM/3ADS</a:t>
+            </a:r>
+            <a:endParaRPr lang="pt-BR" dirty="0"/>
+          </a:p>
+        </p:txBody>
+      </p:sp>
+      <p:pic>
+        <p:nvPicPr>
+          <p:cNvPr id="10" name="Imagem 9"/>
+          <p:cNvPicPr/>
+          <p:nvPr/>
+        </p:nvPicPr>
+        <p:blipFill>
+          <a:blip r:embed="rId2" cstate="print">
+            <a:extLst>
+              <a:ext uri="{28A0092B-C50C-407E-A947-70E740481C1C}">
+                <a14:useLocalDpi xmlns:ve="http://schemas.openxmlformats.org/markup-compatibility/2006" xmlns:m="http://schemas.openxmlformats.org/officeDocument/2006/math" xmlns:wp="http://schemas.openxmlformats.org/drawingml/2006/wordprocessingDrawing" xmlns:wne="http://schemas.microsoft.com/office/word/2006/wordml" xmlns="" xmlns:wpc="http://schemas.microsoft.com/office/word/2010/wordprocessingCanvas" xmlns:mc="http://schemas.openxmlformats.org/markup-compatibility/2006" xmlns:o="urn:schemas-microsoft-com:office:office" xmlns:v="urn:schemas-microsoft-com:vml" xmlns:wp14="http://schemas.microsoft.com/office/word/2010/wordprocessingDrawing" xmlns:w10="urn:schemas-microsoft-com:office:word" xmlns:w="http://schemas.openxmlformats.org/wordprocessingml/2006/main" xmlns:w14="http://schemas.microsoft.com/office/word/2010/wordml" xmlns:w15="http://schemas.microsoft.com/office/word/2012/wordml" xmlns:wpg="http://schemas.microsoft.com/office/word/2010/wordprocessingGroup" xmlns:wpi="http://schemas.microsoft.com/office/word/2010/wordprocessingInk" xmlns:wps="http://schemas.microsoft.com/office/word/2010/wordprocessingShape" xmlns:a14="http://schemas.microsoft.com/office/drawing/2010/main" xmlns:pic="http://schemas.openxmlformats.org/drawingml/2006/picture" xmlns:lc="http://schemas.openxmlformats.org/drawingml/2006/lockedCanvas" val="0"/>
+              </a:ext>
+            </a:extLst>
+          </a:blip>
+          <a:stretch>
+            <a:fillRect/>
+          </a:stretch>
+        </p:blipFill>
+        <p:spPr>
+          <a:xfrm>
+            <a:off x="2825923" y="476672"/>
+            <a:ext cx="5850533" cy="5650265"/>
+          </a:xfrm>
+          <a:prstGeom prst="rect">
+            <a:avLst/>
+          </a:prstGeom>
+        </p:spPr>
+      </p:pic>
     </p:spTree>
   </p:cSld>
   <p:clrMapOvr>

</xml_diff>

<commit_message>
Atualização do documento da apresentação.
</commit_message>
<xml_diff>
--- a/documentacao/G5_Apresentacao2sem2014.pptx
+++ b/documentacao/G5_Apresentacao2sem2014.pptx
@@ -238,7 +238,7 @@
             <a:fld id="{387DC7E4-63C1-42C9-AC56-2D8DD4349572}" type="datetimeFigureOut">
               <a:rPr lang="pt-BR" smtClean="0"/>
               <a:pPr/>
-              <a:t>27/9/2014</a:t>
+              <a:t>28/09/2014</a:t>
             </a:fld>
             <a:endParaRPr lang="pt-BR" dirty="0"/>
           </a:p>
@@ -314,7 +314,7 @@
     </p:spTree>
     <p:extLst>
       <p:ext uri="{BB962C8B-B14F-4D97-AF65-F5344CB8AC3E}">
-        <p14:creationId xmlns="" xmlns:p14="http://schemas.microsoft.com/office/powerpoint/2010/main" val="3690707936"/>
+        <p14:creationId xmlns:p14="http://schemas.microsoft.com/office/powerpoint/2010/main" xmlns="" val="3690707936"/>
       </p:ext>
     </p:extLst>
   </p:cSld>
@@ -628,7 +628,7 @@
     </p:spTree>
     <p:extLst>
       <p:ext uri="{BB962C8B-B14F-4D97-AF65-F5344CB8AC3E}">
-        <p14:creationId xmlns="" xmlns:p14="http://schemas.microsoft.com/office/powerpoint/2010/main" val="753547333"/>
+        <p14:creationId xmlns:p14="http://schemas.microsoft.com/office/powerpoint/2010/main" xmlns="" val="753547333"/>
       </p:ext>
     </p:extLst>
   </p:cSld>
@@ -4919,7 +4919,7 @@
           <a:p>
             <a:r>
               <a:rPr lang="pt-BR" dirty="0" smtClean="0"/>
-              <a:t>26/09/204</a:t>
+              <a:t>29/09/2014</a:t>
             </a:r>
             <a:endParaRPr lang="pt-BR" dirty="0"/>
           </a:p>
@@ -4966,13 +4966,14 @@
           <a:p>
             <a:r>
               <a:rPr lang="pt-BR" dirty="0" smtClean="0"/>
-              <a:t>IBTA Faculdades</a:t>
-            </a:r>
-          </a:p>
-          <a:p>
-            <a:r>
-              <a:rPr lang="pt-BR" dirty="0" smtClean="0"/>
-              <a:t>TCM/3ADS</a:t>
+              <a:t>Faculdade Metrocamp</a:t>
+            </a:r>
+            <a:endParaRPr lang="pt-BR" dirty="0" smtClean="0"/>
+          </a:p>
+          <a:p>
+            <a:r>
+              <a:rPr lang="pt-BR" dirty="0" smtClean="0"/>
+              <a:t>TCM/4ADS</a:t>
             </a:r>
             <a:endParaRPr lang="pt-BR" dirty="0"/>
           </a:p>
@@ -5023,7 +5024,12 @@
             <p:ph type="title"/>
           </p:nvPr>
         </p:nvSpPr>
-        <p:spPr/>
+        <p:spPr>
+          <a:xfrm>
+            <a:off x="457200" y="277813"/>
+            <a:ext cx="8229600" cy="579419"/>
+          </a:xfrm>
+        </p:spPr>
         <p:txBody>
           <a:bodyPr/>
           <a:lstStyle/>
@@ -5075,9 +5081,10 @@
           <a:lstStyle/>
           <a:p>
             <a:r>
-              <a:rPr lang="pt-BR" dirty="0"/>
-              <a:t>26/09/204</a:t>
-            </a:r>
+              <a:rPr lang="pt-BR" dirty="0" smtClean="0"/>
+              <a:t>29/09/2014</a:t>
+            </a:r>
+            <a:endParaRPr lang="pt-BR" dirty="0"/>
           </a:p>
         </p:txBody>
       </p:sp>
@@ -5122,38 +5129,51 @@
           <a:p>
             <a:r>
               <a:rPr lang="pt-BR" dirty="0" smtClean="0"/>
-              <a:t>Veris Faculdades TCM/3ADS</a:t>
-            </a:r>
+              <a:t>Faculdade Metrocamp</a:t>
+            </a:r>
+          </a:p>
+          <a:p>
+            <a:r>
+              <a:rPr lang="pt-BR" dirty="0" smtClean="0"/>
+              <a:t>TCM/4ADS</a:t>
+            </a:r>
+          </a:p>
+          <a:p>
             <a:endParaRPr lang="pt-BR" dirty="0"/>
           </a:p>
         </p:txBody>
       </p:sp>
       <p:pic>
         <p:nvPicPr>
-          <p:cNvPr id="9" name="Imagem 8"/>
-          <p:cNvPicPr/>
+          <p:cNvPr id="2050" name="Picture 2"/>
+          <p:cNvPicPr>
+            <a:picLocks noChangeAspect="1" noChangeArrowheads="1"/>
+          </p:cNvPicPr>
           <p:nvPr/>
         </p:nvPicPr>
         <p:blipFill>
-          <a:blip r:embed="rId2" cstate="print">
-            <a:extLst>
-              <a:ext uri="{28A0092B-C50C-407E-A947-70E740481C1C}">
-                <a14:useLocalDpi xmlns:lc="http://schemas.openxmlformats.org/drawingml/2006/lockedCanvas" xmlns:pic="http://schemas.openxmlformats.org/drawingml/2006/picture" xmlns:a14="http://schemas.microsoft.com/office/drawing/2010/main" xmlns:wps="http://schemas.microsoft.com/office/word/2010/wordprocessingShape" xmlns:wpi="http://schemas.microsoft.com/office/word/2010/wordprocessingInk" xmlns:wpg="http://schemas.microsoft.com/office/word/2010/wordprocessingGroup" xmlns:w15="http://schemas.microsoft.com/office/word/2012/wordml" xmlns:w14="http://schemas.microsoft.com/office/word/2010/wordml" xmlns:w="http://schemas.openxmlformats.org/wordprocessingml/2006/main" xmlns:w10="urn:schemas-microsoft-com:office:word" xmlns:wp14="http://schemas.microsoft.com/office/word/2010/wordprocessingDrawing" xmlns:v="urn:schemas-microsoft-com:vml" xmlns:o="urn:schemas-microsoft-com:office:office" xmlns:mc="http://schemas.openxmlformats.org/markup-compatibility/2006" xmlns:wpc="http://schemas.microsoft.com/office/word/2010/wordprocessingCanvas" xmlns="" xmlns:wne="http://schemas.microsoft.com/office/word/2006/wordml" xmlns:wp="http://schemas.openxmlformats.org/drawingml/2006/wordprocessingDrawing" xmlns:m="http://schemas.openxmlformats.org/officeDocument/2006/math" xmlns:ve="http://schemas.openxmlformats.org/markup-compatibility/2006" val="0"/>
-              </a:ext>
-            </a:extLst>
-          </a:blip>
+          <a:blip r:embed="rId2"/>
+          <a:srcRect/>
           <a:stretch>
             <a:fillRect/>
           </a:stretch>
         </p:blipFill>
-        <p:spPr>
+        <p:spPr bwMode="auto">
           <a:xfrm>
-            <a:off x="2771800" y="548680"/>
-            <a:ext cx="6048672" cy="5832647"/>
+            <a:off x="2928926" y="857232"/>
+            <a:ext cx="5610225" cy="5229225"/>
           </a:xfrm>
           <a:prstGeom prst="rect">
             <a:avLst/>
           </a:prstGeom>
+          <a:noFill/>
+          <a:ln w="9525">
+            <a:noFill/>
+            <a:miter lim="800000"/>
+            <a:headEnd/>
+            <a:tailEnd/>
+          </a:ln>
+          <a:effectLst/>
         </p:spPr>
       </p:pic>
     </p:spTree>
@@ -5201,7 +5221,12 @@
             <p:ph type="title"/>
           </p:nvPr>
         </p:nvSpPr>
-        <p:spPr/>
+        <p:spPr>
+          <a:xfrm>
+            <a:off x="457200" y="277813"/>
+            <a:ext cx="8229600" cy="579419"/>
+          </a:xfrm>
+        </p:spPr>
         <p:txBody>
           <a:bodyPr/>
           <a:lstStyle/>
@@ -5253,9 +5278,10 @@
           <a:lstStyle/>
           <a:p>
             <a:r>
-              <a:rPr lang="pt-BR" dirty="0"/>
-              <a:t>26/09/204</a:t>
-            </a:r>
+              <a:rPr lang="pt-BR" dirty="0" smtClean="0"/>
+              <a:t>29/09/2014</a:t>
+            </a:r>
+            <a:endParaRPr lang="pt-BR" dirty="0"/>
           </a:p>
         </p:txBody>
       </p:sp>
@@ -5300,38 +5326,54 @@
           <a:p>
             <a:r>
               <a:rPr lang="pt-BR" dirty="0" smtClean="0"/>
-              <a:t>Veris Faculdades TCM/3ADS</a:t>
-            </a:r>
+              <a:t>Faculdade Metrocamp</a:t>
+            </a:r>
+          </a:p>
+          <a:p>
+            <a:r>
+              <a:rPr lang="pt-BR" dirty="0" smtClean="0"/>
+              <a:t>TCM/4ADS</a:t>
+            </a:r>
+          </a:p>
+          <a:p>
+            <a:endParaRPr lang="pt-BR" dirty="0" smtClean="0"/>
+          </a:p>
+          <a:p>
             <a:endParaRPr lang="pt-BR" dirty="0"/>
           </a:p>
         </p:txBody>
       </p:sp>
       <p:pic>
         <p:nvPicPr>
-          <p:cNvPr id="9" name="Imagem 8"/>
-          <p:cNvPicPr/>
+          <p:cNvPr id="3074" name="Picture 2"/>
+          <p:cNvPicPr>
+            <a:picLocks noChangeAspect="1" noChangeArrowheads="1"/>
+          </p:cNvPicPr>
           <p:nvPr/>
         </p:nvPicPr>
         <p:blipFill>
-          <a:blip r:embed="rId2" cstate="print">
-            <a:extLst>
-              <a:ext uri="{28A0092B-C50C-407E-A947-70E740481C1C}">
-                <a14:useLocalDpi xmlns:lc="http://schemas.openxmlformats.org/drawingml/2006/lockedCanvas" xmlns:pic="http://schemas.openxmlformats.org/drawingml/2006/picture" xmlns:a14="http://schemas.microsoft.com/office/drawing/2010/main" xmlns:wps="http://schemas.microsoft.com/office/word/2010/wordprocessingShape" xmlns:wpi="http://schemas.microsoft.com/office/word/2010/wordprocessingInk" xmlns:wpg="http://schemas.microsoft.com/office/word/2010/wordprocessingGroup" xmlns:w15="http://schemas.microsoft.com/office/word/2012/wordml" xmlns:w14="http://schemas.microsoft.com/office/word/2010/wordml" xmlns:w="http://schemas.openxmlformats.org/wordprocessingml/2006/main" xmlns:w10="urn:schemas-microsoft-com:office:word" xmlns:wp14="http://schemas.microsoft.com/office/word/2010/wordprocessingDrawing" xmlns:v="urn:schemas-microsoft-com:vml" xmlns:o="urn:schemas-microsoft-com:office:office" xmlns:mc="http://schemas.openxmlformats.org/markup-compatibility/2006" xmlns:wpc="http://schemas.microsoft.com/office/word/2010/wordprocessingCanvas" xmlns="" xmlns:wne="http://schemas.microsoft.com/office/word/2006/wordml" xmlns:wp="http://schemas.openxmlformats.org/drawingml/2006/wordprocessingDrawing" xmlns:m="http://schemas.openxmlformats.org/officeDocument/2006/math" xmlns:ve="http://schemas.openxmlformats.org/markup-compatibility/2006" val="0"/>
-              </a:ext>
-            </a:extLst>
-          </a:blip>
+          <a:blip r:embed="rId2"/>
+          <a:srcRect/>
           <a:stretch>
             <a:fillRect/>
           </a:stretch>
         </p:blipFill>
-        <p:spPr>
+        <p:spPr bwMode="auto">
           <a:xfrm>
-            <a:off x="2771800" y="476672"/>
-            <a:ext cx="5976664" cy="6120680"/>
+            <a:off x="4000496" y="857232"/>
+            <a:ext cx="4533900" cy="5086350"/>
           </a:xfrm>
           <a:prstGeom prst="rect">
             <a:avLst/>
           </a:prstGeom>
+          <a:noFill/>
+          <a:ln w="9525">
+            <a:noFill/>
+            <a:miter lim="800000"/>
+            <a:headEnd/>
+            <a:tailEnd/>
+          </a:ln>
+          <a:effectLst/>
         </p:spPr>
       </p:pic>
     </p:spTree>
@@ -5431,9 +5473,10 @@
           <a:lstStyle/>
           <a:p>
             <a:r>
-              <a:rPr lang="pt-BR" dirty="0"/>
-              <a:t>26/09/204</a:t>
-            </a:r>
+              <a:rPr lang="pt-BR" dirty="0" smtClean="0"/>
+              <a:t>29/09/2014</a:t>
+            </a:r>
+            <a:endParaRPr lang="pt-BR" dirty="0"/>
           </a:p>
         </p:txBody>
       </p:sp>
@@ -5478,8 +5521,16 @@
           <a:p>
             <a:r>
               <a:rPr lang="pt-BR" dirty="0" smtClean="0"/>
-              <a:t>Veris Faculdades TCM/3ADS</a:t>
-            </a:r>
+              <a:t>Faculdade Metrocamp</a:t>
+            </a:r>
+          </a:p>
+          <a:p>
+            <a:r>
+              <a:rPr lang="pt-BR" dirty="0" smtClean="0"/>
+              <a:t>TCM/4ADS</a:t>
+            </a:r>
+          </a:p>
+          <a:p>
             <a:endParaRPr lang="pt-BR" dirty="0"/>
           </a:p>
         </p:txBody>
@@ -5494,7 +5545,7 @@
           <a:blip r:embed="rId2" cstate="print">
             <a:extLst>
               <a:ext uri="{28A0092B-C50C-407E-A947-70E740481C1C}">
-                <a14:useLocalDpi xmlns:lc="http://schemas.openxmlformats.org/drawingml/2006/lockedCanvas" xmlns:pic="http://schemas.openxmlformats.org/drawingml/2006/picture" xmlns:a14="http://schemas.microsoft.com/office/drawing/2010/main" xmlns:wps="http://schemas.microsoft.com/office/word/2010/wordprocessingShape" xmlns:wpi="http://schemas.microsoft.com/office/word/2010/wordprocessingInk" xmlns:wpg="http://schemas.microsoft.com/office/word/2010/wordprocessingGroup" xmlns:w15="http://schemas.microsoft.com/office/word/2012/wordml" xmlns:w14="http://schemas.microsoft.com/office/word/2010/wordml" xmlns:w="http://schemas.openxmlformats.org/wordprocessingml/2006/main" xmlns:w10="urn:schemas-microsoft-com:office:word" xmlns:wp14="http://schemas.microsoft.com/office/word/2010/wordprocessingDrawing" xmlns:v="urn:schemas-microsoft-com:vml" xmlns:o="urn:schemas-microsoft-com:office:office" xmlns:mc="http://schemas.openxmlformats.org/markup-compatibility/2006" xmlns:wpc="http://schemas.microsoft.com/office/word/2010/wordprocessingCanvas" xmlns="" xmlns:wne="http://schemas.microsoft.com/office/word/2006/wordml" xmlns:wp="http://schemas.openxmlformats.org/drawingml/2006/wordprocessingDrawing" xmlns:m="http://schemas.openxmlformats.org/officeDocument/2006/math" xmlns:ve="http://schemas.openxmlformats.org/markup-compatibility/2006" val="0"/>
+                <a14:useLocalDpi xmlns:ve="http://schemas.openxmlformats.org/markup-compatibility/2006" xmlns:m="http://schemas.openxmlformats.org/officeDocument/2006/math" xmlns:wp="http://schemas.openxmlformats.org/drawingml/2006/wordprocessingDrawing" xmlns:wne="http://schemas.microsoft.com/office/word/2006/wordml" xmlns="" xmlns:wpc="http://schemas.microsoft.com/office/word/2010/wordprocessingCanvas" xmlns:mc="http://schemas.openxmlformats.org/markup-compatibility/2006" xmlns:o="urn:schemas-microsoft-com:office:office" xmlns:v="urn:schemas-microsoft-com:vml" xmlns:wp14="http://schemas.microsoft.com/office/word/2010/wordprocessingDrawing" xmlns:w10="urn:schemas-microsoft-com:office:word" xmlns:w="http://schemas.openxmlformats.org/wordprocessingml/2006/main" xmlns:w14="http://schemas.microsoft.com/office/word/2010/wordml" xmlns:w15="http://schemas.microsoft.com/office/word/2012/wordml" xmlns:wpg="http://schemas.microsoft.com/office/word/2010/wordprocessingGroup" xmlns:wpi="http://schemas.microsoft.com/office/word/2010/wordprocessingInk" xmlns:wps="http://schemas.microsoft.com/office/word/2010/wordprocessingShape" xmlns:a14="http://schemas.microsoft.com/office/drawing/2010/main" xmlns:pic="http://schemas.openxmlformats.org/drawingml/2006/picture" xmlns:lc="http://schemas.openxmlformats.org/drawingml/2006/lockedCanvas" val="0"/>
               </a:ext>
             </a:extLst>
           </a:blip>
@@ -5504,7 +5555,7 @@
         </p:blipFill>
         <p:spPr>
           <a:xfrm>
-            <a:off x="1547664" y="2132856"/>
+            <a:off x="2214546" y="2000240"/>
             <a:ext cx="5940425" cy="4320480"/>
           </a:xfrm>
           <a:prstGeom prst="rect">
@@ -5587,50 +5638,13 @@
           <a:p>
             <a:r>
               <a:rPr lang="pt-BR" dirty="0" smtClean="0"/>
-              <a:t>O Gaed dever ser um sistema que  facilite e estimule a comunicação </a:t>
-            </a:r>
-            <a:r>
-              <a:rPr lang="pt-BR" dirty="0" smtClean="0"/>
-              <a:t>entre a </a:t>
-            </a:r>
-            <a:r>
-              <a:rPr lang="pt-BR" dirty="0" smtClean="0"/>
-              <a:t>escola, os alunos e seus responsáveis</a:t>
-            </a:r>
-            <a:endParaRPr lang="pt-BR" dirty="0" smtClean="0"/>
+              <a:t>O Gaed dever ser um sistema que  facilite e estimule a comunicação entre a escola, os alunos e seus responsáveis</a:t>
+            </a:r>
           </a:p>
           <a:p>
             <a:r>
               <a:rPr lang="en-US" dirty="0" smtClean="0"/>
-              <a:t>Estimule</a:t>
-            </a:r>
-            <a:r>
-              <a:rPr lang="en-US" dirty="0" smtClean="0"/>
-              <a:t> </a:t>
-            </a:r>
-            <a:r>
-              <a:rPr lang="en-US" dirty="0" smtClean="0"/>
-              <a:t>a organização dos alu</a:t>
-            </a:r>
-            <a:r>
-              <a:rPr lang="en-US" dirty="0" smtClean="0"/>
-              <a:t>nos </a:t>
-            </a:r>
-            <a:r>
-              <a:rPr lang="en-US" dirty="0" smtClean="0"/>
-              <a:t>com </a:t>
-            </a:r>
-            <a:r>
-              <a:rPr lang="en-US" dirty="0" smtClean="0"/>
-              <a:t>tarefas </a:t>
-            </a:r>
-            <a:r>
-              <a:rPr lang="en-US" dirty="0" smtClean="0"/>
-              <a:t>e </a:t>
-            </a:r>
-            <a:r>
-              <a:rPr lang="en-US" dirty="0" smtClean="0"/>
-              <a:t>trabalhos para entrega nos prazos.</a:t>
+              <a:t>Estimule a organização dos alunos com tarefas e trabalhos para entrega nos prazos.</a:t>
             </a:r>
           </a:p>
           <a:p>
@@ -5638,7 +5652,6 @@
               <a:rPr lang="en-US" dirty="0" smtClean="0"/>
               <a:t>O sistema mantém registro das interações, possibilidade de análise gerais desses dados.</a:t>
             </a:r>
-            <a:endParaRPr lang="en-US" dirty="0" smtClean="0"/>
           </a:p>
           <a:p>
             <a:r>
@@ -5664,9 +5677,10 @@
           <a:lstStyle/>
           <a:p>
             <a:r>
-              <a:rPr lang="pt-BR" dirty="0"/>
-              <a:t>26/09/204</a:t>
-            </a:r>
+              <a:rPr lang="pt-BR" dirty="0" smtClean="0"/>
+              <a:t>29/09/204</a:t>
+            </a:r>
+            <a:endParaRPr lang="pt-BR" dirty="0"/>
           </a:p>
         </p:txBody>
       </p:sp>
@@ -5711,8 +5725,16 @@
           <a:p>
             <a:r>
               <a:rPr lang="pt-BR" dirty="0" smtClean="0"/>
-              <a:t>Veris Faculdades TCM/3ADS</a:t>
-            </a:r>
+              <a:t>Faculdade Metrocamp</a:t>
+            </a:r>
+          </a:p>
+          <a:p>
+            <a:r>
+              <a:rPr lang="pt-BR" dirty="0" smtClean="0"/>
+              <a:t>TCM/4ADS</a:t>
+            </a:r>
+          </a:p>
+          <a:p>
             <a:endParaRPr lang="pt-BR" dirty="0"/>
           </a:p>
         </p:txBody>
@@ -5828,9 +5850,12 @@
           <a:lstStyle/>
           <a:p>
             <a:r>
-              <a:rPr lang="pt-BR" dirty="0"/>
-              <a:t>26/09/204</a:t>
-            </a:r>
+              <a:rPr lang="pt-BR" dirty="0" smtClean="0"/>
+              <a:t>29/09/2014</a:t>
+            </a:r>
+          </a:p>
+          <a:p>
+            <a:endParaRPr lang="pt-BR" dirty="0"/>
           </a:p>
         </p:txBody>
       </p:sp>
@@ -5875,8 +5900,16 @@
           <a:p>
             <a:r>
               <a:rPr lang="pt-BR" dirty="0" smtClean="0"/>
-              <a:t>IBTAFaculdades TCM/3ADS</a:t>
-            </a:r>
+              <a:t>Faculdade Metrocamp</a:t>
+            </a:r>
+          </a:p>
+          <a:p>
+            <a:r>
+              <a:rPr lang="pt-BR" dirty="0" smtClean="0"/>
+              <a:t>TCM/4ADS</a:t>
+            </a:r>
+          </a:p>
+          <a:p>
             <a:endParaRPr lang="pt-BR" dirty="0"/>
           </a:p>
         </p:txBody>
@@ -6015,9 +6048,10 @@
           <a:lstStyle/>
           <a:p>
             <a:r>
-              <a:rPr lang="pt-BR" dirty="0"/>
-              <a:t>26/09/204</a:t>
-            </a:r>
+              <a:rPr lang="pt-BR" dirty="0" smtClean="0"/>
+              <a:t>29/09/2014</a:t>
+            </a:r>
+            <a:endParaRPr lang="pt-BR" dirty="0"/>
           </a:p>
         </p:txBody>
       </p:sp>
@@ -6062,8 +6096,16 @@
           <a:p>
             <a:r>
               <a:rPr lang="pt-BR" dirty="0" smtClean="0"/>
-              <a:t>IBTAFaculdades TCM/3ADS</a:t>
-            </a:r>
+              <a:t>Faculdade Metrocamp</a:t>
+            </a:r>
+          </a:p>
+          <a:p>
+            <a:r>
+              <a:rPr lang="pt-BR" dirty="0" smtClean="0"/>
+              <a:t>TCM/4ADS</a:t>
+            </a:r>
+          </a:p>
+          <a:p>
             <a:endParaRPr lang="pt-BR" dirty="0"/>
           </a:p>
         </p:txBody>
@@ -6224,9 +6266,10 @@
           <a:lstStyle/>
           <a:p>
             <a:r>
-              <a:rPr lang="pt-BR" dirty="0"/>
-              <a:t>26/09/204</a:t>
-            </a:r>
+              <a:rPr lang="pt-BR" dirty="0" smtClean="0"/>
+              <a:t>29/09/2014</a:t>
+            </a:r>
+            <a:endParaRPr lang="pt-BR" dirty="0"/>
           </a:p>
         </p:txBody>
       </p:sp>
@@ -6271,8 +6314,16 @@
           <a:p>
             <a:r>
               <a:rPr lang="pt-BR" dirty="0" smtClean="0"/>
-              <a:t>IBTAFaculdades TCM/3ADS</a:t>
-            </a:r>
+              <a:t>Faculdade Metrocamp</a:t>
+            </a:r>
+          </a:p>
+          <a:p>
+            <a:r>
+              <a:rPr lang="pt-BR" dirty="0" smtClean="0"/>
+              <a:t>TCM/4ADS</a:t>
+            </a:r>
+          </a:p>
+          <a:p>
             <a:endParaRPr lang="pt-BR" dirty="0"/>
           </a:p>
         </p:txBody>
@@ -6396,15 +6447,7 @@
             </a:pPr>
             <a:r>
               <a:rPr lang="en-US" dirty="0" smtClean="0"/>
-              <a:t>- </a:t>
-            </a:r>
-            <a:r>
-              <a:rPr lang="en-US" dirty="0" smtClean="0"/>
-              <a:t>Ministrar </a:t>
-            </a:r>
-            <a:r>
-              <a:rPr lang="en-US" dirty="0" smtClean="0"/>
-              <a:t>aulas </a:t>
+              <a:t>- Ministrar aulas </a:t>
             </a:r>
           </a:p>
           <a:p>
@@ -6413,15 +6456,7 @@
             </a:pPr>
             <a:r>
               <a:rPr lang="en-US" dirty="0" smtClean="0"/>
-              <a:t>- </a:t>
-            </a:r>
-            <a:r>
-              <a:rPr lang="en-US" dirty="0" smtClean="0"/>
-              <a:t>Acompanhar </a:t>
-            </a:r>
-            <a:r>
-              <a:rPr lang="en-US" dirty="0" smtClean="0"/>
-              <a:t>a aprendizagem individual do aluno</a:t>
+              <a:t>- Acompanhar a aprendizagem individual do aluno</a:t>
             </a:r>
             <a:endParaRPr lang="pt-BR" dirty="0" smtClean="0"/>
           </a:p>
@@ -6453,9 +6488,10 @@
           <a:lstStyle/>
           <a:p>
             <a:r>
-              <a:rPr lang="pt-BR" dirty="0"/>
-              <a:t>26/09/204</a:t>
-            </a:r>
+              <a:rPr lang="pt-BR" dirty="0" smtClean="0"/>
+              <a:t>29/09/2014</a:t>
+            </a:r>
+            <a:endParaRPr lang="pt-BR" dirty="0"/>
           </a:p>
         </p:txBody>
       </p:sp>
@@ -6500,8 +6536,16 @@
           <a:p>
             <a:r>
               <a:rPr lang="pt-BR" dirty="0" smtClean="0"/>
-              <a:t>IBTAFaculdades TCM/3ADS</a:t>
-            </a:r>
+              <a:t>Faculdade Metrocamp</a:t>
+            </a:r>
+          </a:p>
+          <a:p>
+            <a:r>
+              <a:rPr lang="pt-BR" dirty="0" smtClean="0"/>
+              <a:t>TCM/4ADS</a:t>
+            </a:r>
+          </a:p>
+          <a:p>
             <a:endParaRPr lang="pt-BR" dirty="0"/>
           </a:p>
         </p:txBody>
@@ -6638,9 +6682,10 @@
           <a:lstStyle/>
           <a:p>
             <a:r>
-              <a:rPr lang="pt-BR" dirty="0"/>
-              <a:t>26/09/204</a:t>
-            </a:r>
+              <a:rPr lang="pt-BR" dirty="0" smtClean="0"/>
+              <a:t>29/09/2014</a:t>
+            </a:r>
+            <a:endParaRPr lang="pt-BR" dirty="0"/>
           </a:p>
         </p:txBody>
       </p:sp>
@@ -6685,8 +6730,16 @@
           <a:p>
             <a:r>
               <a:rPr lang="pt-BR" dirty="0" smtClean="0"/>
-              <a:t>IBTAFaculdades TCM/3ADS</a:t>
-            </a:r>
+              <a:t>Faculdade Metrocamp</a:t>
+            </a:r>
+          </a:p>
+          <a:p>
+            <a:r>
+              <a:rPr lang="pt-BR" dirty="0" smtClean="0"/>
+              <a:t>TCM/4ADS</a:t>
+            </a:r>
+          </a:p>
+          <a:p>
             <a:endParaRPr lang="pt-BR" dirty="0"/>
           </a:p>
         </p:txBody>
@@ -6838,9 +6891,10 @@
           <a:lstStyle/>
           <a:p>
             <a:r>
-              <a:rPr lang="pt-BR" dirty="0"/>
-              <a:t>26/09/204</a:t>
-            </a:r>
+              <a:rPr lang="pt-BR" dirty="0" smtClean="0"/>
+              <a:t>29/09/2014</a:t>
+            </a:r>
+            <a:endParaRPr lang="pt-BR" dirty="0"/>
           </a:p>
         </p:txBody>
       </p:sp>
@@ -6885,8 +6939,16 @@
           <a:p>
             <a:r>
               <a:rPr lang="pt-BR" dirty="0" smtClean="0"/>
-              <a:t>IBTAFaculdades TCM/3ADS</a:t>
-            </a:r>
+              <a:t>Faculdade Metrocamp</a:t>
+            </a:r>
+          </a:p>
+          <a:p>
+            <a:r>
+              <a:rPr lang="pt-BR" dirty="0" smtClean="0"/>
+              <a:t>TCM/4ADS</a:t>
+            </a:r>
+          </a:p>
+          <a:p>
             <a:endParaRPr lang="pt-BR" dirty="0"/>
           </a:p>
         </p:txBody>
@@ -6988,9 +7050,10 @@
           <a:lstStyle/>
           <a:p>
             <a:r>
-              <a:rPr lang="pt-BR" dirty="0"/>
-              <a:t>26/09/204</a:t>
-            </a:r>
+              <a:rPr lang="pt-BR" dirty="0" smtClean="0"/>
+              <a:t>29/09/2014</a:t>
+            </a:r>
+            <a:endParaRPr lang="pt-BR" dirty="0"/>
           </a:p>
         </p:txBody>
       </p:sp>
@@ -7035,8 +7098,16 @@
           <a:p>
             <a:r>
               <a:rPr lang="pt-BR" dirty="0" smtClean="0"/>
-              <a:t>Veris Faculdades TCM/3ADS</a:t>
-            </a:r>
+              <a:t>Faculdade Metrocamp</a:t>
+            </a:r>
+          </a:p>
+          <a:p>
+            <a:r>
+              <a:rPr lang="pt-BR" dirty="0" smtClean="0"/>
+              <a:t>TCM/4ADS</a:t>
+            </a:r>
+          </a:p>
+          <a:p>
             <a:endParaRPr lang="pt-BR" dirty="0"/>
           </a:p>
         </p:txBody>
@@ -7051,7 +7122,7 @@
           <a:blip r:embed="rId2" cstate="print">
             <a:extLst>
               <a:ext uri="{28A0092B-C50C-407E-A947-70E740481C1C}">
-                <a14:useLocalDpi xmlns:lc="http://schemas.openxmlformats.org/drawingml/2006/lockedCanvas" xmlns:pic="http://schemas.openxmlformats.org/drawingml/2006/picture" xmlns:a14="http://schemas.microsoft.com/office/drawing/2010/main" xmlns:wps="http://schemas.microsoft.com/office/word/2010/wordprocessingShape" xmlns:wpi="http://schemas.microsoft.com/office/word/2010/wordprocessingInk" xmlns:wpg="http://schemas.microsoft.com/office/word/2010/wordprocessingGroup" xmlns:w15="http://schemas.microsoft.com/office/word/2012/wordml" xmlns:w14="http://schemas.microsoft.com/office/word/2010/wordml" xmlns:w="http://schemas.openxmlformats.org/wordprocessingml/2006/main" xmlns:w10="urn:schemas-microsoft-com:office:word" xmlns:wp14="http://schemas.microsoft.com/office/word/2010/wordprocessingDrawing" xmlns:v="urn:schemas-microsoft-com:vml" xmlns:o="urn:schemas-microsoft-com:office:office" xmlns:mc="http://schemas.openxmlformats.org/markup-compatibility/2006" xmlns:wpc="http://schemas.microsoft.com/office/word/2010/wordprocessingCanvas" xmlns="" xmlns:wne="http://schemas.microsoft.com/office/word/2006/wordml" xmlns:wp="http://schemas.openxmlformats.org/drawingml/2006/wordprocessingDrawing" xmlns:m="http://schemas.openxmlformats.org/officeDocument/2006/math" xmlns:ve="http://schemas.openxmlformats.org/markup-compatibility/2006" val="0"/>
+                <a14:useLocalDpi xmlns:ve="http://schemas.openxmlformats.org/markup-compatibility/2006" xmlns:m="http://schemas.openxmlformats.org/officeDocument/2006/math" xmlns:wp="http://schemas.openxmlformats.org/drawingml/2006/wordprocessingDrawing" xmlns:wne="http://schemas.microsoft.com/office/word/2006/wordml" xmlns="" xmlns:wpc="http://schemas.microsoft.com/office/word/2010/wordprocessingCanvas" xmlns:mc="http://schemas.openxmlformats.org/markup-compatibility/2006" xmlns:o="urn:schemas-microsoft-com:office:office" xmlns:v="urn:schemas-microsoft-com:vml" xmlns:wp14="http://schemas.microsoft.com/office/word/2010/wordprocessingDrawing" xmlns:w10="urn:schemas-microsoft-com:office:word" xmlns:w="http://schemas.openxmlformats.org/wordprocessingml/2006/main" xmlns:w14="http://schemas.microsoft.com/office/word/2010/wordml" xmlns:w15="http://schemas.microsoft.com/office/word/2012/wordml" xmlns:wpg="http://schemas.microsoft.com/office/word/2010/wordprocessingGroup" xmlns:wpi="http://schemas.microsoft.com/office/word/2010/wordprocessingInk" xmlns:wps="http://schemas.microsoft.com/office/word/2010/wordprocessingShape" xmlns:a14="http://schemas.microsoft.com/office/drawing/2010/main" xmlns:pic="http://schemas.openxmlformats.org/drawingml/2006/picture" xmlns:lc="http://schemas.openxmlformats.org/drawingml/2006/lockedCanvas" val="0"/>
               </a:ext>
             </a:extLst>
           </a:blip>
@@ -7166,9 +7237,10 @@
           <a:lstStyle/>
           <a:p>
             <a:r>
-              <a:rPr lang="pt-BR" dirty="0"/>
-              <a:t>26/09/204</a:t>
-            </a:r>
+              <a:rPr lang="pt-BR" dirty="0" smtClean="0"/>
+              <a:t>29/09/2014</a:t>
+            </a:r>
+            <a:endParaRPr lang="pt-BR" dirty="0"/>
           </a:p>
         </p:txBody>
       </p:sp>
@@ -7213,38 +7285,54 @@
           <a:p>
             <a:r>
               <a:rPr lang="pt-BR" dirty="0" smtClean="0"/>
-              <a:t>Veris Faculdades TCM/3ADS</a:t>
-            </a:r>
+              <a:t>Faculdade Metrocamp</a:t>
+            </a:r>
+          </a:p>
+          <a:p>
+            <a:r>
+              <a:rPr lang="pt-BR" dirty="0" smtClean="0"/>
+              <a:t>TCM/4ADS</a:t>
+            </a:r>
+          </a:p>
+          <a:p>
+            <a:endParaRPr lang="pt-BR" dirty="0" smtClean="0"/>
+          </a:p>
+          <a:p>
             <a:endParaRPr lang="pt-BR" dirty="0"/>
           </a:p>
         </p:txBody>
       </p:sp>
       <p:pic>
         <p:nvPicPr>
-          <p:cNvPr id="10" name="Imagem 9"/>
-          <p:cNvPicPr/>
+          <p:cNvPr id="1028" name="Picture 4"/>
+          <p:cNvPicPr>
+            <a:picLocks noChangeAspect="1" noChangeArrowheads="1"/>
+          </p:cNvPicPr>
           <p:nvPr/>
         </p:nvPicPr>
         <p:blipFill>
-          <a:blip r:embed="rId2" cstate="print">
-            <a:extLst>
-              <a:ext uri="{28A0092B-C50C-407E-A947-70E740481C1C}">
-                <a14:useLocalDpi xmlns:lc="http://schemas.openxmlformats.org/drawingml/2006/lockedCanvas" xmlns:pic="http://schemas.openxmlformats.org/drawingml/2006/picture" xmlns:a14="http://schemas.microsoft.com/office/drawing/2010/main" xmlns:wps="http://schemas.microsoft.com/office/word/2010/wordprocessingShape" xmlns:wpi="http://schemas.microsoft.com/office/word/2010/wordprocessingInk" xmlns:wpg="http://schemas.microsoft.com/office/word/2010/wordprocessingGroup" xmlns:w15="http://schemas.microsoft.com/office/word/2012/wordml" xmlns:w14="http://schemas.microsoft.com/office/word/2010/wordml" xmlns:w="http://schemas.openxmlformats.org/wordprocessingml/2006/main" xmlns:w10="urn:schemas-microsoft-com:office:word" xmlns:wp14="http://schemas.microsoft.com/office/word/2010/wordprocessingDrawing" xmlns:v="urn:schemas-microsoft-com:vml" xmlns:o="urn:schemas-microsoft-com:office:office" xmlns:mc="http://schemas.openxmlformats.org/markup-compatibility/2006" xmlns:wpc="http://schemas.microsoft.com/office/word/2010/wordprocessingCanvas" xmlns="" xmlns:wne="http://schemas.microsoft.com/office/word/2006/wordml" xmlns:wp="http://schemas.openxmlformats.org/drawingml/2006/wordprocessingDrawing" xmlns:m="http://schemas.openxmlformats.org/officeDocument/2006/math" xmlns:ve="http://schemas.openxmlformats.org/markup-compatibility/2006" val="0"/>
-              </a:ext>
-            </a:extLst>
-          </a:blip>
+          <a:blip r:embed="rId2"/>
+          <a:srcRect/>
           <a:stretch>
             <a:fillRect/>
           </a:stretch>
         </p:blipFill>
-        <p:spPr>
+        <p:spPr bwMode="auto">
           <a:xfrm>
-            <a:off x="2825923" y="476672"/>
-            <a:ext cx="5850533" cy="5650265"/>
+            <a:off x="2928926" y="1500174"/>
+            <a:ext cx="4200525" cy="4800600"/>
           </a:xfrm>
           <a:prstGeom prst="rect">
             <a:avLst/>
           </a:prstGeom>
+          <a:noFill/>
+          <a:ln w="9525">
+            <a:noFill/>
+            <a:miter lim="800000"/>
+            <a:headEnd/>
+            <a:tailEnd/>
+          </a:ln>
+          <a:effectLst/>
         </p:spPr>
       </p:pic>
     </p:spTree>

</xml_diff>

<commit_message>
Inserção de novos slides.
</commit_message>
<xml_diff>
--- a/documentacao/G5_Apresentacao2sem2014.pptx
+++ b/documentacao/G5_Apresentacao2sem2014.pptx
@@ -5,25 +5,28 @@
     <p:sldMasterId id="2147483657" r:id="rId1"/>
   </p:sldMasterIdLst>
   <p:notesMasterIdLst>
-    <p:notesMasterId r:id="rId15"/>
+    <p:notesMasterId r:id="rId18"/>
   </p:notesMasterIdLst>
   <p:handoutMasterIdLst>
-    <p:handoutMasterId r:id="rId16"/>
+    <p:handoutMasterId r:id="rId19"/>
   </p:handoutMasterIdLst>
   <p:sldIdLst>
     <p:sldId id="256" r:id="rId2"/>
     <p:sldId id="258" r:id="rId3"/>
-    <p:sldId id="264" r:id="rId4"/>
-    <p:sldId id="265" r:id="rId5"/>
-    <p:sldId id="266" r:id="rId6"/>
-    <p:sldId id="267" r:id="rId7"/>
-    <p:sldId id="268" r:id="rId8"/>
-    <p:sldId id="259" r:id="rId9"/>
-    <p:sldId id="269" r:id="rId10"/>
-    <p:sldId id="270" r:id="rId11"/>
-    <p:sldId id="271" r:id="rId12"/>
-    <p:sldId id="272" r:id="rId13"/>
-    <p:sldId id="263" r:id="rId14"/>
+    <p:sldId id="275" r:id="rId4"/>
+    <p:sldId id="273" r:id="rId5"/>
+    <p:sldId id="274" r:id="rId6"/>
+    <p:sldId id="264" r:id="rId7"/>
+    <p:sldId id="265" r:id="rId8"/>
+    <p:sldId id="266" r:id="rId9"/>
+    <p:sldId id="267" r:id="rId10"/>
+    <p:sldId id="268" r:id="rId11"/>
+    <p:sldId id="259" r:id="rId12"/>
+    <p:sldId id="269" r:id="rId13"/>
+    <p:sldId id="270" r:id="rId14"/>
+    <p:sldId id="271" r:id="rId15"/>
+    <p:sldId id="272" r:id="rId16"/>
+    <p:sldId id="263" r:id="rId17"/>
   </p:sldIdLst>
   <p:sldSz cx="9144000" cy="6858000" type="screen4x3"/>
   <p:notesSz cx="7010400" cy="9296400"/>
@@ -314,7 +317,7 @@
     </p:spTree>
     <p:extLst>
       <p:ext uri="{BB962C8B-B14F-4D97-AF65-F5344CB8AC3E}">
-        <p14:creationId xmlns:p14="http://schemas.microsoft.com/office/powerpoint/2010/main" xmlns="" val="3690707936"/>
+        <p14:creationId xmlns="" xmlns:p14="http://schemas.microsoft.com/office/powerpoint/2010/main" val="3690707936"/>
       </p:ext>
     </p:extLst>
   </p:cSld>
@@ -628,7 +631,7 @@
     </p:spTree>
     <p:extLst>
       <p:ext uri="{BB962C8B-B14F-4D97-AF65-F5344CB8AC3E}">
-        <p14:creationId xmlns:p14="http://schemas.microsoft.com/office/powerpoint/2010/main" xmlns="" val="753547333"/>
+        <p14:creationId xmlns="" xmlns:p14="http://schemas.microsoft.com/office/powerpoint/2010/main" val="753547333"/>
       </p:ext>
     </p:extLst>
   </p:cSld>
@@ -4968,7 +4971,6 @@
               <a:rPr lang="pt-BR" dirty="0" smtClean="0"/>
               <a:t>Faculdade Metrocamp</a:t>
             </a:r>
-            <a:endParaRPr lang="pt-BR" dirty="0" smtClean="0"/>
           </a:p>
           <a:p>
             <a:r>
@@ -5016,6 +5018,597 @@
       </p:grpSpPr>
       <p:sp>
         <p:nvSpPr>
+          <p:cNvPr id="18434" name="Rectangle 2"/>
+          <p:cNvSpPr>
+            <a:spLocks noGrp="1" noChangeArrowheads="1"/>
+          </p:cNvSpPr>
+          <p:nvPr>
+            <p:ph type="title"/>
+          </p:nvPr>
+        </p:nvSpPr>
+        <p:spPr/>
+        <p:txBody>
+          <a:bodyPr/>
+          <a:lstStyle/>
+          <a:p>
+            <a:r>
+              <a:rPr lang="pt-BR" dirty="0" smtClean="0"/>
+              <a:t>Usuários </a:t>
+            </a:r>
+            <a:endParaRPr lang="pt-BR" dirty="0"/>
+          </a:p>
+        </p:txBody>
+      </p:sp>
+      <p:sp>
+        <p:nvSpPr>
+          <p:cNvPr id="18435" name="Rectangle 3"/>
+          <p:cNvSpPr>
+            <a:spLocks noGrp="1" noChangeArrowheads="1"/>
+          </p:cNvSpPr>
+          <p:nvPr>
+            <p:ph type="body" idx="1"/>
+          </p:nvPr>
+        </p:nvSpPr>
+        <p:spPr>
+          <a:xfrm>
+            <a:off x="539552" y="1556792"/>
+            <a:ext cx="8229600" cy="4530725"/>
+          </a:xfrm>
+        </p:spPr>
+        <p:txBody>
+          <a:bodyPr/>
+          <a:lstStyle/>
+          <a:p>
+            <a:r>
+              <a:rPr lang="pt-BR" dirty="0" smtClean="0"/>
+              <a:t>Alunos</a:t>
+            </a:r>
+          </a:p>
+          <a:p>
+            <a:pPr>
+              <a:buNone/>
+            </a:pPr>
+            <a:endParaRPr lang="pt-BR" sz="1800" dirty="0" smtClean="0"/>
+          </a:p>
+          <a:p>
+            <a:pPr algn="ctr">
+              <a:buNone/>
+            </a:pPr>
+            <a:r>
+              <a:rPr lang="pt-BR" sz="2400" dirty="0" smtClean="0"/>
+              <a:t> São a fonte que produzem os dados a serem administrados pelo sistema. O sistema é criado em função de sua existência. </a:t>
+            </a:r>
+          </a:p>
+          <a:p>
+            <a:pPr algn="ctr">
+              <a:buNone/>
+            </a:pPr>
+            <a:endParaRPr lang="pt-BR" sz="1800" dirty="0" smtClean="0"/>
+          </a:p>
+          <a:p>
+            <a:pPr>
+              <a:buNone/>
+            </a:pPr>
+            <a:r>
+              <a:rPr lang="pt-BR" dirty="0" smtClean="0"/>
+              <a:t>-  Acompanhar e verificar suas notas e frequência.</a:t>
+            </a:r>
+          </a:p>
+          <a:p>
+            <a:pPr>
+              <a:buNone/>
+            </a:pPr>
+            <a:r>
+              <a:rPr lang="en-US" dirty="0" smtClean="0"/>
+              <a:t>- Verificar as atividades a serem realizadas fora da escola, como tarefas, seminários, trabalhos.</a:t>
+            </a:r>
+            <a:endParaRPr lang="pt-BR" dirty="0" smtClean="0"/>
+          </a:p>
+          <a:p>
+            <a:pPr>
+              <a:buNone/>
+            </a:pPr>
+            <a:endParaRPr lang="pt-BR" dirty="0"/>
+          </a:p>
+        </p:txBody>
+      </p:sp>
+      <p:sp>
+        <p:nvSpPr>
+          <p:cNvPr id="6" name="Espaço Reservado para Data 5"/>
+          <p:cNvSpPr>
+            <a:spLocks noGrp="1"/>
+          </p:cNvSpPr>
+          <p:nvPr>
+            <p:ph type="dt" sz="half" idx="10"/>
+          </p:nvPr>
+        </p:nvSpPr>
+        <p:spPr/>
+        <p:txBody>
+          <a:bodyPr/>
+          <a:lstStyle/>
+          <a:p>
+            <a:r>
+              <a:rPr lang="pt-BR" dirty="0" smtClean="0"/>
+              <a:t>29/09/2014</a:t>
+            </a:r>
+            <a:endParaRPr lang="pt-BR" dirty="0"/>
+          </a:p>
+        </p:txBody>
+      </p:sp>
+      <p:sp>
+        <p:nvSpPr>
+          <p:cNvPr id="7" name="Espaço Reservado para Número de Slide 6"/>
+          <p:cNvSpPr>
+            <a:spLocks noGrp="1"/>
+          </p:cNvSpPr>
+          <p:nvPr>
+            <p:ph type="sldNum" sz="quarter" idx="12"/>
+          </p:nvPr>
+        </p:nvSpPr>
+        <p:spPr/>
+        <p:txBody>
+          <a:bodyPr/>
+          <a:lstStyle/>
+          <a:p>
+            <a:fld id="{516476CB-12D4-456A-BCEE-8469A8C40045}" type="slidenum">
+              <a:rPr lang="pt-BR" smtClean="0"/>
+              <a:pPr/>
+              <a:t>10</a:t>
+            </a:fld>
+            <a:endParaRPr lang="pt-BR" dirty="0"/>
+          </a:p>
+        </p:txBody>
+      </p:sp>
+      <p:sp>
+        <p:nvSpPr>
+          <p:cNvPr id="8" name="Espaço Reservado para Rodapé 7"/>
+          <p:cNvSpPr>
+            <a:spLocks noGrp="1"/>
+          </p:cNvSpPr>
+          <p:nvPr>
+            <p:ph type="ftr" sz="quarter" idx="11"/>
+          </p:nvPr>
+        </p:nvSpPr>
+        <p:spPr/>
+        <p:txBody>
+          <a:bodyPr/>
+          <a:lstStyle/>
+          <a:p>
+            <a:r>
+              <a:rPr lang="pt-BR" dirty="0" smtClean="0"/>
+              <a:t>Faculdade Metrocamp</a:t>
+            </a:r>
+          </a:p>
+          <a:p>
+            <a:r>
+              <a:rPr lang="pt-BR" dirty="0" smtClean="0"/>
+              <a:t>TCM/4ADS</a:t>
+            </a:r>
+          </a:p>
+          <a:p>
+            <a:endParaRPr lang="pt-BR" dirty="0"/>
+          </a:p>
+        </p:txBody>
+      </p:sp>
+    </p:spTree>
+  </p:cSld>
+  <p:clrMapOvr>
+    <a:masterClrMapping/>
+  </p:clrMapOvr>
+  <p:transition spd="med">
+    <p:fade/>
+  </p:transition>
+  <p:timing>
+    <p:tnLst>
+      <p:par>
+        <p:cTn id="1" dur="indefinite" restart="never" nodeType="tmRoot"/>
+      </p:par>
+    </p:tnLst>
+  </p:timing>
+</p:sld>
+</file>
+
+<file path=ppt/slides/slide11.xml><?xml version="1.0" encoding="utf-8"?>
+<p:sld xmlns:a="http://schemas.openxmlformats.org/drawingml/2006/main" xmlns:r="http://schemas.openxmlformats.org/officeDocument/2006/relationships" xmlns:p="http://schemas.openxmlformats.org/presentationml/2006/main">
+  <p:cSld>
+    <p:spTree>
+      <p:nvGrpSpPr>
+        <p:cNvPr id="1" name=""/>
+        <p:cNvGrpSpPr/>
+        <p:nvPr/>
+      </p:nvGrpSpPr>
+      <p:grpSpPr>
+        <a:xfrm>
+          <a:off x="0" y="0"/>
+          <a:ext cx="0" cy="0"/>
+          <a:chOff x="0" y="0"/>
+          <a:chExt cx="0" cy="0"/>
+        </a:xfrm>
+      </p:grpSpPr>
+      <p:sp>
+        <p:nvSpPr>
+          <p:cNvPr id="19458" name="Rectangle 2"/>
+          <p:cNvSpPr>
+            <a:spLocks noGrp="1" noChangeArrowheads="1"/>
+          </p:cNvSpPr>
+          <p:nvPr>
+            <p:ph type="title"/>
+          </p:nvPr>
+        </p:nvSpPr>
+        <p:spPr/>
+        <p:txBody>
+          <a:bodyPr/>
+          <a:lstStyle/>
+          <a:p>
+            <a:r>
+              <a:rPr lang="pt-BR" dirty="0" smtClean="0"/>
+              <a:t>Diagrama Caso Uso</a:t>
+            </a:r>
+            <a:endParaRPr lang="pt-BR" dirty="0"/>
+          </a:p>
+        </p:txBody>
+      </p:sp>
+      <p:sp>
+        <p:nvSpPr>
+          <p:cNvPr id="19459" name="Rectangle 3"/>
+          <p:cNvSpPr>
+            <a:spLocks noGrp="1" noChangeArrowheads="1"/>
+          </p:cNvSpPr>
+          <p:nvPr>
+            <p:ph type="body" idx="1"/>
+          </p:nvPr>
+        </p:nvSpPr>
+        <p:spPr/>
+        <p:txBody>
+          <a:bodyPr/>
+          <a:lstStyle/>
+          <a:p>
+            <a:r>
+              <a:rPr lang="en-US" dirty="0" smtClean="0"/>
+              <a:t>ALUNO</a:t>
+            </a:r>
+            <a:endParaRPr lang="pt-BR" dirty="0"/>
+          </a:p>
+        </p:txBody>
+      </p:sp>
+      <p:sp>
+        <p:nvSpPr>
+          <p:cNvPr id="6" name="Espaço Reservado para Data 5"/>
+          <p:cNvSpPr>
+            <a:spLocks noGrp="1"/>
+          </p:cNvSpPr>
+          <p:nvPr>
+            <p:ph type="dt" sz="half" idx="10"/>
+          </p:nvPr>
+        </p:nvSpPr>
+        <p:spPr/>
+        <p:txBody>
+          <a:bodyPr/>
+          <a:lstStyle/>
+          <a:p>
+            <a:r>
+              <a:rPr lang="pt-BR" dirty="0" smtClean="0"/>
+              <a:t>29/09/2014</a:t>
+            </a:r>
+            <a:endParaRPr lang="pt-BR" dirty="0"/>
+          </a:p>
+        </p:txBody>
+      </p:sp>
+      <p:sp>
+        <p:nvSpPr>
+          <p:cNvPr id="7" name="Espaço Reservado para Número de Slide 6"/>
+          <p:cNvSpPr>
+            <a:spLocks noGrp="1"/>
+          </p:cNvSpPr>
+          <p:nvPr>
+            <p:ph type="sldNum" sz="quarter" idx="12"/>
+          </p:nvPr>
+        </p:nvSpPr>
+        <p:spPr/>
+        <p:txBody>
+          <a:bodyPr/>
+          <a:lstStyle/>
+          <a:p>
+            <a:fld id="{516476CB-12D4-456A-BCEE-8469A8C40045}" type="slidenum">
+              <a:rPr lang="pt-BR" smtClean="0"/>
+              <a:pPr/>
+              <a:t>11</a:t>
+            </a:fld>
+            <a:endParaRPr lang="pt-BR" dirty="0"/>
+          </a:p>
+        </p:txBody>
+      </p:sp>
+      <p:sp>
+        <p:nvSpPr>
+          <p:cNvPr id="8" name="Espaço Reservado para Rodapé 7"/>
+          <p:cNvSpPr>
+            <a:spLocks noGrp="1"/>
+          </p:cNvSpPr>
+          <p:nvPr>
+            <p:ph type="ftr" sz="quarter" idx="11"/>
+          </p:nvPr>
+        </p:nvSpPr>
+        <p:spPr/>
+        <p:txBody>
+          <a:bodyPr/>
+          <a:lstStyle/>
+          <a:p>
+            <a:r>
+              <a:rPr lang="pt-BR" dirty="0" smtClean="0"/>
+              <a:t>Faculdade Metrocamp</a:t>
+            </a:r>
+          </a:p>
+          <a:p>
+            <a:r>
+              <a:rPr lang="pt-BR" dirty="0" smtClean="0"/>
+              <a:t>TCM/4ADS</a:t>
+            </a:r>
+          </a:p>
+          <a:p>
+            <a:endParaRPr lang="pt-BR" dirty="0"/>
+          </a:p>
+        </p:txBody>
+      </p:sp>
+      <p:pic>
+        <p:nvPicPr>
+          <p:cNvPr id="9" name="Imagem 8"/>
+          <p:cNvPicPr/>
+          <p:nvPr/>
+        </p:nvPicPr>
+        <p:blipFill>
+          <a:blip r:embed="rId2" cstate="print">
+            <a:extLst>
+              <a:ext uri="{28A0092B-C50C-407E-A947-70E740481C1C}">
+                <a14:useLocalDpi xmlns:lc="http://schemas.openxmlformats.org/drawingml/2006/lockedCanvas" xmlns:pic="http://schemas.openxmlformats.org/drawingml/2006/picture" xmlns:a14="http://schemas.microsoft.com/office/drawing/2010/main" xmlns:wps="http://schemas.microsoft.com/office/word/2010/wordprocessingShape" xmlns:wpi="http://schemas.microsoft.com/office/word/2010/wordprocessingInk" xmlns:wpg="http://schemas.microsoft.com/office/word/2010/wordprocessingGroup" xmlns:w15="http://schemas.microsoft.com/office/word/2012/wordml" xmlns:w14="http://schemas.microsoft.com/office/word/2010/wordml" xmlns:w="http://schemas.openxmlformats.org/wordprocessingml/2006/main" xmlns:w10="urn:schemas-microsoft-com:office:word" xmlns:wp14="http://schemas.microsoft.com/office/word/2010/wordprocessingDrawing" xmlns:v="urn:schemas-microsoft-com:vml" xmlns:o="urn:schemas-microsoft-com:office:office" xmlns:mc="http://schemas.openxmlformats.org/markup-compatibility/2006" xmlns:wpc="http://schemas.microsoft.com/office/word/2010/wordprocessingCanvas" xmlns="" xmlns:wne="http://schemas.microsoft.com/office/word/2006/wordml" xmlns:wp="http://schemas.openxmlformats.org/drawingml/2006/wordprocessingDrawing" xmlns:m="http://schemas.openxmlformats.org/officeDocument/2006/math" xmlns:ve="http://schemas.openxmlformats.org/markup-compatibility/2006" val="0"/>
+              </a:ext>
+            </a:extLst>
+          </a:blip>
+          <a:stretch>
+            <a:fillRect/>
+          </a:stretch>
+        </p:blipFill>
+        <p:spPr>
+          <a:xfrm>
+            <a:off x="2555776" y="1628800"/>
+            <a:ext cx="5832648" cy="4606037"/>
+          </a:xfrm>
+          <a:prstGeom prst="rect">
+            <a:avLst/>
+          </a:prstGeom>
+        </p:spPr>
+      </p:pic>
+    </p:spTree>
+  </p:cSld>
+  <p:clrMapOvr>
+    <a:masterClrMapping/>
+  </p:clrMapOvr>
+  <p:transition spd="med">
+    <p:fade/>
+  </p:transition>
+  <p:timing>
+    <p:tnLst>
+      <p:par>
+        <p:cTn id="1" dur="indefinite" restart="never" nodeType="tmRoot"/>
+      </p:par>
+    </p:tnLst>
+  </p:timing>
+</p:sld>
+</file>
+
+<file path=ppt/slides/slide12.xml><?xml version="1.0" encoding="utf-8"?>
+<p:sld xmlns:a="http://schemas.openxmlformats.org/drawingml/2006/main" xmlns:r="http://schemas.openxmlformats.org/officeDocument/2006/relationships" xmlns:p="http://schemas.openxmlformats.org/presentationml/2006/main">
+  <p:cSld>
+    <p:spTree>
+      <p:nvGrpSpPr>
+        <p:cNvPr id="1" name=""/>
+        <p:cNvGrpSpPr/>
+        <p:nvPr/>
+      </p:nvGrpSpPr>
+      <p:grpSpPr>
+        <a:xfrm>
+          <a:off x="0" y="0"/>
+          <a:ext cx="0" cy="0"/>
+          <a:chOff x="0" y="0"/>
+          <a:chExt cx="0" cy="0"/>
+        </a:xfrm>
+      </p:grpSpPr>
+      <p:sp>
+        <p:nvSpPr>
+          <p:cNvPr id="19458" name="Rectangle 2"/>
+          <p:cNvSpPr>
+            <a:spLocks noGrp="1" noChangeArrowheads="1"/>
+          </p:cNvSpPr>
+          <p:nvPr>
+            <p:ph type="title"/>
+          </p:nvPr>
+        </p:nvSpPr>
+        <p:spPr/>
+        <p:txBody>
+          <a:bodyPr/>
+          <a:lstStyle/>
+          <a:p>
+            <a:r>
+              <a:rPr lang="pt-BR" dirty="0" smtClean="0"/>
+              <a:t>Diagrama Caso Uso</a:t>
+            </a:r>
+            <a:endParaRPr lang="pt-BR" dirty="0"/>
+          </a:p>
+        </p:txBody>
+      </p:sp>
+      <p:sp>
+        <p:nvSpPr>
+          <p:cNvPr id="19459" name="Rectangle 3"/>
+          <p:cNvSpPr>
+            <a:spLocks noGrp="1" noChangeArrowheads="1"/>
+          </p:cNvSpPr>
+          <p:nvPr>
+            <p:ph type="body" idx="1"/>
+          </p:nvPr>
+        </p:nvSpPr>
+        <p:spPr/>
+        <p:txBody>
+          <a:bodyPr/>
+          <a:lstStyle/>
+          <a:p>
+            <a:r>
+              <a:rPr lang="en-US" dirty="0" smtClean="0"/>
+              <a:t>Gestor</a:t>
+            </a:r>
+            <a:endParaRPr lang="pt-BR" dirty="0"/>
+          </a:p>
+        </p:txBody>
+      </p:sp>
+      <p:sp>
+        <p:nvSpPr>
+          <p:cNvPr id="6" name="Espaço Reservado para Data 5"/>
+          <p:cNvSpPr>
+            <a:spLocks noGrp="1"/>
+          </p:cNvSpPr>
+          <p:nvPr>
+            <p:ph type="dt" sz="half" idx="10"/>
+          </p:nvPr>
+        </p:nvSpPr>
+        <p:spPr/>
+        <p:txBody>
+          <a:bodyPr/>
+          <a:lstStyle/>
+          <a:p>
+            <a:r>
+              <a:rPr lang="pt-BR" dirty="0" smtClean="0"/>
+              <a:t>29/09/2014</a:t>
+            </a:r>
+            <a:endParaRPr lang="pt-BR" dirty="0"/>
+          </a:p>
+        </p:txBody>
+      </p:sp>
+      <p:sp>
+        <p:nvSpPr>
+          <p:cNvPr id="7" name="Espaço Reservado para Número de Slide 6"/>
+          <p:cNvSpPr>
+            <a:spLocks noGrp="1"/>
+          </p:cNvSpPr>
+          <p:nvPr>
+            <p:ph type="sldNum" sz="quarter" idx="12"/>
+          </p:nvPr>
+        </p:nvSpPr>
+        <p:spPr/>
+        <p:txBody>
+          <a:bodyPr/>
+          <a:lstStyle/>
+          <a:p>
+            <a:fld id="{516476CB-12D4-456A-BCEE-8469A8C40045}" type="slidenum">
+              <a:rPr lang="pt-BR" smtClean="0"/>
+              <a:pPr/>
+              <a:t>12</a:t>
+            </a:fld>
+            <a:endParaRPr lang="pt-BR" dirty="0"/>
+          </a:p>
+        </p:txBody>
+      </p:sp>
+      <p:sp>
+        <p:nvSpPr>
+          <p:cNvPr id="8" name="Espaço Reservado para Rodapé 7"/>
+          <p:cNvSpPr>
+            <a:spLocks noGrp="1"/>
+          </p:cNvSpPr>
+          <p:nvPr>
+            <p:ph type="ftr" sz="quarter" idx="11"/>
+          </p:nvPr>
+        </p:nvSpPr>
+        <p:spPr/>
+        <p:txBody>
+          <a:bodyPr/>
+          <a:lstStyle/>
+          <a:p>
+            <a:r>
+              <a:rPr lang="pt-BR" dirty="0" smtClean="0"/>
+              <a:t>Faculdade Metrocamp</a:t>
+            </a:r>
+          </a:p>
+          <a:p>
+            <a:r>
+              <a:rPr lang="pt-BR" dirty="0" smtClean="0"/>
+              <a:t>TCM/4ADS</a:t>
+            </a:r>
+          </a:p>
+          <a:p>
+            <a:endParaRPr lang="pt-BR" dirty="0" smtClean="0"/>
+          </a:p>
+          <a:p>
+            <a:endParaRPr lang="pt-BR" dirty="0"/>
+          </a:p>
+        </p:txBody>
+      </p:sp>
+      <p:pic>
+        <p:nvPicPr>
+          <p:cNvPr id="1028" name="Picture 4"/>
+          <p:cNvPicPr>
+            <a:picLocks noChangeAspect="1" noChangeArrowheads="1"/>
+          </p:cNvPicPr>
+          <p:nvPr/>
+        </p:nvPicPr>
+        <p:blipFill>
+          <a:blip r:embed="rId2"/>
+          <a:srcRect/>
+          <a:stretch>
+            <a:fillRect/>
+          </a:stretch>
+        </p:blipFill>
+        <p:spPr bwMode="auto">
+          <a:xfrm>
+            <a:off x="2928926" y="1500174"/>
+            <a:ext cx="4200525" cy="4800600"/>
+          </a:xfrm>
+          <a:prstGeom prst="rect">
+            <a:avLst/>
+          </a:prstGeom>
+          <a:noFill/>
+          <a:ln w="9525">
+            <a:noFill/>
+            <a:miter lim="800000"/>
+            <a:headEnd/>
+            <a:tailEnd/>
+          </a:ln>
+          <a:effectLst/>
+        </p:spPr>
+      </p:pic>
+    </p:spTree>
+  </p:cSld>
+  <p:clrMapOvr>
+    <a:masterClrMapping/>
+  </p:clrMapOvr>
+  <p:transition spd="med">
+    <p:fade/>
+  </p:transition>
+  <p:timing>
+    <p:tnLst>
+      <p:par>
+        <p:cTn id="1" dur="indefinite" restart="never" nodeType="tmRoot"/>
+      </p:par>
+    </p:tnLst>
+  </p:timing>
+</p:sld>
+</file>
+
+<file path=ppt/slides/slide13.xml><?xml version="1.0" encoding="utf-8"?>
+<p:sld xmlns:a="http://schemas.openxmlformats.org/drawingml/2006/main" xmlns:r="http://schemas.openxmlformats.org/officeDocument/2006/relationships" xmlns:p="http://schemas.openxmlformats.org/presentationml/2006/main">
+  <p:cSld>
+    <p:spTree>
+      <p:nvGrpSpPr>
+        <p:cNvPr id="1" name=""/>
+        <p:cNvGrpSpPr/>
+        <p:nvPr/>
+      </p:nvGrpSpPr>
+      <p:grpSpPr>
+        <a:xfrm>
+          <a:off x="0" y="0"/>
+          <a:ext cx="0" cy="0"/>
+          <a:chOff x="0" y="0"/>
+          <a:chExt cx="0" cy="0"/>
+        </a:xfrm>
+      </p:grpSpPr>
+      <p:sp>
+        <p:nvSpPr>
           <p:cNvPr id="19458" name="Rectangle 2"/>
           <p:cNvSpPr>
             <a:spLocks noGrp="1" noChangeArrowheads="1"/>
@@ -5106,7 +5699,7 @@
             <a:fld id="{516476CB-12D4-456A-BCEE-8469A8C40045}" type="slidenum">
               <a:rPr lang="pt-BR" smtClean="0"/>
               <a:pPr/>
-              <a:t>10</a:t>
+              <a:t>13</a:t>
             </a:fld>
             <a:endParaRPr lang="pt-BR" dirty="0"/>
           </a:p>
@@ -5194,7 +5787,7 @@
 </p:sld>
 </file>
 
-<file path=ppt/slides/slide11.xml><?xml version="1.0" encoding="utf-8"?>
+<file path=ppt/slides/slide14.xml><?xml version="1.0" encoding="utf-8"?>
 <p:sld xmlns:a="http://schemas.openxmlformats.org/drawingml/2006/main" xmlns:r="http://schemas.openxmlformats.org/officeDocument/2006/relationships" xmlns:p="http://schemas.openxmlformats.org/presentationml/2006/main">
   <p:cSld>
     <p:spTree>
@@ -5303,7 +5896,7 @@
             <a:fld id="{516476CB-12D4-456A-BCEE-8469A8C40045}" type="slidenum">
               <a:rPr lang="pt-BR" smtClean="0"/>
               <a:pPr/>
-              <a:t>11</a:t>
+              <a:t>14</a:t>
             </a:fld>
             <a:endParaRPr lang="pt-BR" dirty="0"/>
           </a:p>
@@ -5394,7 +5987,7 @@
 </p:sld>
 </file>
 
-<file path=ppt/slides/slide12.xml><?xml version="1.0" encoding="utf-8"?>
+<file path=ppt/slides/slide15.xml><?xml version="1.0" encoding="utf-8"?>
 <p:sld xmlns:a="http://schemas.openxmlformats.org/drawingml/2006/main" xmlns:r="http://schemas.openxmlformats.org/officeDocument/2006/relationships" xmlns:p="http://schemas.openxmlformats.org/presentationml/2006/main">
   <p:cSld>
     <p:spTree>
@@ -5498,7 +6091,7 @@
             <a:fld id="{516476CB-12D4-456A-BCEE-8469A8C40045}" type="slidenum">
               <a:rPr lang="pt-BR" smtClean="0"/>
               <a:pPr/>
-              <a:t>12</a:t>
+              <a:t>15</a:t>
             </a:fld>
             <a:endParaRPr lang="pt-BR" dirty="0"/>
           </a:p>
@@ -5545,7 +6138,7 @@
           <a:blip r:embed="rId2" cstate="print">
             <a:extLst>
               <a:ext uri="{28A0092B-C50C-407E-A947-70E740481C1C}">
-                <a14:useLocalDpi xmlns:ve="http://schemas.openxmlformats.org/markup-compatibility/2006" xmlns:m="http://schemas.openxmlformats.org/officeDocument/2006/math" xmlns:wp="http://schemas.openxmlformats.org/drawingml/2006/wordprocessingDrawing" xmlns:wne="http://schemas.microsoft.com/office/word/2006/wordml" xmlns="" xmlns:wpc="http://schemas.microsoft.com/office/word/2010/wordprocessingCanvas" xmlns:mc="http://schemas.openxmlformats.org/markup-compatibility/2006" xmlns:o="urn:schemas-microsoft-com:office:office" xmlns:v="urn:schemas-microsoft-com:vml" xmlns:wp14="http://schemas.microsoft.com/office/word/2010/wordprocessingDrawing" xmlns:w10="urn:schemas-microsoft-com:office:word" xmlns:w="http://schemas.openxmlformats.org/wordprocessingml/2006/main" xmlns:w14="http://schemas.microsoft.com/office/word/2010/wordml" xmlns:w15="http://schemas.microsoft.com/office/word/2012/wordml" xmlns:wpg="http://schemas.microsoft.com/office/word/2010/wordprocessingGroup" xmlns:wpi="http://schemas.microsoft.com/office/word/2010/wordprocessingInk" xmlns:wps="http://schemas.microsoft.com/office/word/2010/wordprocessingShape" xmlns:a14="http://schemas.microsoft.com/office/drawing/2010/main" xmlns:pic="http://schemas.openxmlformats.org/drawingml/2006/picture" xmlns:lc="http://schemas.openxmlformats.org/drawingml/2006/lockedCanvas" val="0"/>
+                <a14:useLocalDpi xmlns:lc="http://schemas.openxmlformats.org/drawingml/2006/lockedCanvas" xmlns:pic="http://schemas.openxmlformats.org/drawingml/2006/picture" xmlns:a14="http://schemas.microsoft.com/office/drawing/2010/main" xmlns:wps="http://schemas.microsoft.com/office/word/2010/wordprocessingShape" xmlns:wpi="http://schemas.microsoft.com/office/word/2010/wordprocessingInk" xmlns:wpg="http://schemas.microsoft.com/office/word/2010/wordprocessingGroup" xmlns:w15="http://schemas.microsoft.com/office/word/2012/wordml" xmlns:w14="http://schemas.microsoft.com/office/word/2010/wordml" xmlns:w="http://schemas.openxmlformats.org/wordprocessingml/2006/main" xmlns:w10="urn:schemas-microsoft-com:office:word" xmlns:wp14="http://schemas.microsoft.com/office/word/2010/wordprocessingDrawing" xmlns:v="urn:schemas-microsoft-com:vml" xmlns:o="urn:schemas-microsoft-com:office:office" xmlns:mc="http://schemas.openxmlformats.org/markup-compatibility/2006" xmlns:wpc="http://schemas.microsoft.com/office/word/2010/wordprocessingCanvas" xmlns="" xmlns:wne="http://schemas.microsoft.com/office/word/2006/wordml" xmlns:wp="http://schemas.openxmlformats.org/drawingml/2006/wordprocessingDrawing" xmlns:m="http://schemas.openxmlformats.org/officeDocument/2006/math" xmlns:ve="http://schemas.openxmlformats.org/markup-compatibility/2006" val="0"/>
               </a:ext>
             </a:extLst>
           </a:blip>
@@ -5581,7 +6174,7 @@
 </p:sld>
 </file>
 
-<file path=ppt/slides/slide13.xml><?xml version="1.0" encoding="utf-8"?>
+<file path=ppt/slides/slide16.xml><?xml version="1.0" encoding="utf-8"?>
 <p:sld xmlns:a="http://schemas.openxmlformats.org/drawingml/2006/main" xmlns:r="http://schemas.openxmlformats.org/officeDocument/2006/relationships" xmlns:p="http://schemas.openxmlformats.org/presentationml/2006/main">
   <p:cSld>
     <p:spTree>
@@ -5702,7 +6295,7 @@
             <a:fld id="{516476CB-12D4-456A-BCEE-8469A8C40045}" type="slidenum">
               <a:rPr lang="pt-BR" smtClean="0"/>
               <a:pPr/>
-              <a:t>13</a:t>
+              <a:t>16</a:t>
             </a:fld>
             <a:endParaRPr lang="pt-BR" dirty="0"/>
           </a:p>
@@ -5815,6 +6408,7 @@
             <a:endParaRPr lang="pt-BR" dirty="0" smtClean="0"/>
           </a:p>
           <a:p>
+            <a:pPr algn="just"/>
             <a:r>
               <a:rPr lang="pt-BR" dirty="0" smtClean="0"/>
               <a:t>GAED - Gerenciamento de Atividades Escolar Digital para aperfeiçoar o processo de gestão, com registro de professores, alunos e turmas.</a:t>
@@ -5827,6 +6421,7 @@
             <a:endParaRPr lang="pt-BR" dirty="0" smtClean="0"/>
           </a:p>
           <a:p>
+            <a:pPr algn="just"/>
             <a:r>
               <a:rPr lang="pt-BR" dirty="0" smtClean="0"/>
               <a:t>Maior comprometimento com o processo escolar dos alunos, pela transparência e agilidade na comunicação de notas, faltas, ocorrências e tarefas escolares, entre alunos, professores, pais/responsáveis.</a:t>
@@ -5951,9 +6546,9 @@
       </p:grpSpPr>
       <p:sp>
         <p:nvSpPr>
-          <p:cNvPr id="18434" name="Rectangle 2"/>
-          <p:cNvSpPr>
-            <a:spLocks noGrp="1" noChangeArrowheads="1"/>
+          <p:cNvPr id="2" name="Título 1"/>
+          <p:cNvSpPr>
+            <a:spLocks noGrp="1"/>
           </p:cNvSpPr>
           <p:nvPr>
             <p:ph type="title"/>
@@ -5966,75 +6561,55 @@
           <a:p>
             <a:r>
               <a:rPr lang="pt-BR" dirty="0" smtClean="0"/>
-              <a:t>Usuários </a:t>
-            </a:r>
-            <a:endParaRPr lang="pt-BR" dirty="0"/>
-          </a:p>
-        </p:txBody>
-      </p:sp>
-      <p:sp>
-        <p:nvSpPr>
-          <p:cNvPr id="18435" name="Rectangle 3"/>
-          <p:cNvSpPr>
-            <a:spLocks noGrp="1" noChangeArrowheads="1"/>
-          </p:cNvSpPr>
-          <p:nvPr>
-            <p:ph type="body" idx="1"/>
+              <a:t>Problematização e contexto</a:t>
+            </a:r>
+            <a:endParaRPr lang="pt-BR" dirty="0"/>
+          </a:p>
+        </p:txBody>
+      </p:sp>
+      <p:sp>
+        <p:nvSpPr>
+          <p:cNvPr id="3" name="Espaço Reservado para Conteúdo 2"/>
+          <p:cNvSpPr>
+            <a:spLocks noGrp="1"/>
+          </p:cNvSpPr>
+          <p:nvPr>
+            <p:ph idx="1"/>
           </p:nvPr>
         </p:nvSpPr>
         <p:spPr>
           <a:xfrm>
-            <a:off x="539552" y="1556792"/>
-            <a:ext cx="8229600" cy="4530725"/>
+            <a:off x="457200" y="1428736"/>
+            <a:ext cx="8229600" cy="4786346"/>
           </a:xfrm>
         </p:spPr>
         <p:txBody>
           <a:bodyPr/>
           <a:lstStyle/>
           <a:p>
-            <a:r>
-              <a:rPr lang="pt-BR" dirty="0" smtClean="0"/>
-              <a:t> Gestores</a:t>
-            </a:r>
-          </a:p>
-          <a:p>
-            <a:pPr>
-              <a:buNone/>
-            </a:pPr>
-            <a:endParaRPr lang="pt-BR" sz="1800" dirty="0" smtClean="0"/>
-          </a:p>
-          <a:p>
-            <a:pPr algn="ctr">
-              <a:buNone/>
-            </a:pPr>
-            <a:r>
-              <a:rPr lang="pt-BR" dirty="0" smtClean="0"/>
-              <a:t>   São os diretores, vice-diretores, e   coordenadores pedagógicos.</a:t>
-            </a:r>
-          </a:p>
-          <a:p>
-            <a:pPr>
-              <a:buNone/>
-            </a:pPr>
-            <a:endParaRPr lang="pt-BR" dirty="0" smtClean="0"/>
-          </a:p>
-          <a:p>
-            <a:pPr>
-              <a:buNone/>
-            </a:pPr>
-            <a:r>
-              <a:rPr lang="pt-BR" dirty="0" smtClean="0"/>
-              <a:t>   Responsáveis por gerir toda infraestrutura da escola, tanto de recursos materiais e humanos, bem com as informações da secretaria, professores e alunos, e atendimento aos pais. </a:t>
-            </a:r>
-          </a:p>
-          <a:p>
-            <a:endParaRPr lang="pt-BR" dirty="0"/>
-          </a:p>
-        </p:txBody>
-      </p:sp>
-      <p:sp>
-        <p:nvSpPr>
-          <p:cNvPr id="6" name="Espaço Reservado para Data 5"/>
+            <a:pPr algn="just"/>
+            <a:r>
+              <a:rPr lang="pt-BR" dirty="0" smtClean="0"/>
+              <a:t>Em visitas às escolas, encontramos alguns problemas enfrentados pela equipe de ensino. Dentre eles a dificuldade no processo de gestão, pois o excesso de tarefas e processo de controle manual gera lentidão na organização no todo</a:t>
+            </a:r>
+            <a:r>
+              <a:rPr lang="pt-BR" dirty="0" smtClean="0"/>
+              <a:t>.</a:t>
+            </a:r>
+          </a:p>
+          <a:p>
+            <a:pPr algn="just"/>
+            <a:r>
+              <a:rPr lang="pt-BR" dirty="0" smtClean="0"/>
+              <a:t>Os professores têm muitos afazeres e atividades a serem realizadas. Com esse excesso de serviço, muitos professores não conseguem ter um controle satisfatório do processo de ensino de cada aluno.</a:t>
+            </a:r>
+            <a:endParaRPr lang="pt-BR" dirty="0"/>
+          </a:p>
+        </p:txBody>
+      </p:sp>
+      <p:sp>
+        <p:nvSpPr>
+          <p:cNvPr id="4" name="Espaço Reservado para Data 3"/>
           <p:cNvSpPr>
             <a:spLocks noGrp="1"/>
           </p:cNvSpPr>
@@ -6051,13 +6626,46 @@
               <a:rPr lang="pt-BR" dirty="0" smtClean="0"/>
               <a:t>29/09/2014</a:t>
             </a:r>
-            <a:endParaRPr lang="pt-BR" dirty="0"/>
-          </a:p>
-        </p:txBody>
-      </p:sp>
-      <p:sp>
-        <p:nvSpPr>
-          <p:cNvPr id="7" name="Espaço Reservado para Número de Slide 6"/>
+          </a:p>
+          <a:p>
+            <a:endParaRPr lang="pt-BR" dirty="0"/>
+          </a:p>
+        </p:txBody>
+      </p:sp>
+      <p:sp>
+        <p:nvSpPr>
+          <p:cNvPr id="5" name="Espaço Reservado para Rodapé 4"/>
+          <p:cNvSpPr>
+            <a:spLocks noGrp="1"/>
+          </p:cNvSpPr>
+          <p:nvPr>
+            <p:ph type="ftr" sz="quarter" idx="11"/>
+          </p:nvPr>
+        </p:nvSpPr>
+        <p:spPr/>
+        <p:txBody>
+          <a:bodyPr/>
+          <a:lstStyle/>
+          <a:p>
+            <a:r>
+              <a:rPr lang="pt-BR" dirty="0" smtClean="0"/>
+              <a:t>Faculdade Metrocamp</a:t>
+            </a:r>
+          </a:p>
+          <a:p>
+            <a:r>
+              <a:rPr lang="pt-BR" dirty="0" smtClean="0"/>
+              <a:t>TCM/4ADS</a:t>
+            </a:r>
+          </a:p>
+          <a:p>
+            <a:endParaRPr lang="pt-BR" dirty="0"/>
+          </a:p>
+        </p:txBody>
+      </p:sp>
+      <p:sp>
+        <p:nvSpPr>
+          <p:cNvPr id="6" name="Espaço Reservado para Número de Slide 5"/>
           <p:cNvSpPr>
             <a:spLocks noGrp="1"/>
           </p:cNvSpPr>
@@ -6075,37 +6683,6 @@
               <a:pPr/>
               <a:t>3</a:t>
             </a:fld>
-            <a:endParaRPr lang="pt-BR" dirty="0"/>
-          </a:p>
-        </p:txBody>
-      </p:sp>
-      <p:sp>
-        <p:nvSpPr>
-          <p:cNvPr id="8" name="Espaço Reservado para Rodapé 7"/>
-          <p:cNvSpPr>
-            <a:spLocks noGrp="1"/>
-          </p:cNvSpPr>
-          <p:nvPr>
-            <p:ph type="ftr" sz="quarter" idx="11"/>
-          </p:nvPr>
-        </p:nvSpPr>
-        <p:spPr/>
-        <p:txBody>
-          <a:bodyPr/>
-          <a:lstStyle/>
-          <a:p>
-            <a:r>
-              <a:rPr lang="pt-BR" dirty="0" smtClean="0"/>
-              <a:t>Faculdade Metrocamp</a:t>
-            </a:r>
-          </a:p>
-          <a:p>
-            <a:r>
-              <a:rPr lang="pt-BR" dirty="0" smtClean="0"/>
-              <a:t>TCM/4ADS</a:t>
-            </a:r>
-          </a:p>
-          <a:p>
             <a:endParaRPr lang="pt-BR" dirty="0"/>
           </a:p>
         </p:txBody>
@@ -6115,9 +6692,6 @@
   <p:clrMapOvr>
     <a:masterClrMapping/>
   </p:clrMapOvr>
-  <p:transition spd="med">
-    <p:fade/>
-  </p:transition>
   <p:timing>
     <p:tnLst>
       <p:par>
@@ -6147,9 +6721,9 @@
       </p:grpSpPr>
       <p:sp>
         <p:nvSpPr>
-          <p:cNvPr id="18434" name="Rectangle 2"/>
-          <p:cNvSpPr>
-            <a:spLocks noGrp="1" noChangeArrowheads="1"/>
+          <p:cNvPr id="2" name="Título 1"/>
+          <p:cNvSpPr>
+            <a:spLocks noGrp="1"/>
           </p:cNvSpPr>
           <p:nvPr>
             <p:ph type="title"/>
@@ -6162,97 +6736,54 @@
           <a:p>
             <a:r>
               <a:rPr lang="pt-BR" dirty="0" smtClean="0"/>
-              <a:t>Usuários </a:t>
-            </a:r>
-            <a:endParaRPr lang="pt-BR" dirty="0"/>
-          </a:p>
-        </p:txBody>
-      </p:sp>
-      <p:sp>
-        <p:nvSpPr>
-          <p:cNvPr id="18435" name="Rectangle 3"/>
-          <p:cNvSpPr>
-            <a:spLocks noGrp="1" noChangeArrowheads="1"/>
-          </p:cNvSpPr>
-          <p:nvPr>
-            <p:ph type="body" idx="1"/>
-          </p:nvPr>
-        </p:nvSpPr>
-        <p:spPr>
-          <a:xfrm>
-            <a:off x="539552" y="1556792"/>
-            <a:ext cx="8229600" cy="4530725"/>
-          </a:xfrm>
-        </p:spPr>
-        <p:txBody>
-          <a:bodyPr/>
-          <a:lstStyle/>
-          <a:p>
-            <a:r>
-              <a:rPr lang="pt-BR" dirty="0" smtClean="0"/>
-              <a:t>Secretaria</a:t>
-            </a:r>
-          </a:p>
-          <a:p>
-            <a:pPr>
-              <a:buNone/>
-            </a:pPr>
-            <a:endParaRPr lang="pt-BR" sz="1100" dirty="0" smtClean="0"/>
-          </a:p>
-          <a:p>
-            <a:pPr algn="ctr">
-              <a:buNone/>
-            </a:pPr>
-            <a:r>
-              <a:rPr lang="pt-BR" dirty="0" smtClean="0"/>
-              <a:t>  </a:t>
-            </a:r>
-            <a:r>
-              <a:rPr lang="pt-BR" sz="2400" dirty="0" smtClean="0"/>
-              <a:t>Os secretários e agentes escolares atendem a toda comunidade escolar para receber e entregar informações e documentações. </a:t>
-            </a:r>
-          </a:p>
-          <a:p>
-            <a:pPr algn="ctr">
-              <a:buNone/>
-            </a:pPr>
-            <a:endParaRPr lang="pt-BR" sz="1800" dirty="0" smtClean="0"/>
-          </a:p>
-          <a:p>
-            <a:pPr>
-              <a:buNone/>
-            </a:pPr>
-            <a:r>
-              <a:rPr lang="pt-BR" dirty="0" smtClean="0"/>
-              <a:t>    - Organiza e arquiva informações de documentos escolares de alunos e professores.</a:t>
-            </a:r>
-          </a:p>
-          <a:p>
-            <a:pPr>
-              <a:buNone/>
-            </a:pPr>
-            <a:r>
-              <a:rPr lang="pt-BR" dirty="0" smtClean="0"/>
-              <a:t>   - Organiza a infraestrutura, recursos materiais e humanos.</a:t>
-            </a:r>
-          </a:p>
-          <a:p>
-            <a:pPr>
-              <a:buNone/>
-            </a:pPr>
-            <a:r>
-              <a:rPr lang="pt-BR" dirty="0" smtClean="0"/>
-              <a:t>   - Atende pais e comunidade </a:t>
-            </a:r>
-          </a:p>
-          <a:p>
-            <a:endParaRPr lang="pt-BR" dirty="0"/>
-          </a:p>
-        </p:txBody>
-      </p:sp>
-      <p:sp>
-        <p:nvSpPr>
-          <p:cNvPr id="6" name="Espaço Reservado para Data 5"/>
+              <a:t>Objetivos Gerais e Específicos</a:t>
+            </a:r>
+            <a:r>
+              <a:rPr lang="pt-BR" dirty="0" smtClean="0"/>
+              <a:t>.</a:t>
+            </a:r>
+            <a:endParaRPr lang="pt-BR" dirty="0"/>
+          </a:p>
+        </p:txBody>
+      </p:sp>
+      <p:sp>
+        <p:nvSpPr>
+          <p:cNvPr id="3" name="Espaço Reservado para Conteúdo 2"/>
+          <p:cNvSpPr>
+            <a:spLocks noGrp="1"/>
+          </p:cNvSpPr>
+          <p:nvPr>
+            <p:ph idx="1"/>
+          </p:nvPr>
+        </p:nvSpPr>
+        <p:spPr/>
+        <p:txBody>
+          <a:bodyPr/>
+          <a:lstStyle/>
+          <a:p>
+            <a:pPr algn="just"/>
+            <a:r>
+              <a:rPr lang="pt-BR" dirty="0" smtClean="0"/>
+              <a:t>Este projeto tem por objetivo geral o estudo e implementação do Sistema de Gerenciamento Escolar Digital, para escolas que utilizam o processo manual de gestão.</a:t>
+            </a:r>
+          </a:p>
+          <a:p>
+            <a:pPr algn="just"/>
+            <a:r>
+              <a:rPr lang="pt-BR" dirty="0" smtClean="0"/>
+              <a:t>O Objetivo especifico é implementar um sistema </a:t>
+            </a:r>
+            <a:r>
+              <a:rPr lang="pt-BR" dirty="0" smtClean="0"/>
+              <a:t>de gerenciamento que seja de fácil manuseio, que atenda as expectativas e necessidades dos clientes. Os recursos disponibilizados devem estimular aos usuários a utilizar o sistema.</a:t>
+            </a:r>
+            <a:endParaRPr lang="pt-BR" dirty="0"/>
+          </a:p>
+        </p:txBody>
+      </p:sp>
+      <p:sp>
+        <p:nvSpPr>
+          <p:cNvPr id="4" name="Espaço Reservado para Data 3"/>
           <p:cNvSpPr>
             <a:spLocks noGrp="1"/>
           </p:cNvSpPr>
@@ -6269,13 +6800,46 @@
               <a:rPr lang="pt-BR" dirty="0" smtClean="0"/>
               <a:t>29/09/2014</a:t>
             </a:r>
-            <a:endParaRPr lang="pt-BR" dirty="0"/>
-          </a:p>
-        </p:txBody>
-      </p:sp>
-      <p:sp>
-        <p:nvSpPr>
-          <p:cNvPr id="7" name="Espaço Reservado para Número de Slide 6"/>
+          </a:p>
+          <a:p>
+            <a:endParaRPr lang="pt-BR" dirty="0"/>
+          </a:p>
+        </p:txBody>
+      </p:sp>
+      <p:sp>
+        <p:nvSpPr>
+          <p:cNvPr id="5" name="Espaço Reservado para Rodapé 4"/>
+          <p:cNvSpPr>
+            <a:spLocks noGrp="1"/>
+          </p:cNvSpPr>
+          <p:nvPr>
+            <p:ph type="ftr" sz="quarter" idx="11"/>
+          </p:nvPr>
+        </p:nvSpPr>
+        <p:spPr/>
+        <p:txBody>
+          <a:bodyPr/>
+          <a:lstStyle/>
+          <a:p>
+            <a:r>
+              <a:rPr lang="pt-BR" dirty="0" smtClean="0"/>
+              <a:t>Faculdade Metrocamp</a:t>
+            </a:r>
+          </a:p>
+          <a:p>
+            <a:r>
+              <a:rPr lang="pt-BR" dirty="0" smtClean="0"/>
+              <a:t>TCM/4ADS</a:t>
+            </a:r>
+          </a:p>
+          <a:p>
+            <a:endParaRPr lang="pt-BR" dirty="0"/>
+          </a:p>
+        </p:txBody>
+      </p:sp>
+      <p:sp>
+        <p:nvSpPr>
+          <p:cNvPr id="6" name="Espaço Reservado para Número de Slide 5"/>
           <p:cNvSpPr>
             <a:spLocks noGrp="1"/>
           </p:cNvSpPr>
@@ -6293,37 +6857,6 @@
               <a:pPr/>
               <a:t>4</a:t>
             </a:fld>
-            <a:endParaRPr lang="pt-BR" dirty="0"/>
-          </a:p>
-        </p:txBody>
-      </p:sp>
-      <p:sp>
-        <p:nvSpPr>
-          <p:cNvPr id="8" name="Espaço Reservado para Rodapé 7"/>
-          <p:cNvSpPr>
-            <a:spLocks noGrp="1"/>
-          </p:cNvSpPr>
-          <p:nvPr>
-            <p:ph type="ftr" sz="quarter" idx="11"/>
-          </p:nvPr>
-        </p:nvSpPr>
-        <p:spPr/>
-        <p:txBody>
-          <a:bodyPr/>
-          <a:lstStyle/>
-          <a:p>
-            <a:r>
-              <a:rPr lang="pt-BR" dirty="0" smtClean="0"/>
-              <a:t>Faculdade Metrocamp</a:t>
-            </a:r>
-          </a:p>
-          <a:p>
-            <a:r>
-              <a:rPr lang="pt-BR" dirty="0" smtClean="0"/>
-              <a:t>TCM/4ADS</a:t>
-            </a:r>
-          </a:p>
-          <a:p>
             <a:endParaRPr lang="pt-BR" dirty="0"/>
           </a:p>
         </p:txBody>
@@ -6333,9 +6866,6 @@
   <p:clrMapOvr>
     <a:masterClrMapping/>
   </p:clrMapOvr>
-  <p:transition spd="med">
-    <p:fade/>
-  </p:transition>
   <p:timing>
     <p:tnLst>
       <p:par>
@@ -6365,9 +6895,9 @@
       </p:grpSpPr>
       <p:sp>
         <p:nvSpPr>
-          <p:cNvPr id="18434" name="Rectangle 2"/>
-          <p:cNvSpPr>
-            <a:spLocks noGrp="1" noChangeArrowheads="1"/>
+          <p:cNvPr id="2" name="Título 1"/>
+          <p:cNvSpPr>
+            <a:spLocks noGrp="1"/>
           </p:cNvSpPr>
           <p:nvPr>
             <p:ph type="title"/>
@@ -6380,124 +6910,107 @@
           <a:p>
             <a:r>
               <a:rPr lang="pt-BR" dirty="0" smtClean="0"/>
-              <a:t>Usuários </a:t>
-            </a:r>
-            <a:endParaRPr lang="pt-BR" dirty="0"/>
-          </a:p>
-        </p:txBody>
-      </p:sp>
-      <p:sp>
-        <p:nvSpPr>
-          <p:cNvPr id="18435" name="Rectangle 3"/>
-          <p:cNvSpPr>
-            <a:spLocks noGrp="1" noChangeArrowheads="1"/>
-          </p:cNvSpPr>
-          <p:nvPr>
-            <p:ph type="body" idx="1"/>
-          </p:nvPr>
-        </p:nvSpPr>
-        <p:spPr>
-          <a:xfrm>
-            <a:off x="539552" y="1556792"/>
-            <a:ext cx="8229600" cy="4530725"/>
-          </a:xfrm>
-        </p:spPr>
-        <p:txBody>
-          <a:bodyPr/>
-          <a:lstStyle/>
-          <a:p>
-            <a:r>
-              <a:rPr lang="pt-BR" dirty="0" smtClean="0"/>
-              <a:t>Professores</a:t>
-            </a:r>
-          </a:p>
-          <a:p>
-            <a:pPr>
-              <a:buNone/>
-            </a:pPr>
-            <a:endParaRPr lang="pt-BR" sz="1800" dirty="0" smtClean="0"/>
-          </a:p>
-          <a:p>
-            <a:pPr algn="ctr">
-              <a:buNone/>
-            </a:pPr>
-            <a:r>
-              <a:rPr lang="pt-BR" sz="2400" dirty="0" smtClean="0"/>
-              <a:t>  Profissionais com formação na área da educação, com documentação adequada para atuação em sala de aula.</a:t>
-            </a:r>
-          </a:p>
-          <a:p>
-            <a:pPr algn="ctr">
-              <a:buNone/>
-            </a:pPr>
-            <a:endParaRPr lang="pt-BR" sz="1800" dirty="0" smtClean="0"/>
-          </a:p>
-          <a:p>
-            <a:pPr>
-              <a:buNone/>
-            </a:pPr>
-            <a:r>
-              <a:rPr lang="pt-BR" dirty="0" smtClean="0"/>
-              <a:t>- Organizar e planejar o conteúdo curricular.</a:t>
-            </a:r>
-          </a:p>
-          <a:p>
-            <a:pPr>
-              <a:buNone/>
-            </a:pPr>
-            <a:r>
-              <a:rPr lang="en-US" dirty="0" smtClean="0"/>
-              <a:t>- Ministrar aulas </a:t>
-            </a:r>
-          </a:p>
-          <a:p>
-            <a:pPr>
-              <a:buNone/>
-            </a:pPr>
-            <a:r>
-              <a:rPr lang="en-US" dirty="0" smtClean="0"/>
-              <a:t>- Acompanhar a aprendizagem individual do aluno</a:t>
-            </a:r>
+              <a:t>Alternativas e Concorrência</a:t>
+            </a:r>
+            <a:endParaRPr lang="pt-BR" dirty="0"/>
+          </a:p>
+        </p:txBody>
+      </p:sp>
+      <p:sp>
+        <p:nvSpPr>
+          <p:cNvPr id="3" name="Espaço Reservado para Conteúdo 2"/>
+          <p:cNvSpPr>
+            <a:spLocks noGrp="1"/>
+          </p:cNvSpPr>
+          <p:nvPr>
+            <p:ph idx="1"/>
+          </p:nvPr>
+        </p:nvSpPr>
+        <p:spPr/>
+        <p:txBody>
+          <a:bodyPr/>
+          <a:lstStyle/>
+          <a:p>
+            <a:pPr algn="just"/>
+            <a:r>
+              <a:rPr lang="pt-BR" dirty="0" smtClean="0"/>
+              <a:t>As alternativas disponíveis para os envolvidos hoje estão em crescente evolução, há programas gratuitos para escolas pequenas e ainda programas de baixo custo para escolas maiores</a:t>
+            </a:r>
+            <a:r>
+              <a:rPr lang="pt-BR" dirty="0" smtClean="0"/>
+              <a:t>.</a:t>
+            </a:r>
+          </a:p>
+          <a:p>
+            <a:pPr algn="just"/>
+            <a:r>
+              <a:rPr lang="pt-BR" dirty="0" smtClean="0"/>
+              <a:t>As opções no mercado são inúmeras e requerem uma pesquisa apurada, comparando o que a escola necessita e o que os sistemas oferecem.</a:t>
+            </a:r>
+            <a:endParaRPr lang="pt-BR" dirty="0"/>
+          </a:p>
+        </p:txBody>
+      </p:sp>
+      <p:sp>
+        <p:nvSpPr>
+          <p:cNvPr id="4" name="Espaço Reservado para Data 3"/>
+          <p:cNvSpPr>
+            <a:spLocks noGrp="1"/>
+          </p:cNvSpPr>
+          <p:nvPr>
+            <p:ph type="dt" sz="half" idx="10"/>
+          </p:nvPr>
+        </p:nvSpPr>
+        <p:spPr/>
+        <p:txBody>
+          <a:bodyPr/>
+          <a:lstStyle/>
+          <a:p>
+            <a:r>
+              <a:rPr lang="pt-BR" dirty="0" smtClean="0"/>
+              <a:t>29/09/2014</a:t>
+            </a:r>
+            <a:endParaRPr lang="pt-BR" dirty="0"/>
+          </a:p>
+        </p:txBody>
+      </p:sp>
+      <p:sp>
+        <p:nvSpPr>
+          <p:cNvPr id="5" name="Espaço Reservado para Rodapé 4"/>
+          <p:cNvSpPr>
+            <a:spLocks noGrp="1"/>
+          </p:cNvSpPr>
+          <p:nvPr>
+            <p:ph type="ftr" sz="quarter" idx="11"/>
+          </p:nvPr>
+        </p:nvSpPr>
+        <p:spPr/>
+        <p:txBody>
+          <a:bodyPr/>
+          <a:lstStyle/>
+          <a:p>
+            <a:r>
+              <a:rPr lang="pt-BR" dirty="0" smtClean="0"/>
+              <a:t>Faculdade Metrocamp</a:t>
+            </a:r>
+          </a:p>
+          <a:p>
+            <a:r>
+              <a:rPr lang="pt-BR" dirty="0" smtClean="0"/>
+              <a:t>TCM/4ADS</a:t>
+            </a:r>
+          </a:p>
+          <a:p>
             <a:endParaRPr lang="pt-BR" dirty="0" smtClean="0"/>
           </a:p>
           <a:p>
-            <a:pPr>
-              <a:buNone/>
-            </a:pPr>
-            <a:r>
-              <a:rPr lang="pt-BR" dirty="0" smtClean="0"/>
-              <a:t>- Registra notas, faltas, ocorrências e atividades curriculares como tarefa, trabalho e avaliação.</a:t>
-            </a:r>
-            <a:endParaRPr lang="pt-BR" dirty="0"/>
-          </a:p>
-        </p:txBody>
-      </p:sp>
-      <p:sp>
-        <p:nvSpPr>
-          <p:cNvPr id="6" name="Espaço Reservado para Data 5"/>
-          <p:cNvSpPr>
-            <a:spLocks noGrp="1"/>
-          </p:cNvSpPr>
-          <p:nvPr>
-            <p:ph type="dt" sz="half" idx="10"/>
-          </p:nvPr>
-        </p:nvSpPr>
-        <p:spPr/>
-        <p:txBody>
-          <a:bodyPr/>
-          <a:lstStyle/>
-          <a:p>
-            <a:r>
-              <a:rPr lang="pt-BR" dirty="0" smtClean="0"/>
-              <a:t>29/09/2014</a:t>
-            </a:r>
-            <a:endParaRPr lang="pt-BR" dirty="0"/>
-          </a:p>
-        </p:txBody>
-      </p:sp>
-      <p:sp>
-        <p:nvSpPr>
-          <p:cNvPr id="7" name="Espaço Reservado para Número de Slide 6"/>
+            <a:endParaRPr lang="pt-BR" dirty="0"/>
+          </a:p>
+        </p:txBody>
+      </p:sp>
+      <p:sp>
+        <p:nvSpPr>
+          <p:cNvPr id="6" name="Espaço Reservado para Número de Slide 5"/>
           <p:cNvSpPr>
             <a:spLocks noGrp="1"/>
           </p:cNvSpPr>
@@ -6515,37 +7028,6 @@
               <a:pPr/>
               <a:t>5</a:t>
             </a:fld>
-            <a:endParaRPr lang="pt-BR" dirty="0"/>
-          </a:p>
-        </p:txBody>
-      </p:sp>
-      <p:sp>
-        <p:nvSpPr>
-          <p:cNvPr id="8" name="Espaço Reservado para Rodapé 7"/>
-          <p:cNvSpPr>
-            <a:spLocks noGrp="1"/>
-          </p:cNvSpPr>
-          <p:nvPr>
-            <p:ph type="ftr" sz="quarter" idx="11"/>
-          </p:nvPr>
-        </p:nvSpPr>
-        <p:spPr/>
-        <p:txBody>
-          <a:bodyPr/>
-          <a:lstStyle/>
-          <a:p>
-            <a:r>
-              <a:rPr lang="pt-BR" dirty="0" smtClean="0"/>
-              <a:t>Faculdade Metrocamp</a:t>
-            </a:r>
-          </a:p>
-          <a:p>
-            <a:r>
-              <a:rPr lang="pt-BR" dirty="0" smtClean="0"/>
-              <a:t>TCM/4ADS</a:t>
-            </a:r>
-          </a:p>
-          <a:p>
             <a:endParaRPr lang="pt-BR" dirty="0"/>
           </a:p>
         </p:txBody>
@@ -6555,9 +7037,6 @@
   <p:clrMapOvr>
     <a:masterClrMapping/>
   </p:clrMapOvr>
-  <p:transition spd="med">
-    <p:fade/>
-  </p:transition>
   <p:timing>
     <p:tnLst>
       <p:par>
@@ -6630,7 +7109,7 @@
           <a:p>
             <a:r>
               <a:rPr lang="pt-BR" dirty="0" smtClean="0"/>
-              <a:t>Pais e/ou responsáveis</a:t>
+              <a:t> Gestores</a:t>
             </a:r>
           </a:p>
           <a:p>
@@ -6644,24 +7123,26 @@
               <a:buNone/>
             </a:pPr>
             <a:r>
-              <a:rPr lang="pt-BR" sz="2400" dirty="0" smtClean="0"/>
-              <a:t>  São os coadjuvantes no processo de aprendizado, fora da escola. Utilizam o sistema para acompanhar o processo escolar e comportamento dos alunos, seus filhos/responsáveis</a:t>
-            </a:r>
-          </a:p>
-          <a:p>
-            <a:pPr algn="ctr">
-              <a:buNone/>
-            </a:pPr>
-            <a:endParaRPr lang="pt-BR" sz="1800" dirty="0" smtClean="0"/>
+              <a:rPr lang="pt-BR" dirty="0" smtClean="0"/>
+              <a:t>   São os diretores, vice-diretores, e   coordenadores pedagógicos.</a:t>
+            </a:r>
           </a:p>
           <a:p>
             <a:pPr>
               <a:buNone/>
             </a:pPr>
-            <a:r>
-              <a:rPr lang="pt-BR" dirty="0" smtClean="0"/>
-              <a:t>- Verificar: notas, frequência, ocorrências, comunicados e convites e notícias da escola.</a:t>
-            </a:r>
+            <a:endParaRPr lang="pt-BR" dirty="0" smtClean="0"/>
+          </a:p>
+          <a:p>
+            <a:pPr>
+              <a:buNone/>
+            </a:pPr>
+            <a:r>
+              <a:rPr lang="pt-BR" dirty="0" smtClean="0"/>
+              <a:t>   Responsáveis por gerir toda infraestrutura da escola, tanto de recursos materiais e humanos, bem com as informações da secretaria, professores e alunos, e atendimento aos pais. </a:t>
+            </a:r>
+          </a:p>
+          <a:p>
             <a:endParaRPr lang="pt-BR" dirty="0"/>
           </a:p>
         </p:txBody>
@@ -6824,22 +7305,26 @@
           <a:p>
             <a:r>
               <a:rPr lang="pt-BR" dirty="0" smtClean="0"/>
-              <a:t>Alunos</a:t>
+              <a:t>Secretaria</a:t>
             </a:r>
           </a:p>
           <a:p>
             <a:pPr>
               <a:buNone/>
             </a:pPr>
-            <a:endParaRPr lang="pt-BR" sz="1800" dirty="0" smtClean="0"/>
+            <a:endParaRPr lang="pt-BR" sz="1100" dirty="0" smtClean="0"/>
           </a:p>
           <a:p>
             <a:pPr algn="ctr">
               <a:buNone/>
             </a:pPr>
             <a:r>
+              <a:rPr lang="pt-BR" dirty="0" smtClean="0"/>
+              <a:t>  </a:t>
+            </a:r>
+            <a:r>
               <a:rPr lang="pt-BR" sz="2400" dirty="0" smtClean="0"/>
-              <a:t> São a fonte que produzem os dados a serem administrados pelo sistema. O sistema é criado em função de sua existência. </a:t>
+              <a:t>Os secretários e agentes escolares atendem a toda comunidade escolar para receber e entregar informações e documentações. </a:t>
             </a:r>
           </a:p>
           <a:p>
@@ -6854,7 +7339,7 @@
             </a:pPr>
             <a:r>
               <a:rPr lang="pt-BR" dirty="0" smtClean="0"/>
-              <a:t>-  Acompanhar e verificar suas notas e frequência.</a:t>
+              <a:t>    - Organiza e arquiva informações de documentos escolares de alunos e professores.</a:t>
             </a:r>
           </a:p>
           <a:p>
@@ -6862,15 +7347,20 @@
               <a:buNone/>
             </a:pPr>
             <a:r>
-              <a:rPr lang="en-US" dirty="0" smtClean="0"/>
-              <a:t>- Verificar as atividades a serem realizadas fora da escola, como tarefas, seminários, trabalhos.</a:t>
-            </a:r>
-            <a:endParaRPr lang="pt-BR" dirty="0" smtClean="0"/>
+              <a:rPr lang="pt-BR" dirty="0" smtClean="0"/>
+              <a:t>   - Organiza a infraestrutura, recursos materiais e humanos.</a:t>
+            </a:r>
           </a:p>
           <a:p>
             <a:pPr>
               <a:buNone/>
             </a:pPr>
+            <a:r>
+              <a:rPr lang="pt-BR" dirty="0" smtClean="0"/>
+              <a:t>   - Atende pais e comunidade </a:t>
+            </a:r>
+          </a:p>
+          <a:p>
             <a:endParaRPr lang="pt-BR" dirty="0"/>
           </a:p>
         </p:txBody>
@@ -6990,7 +7480,7 @@
       </p:grpSpPr>
       <p:sp>
         <p:nvSpPr>
-          <p:cNvPr id="19458" name="Rectangle 2"/>
+          <p:cNvPr id="18434" name="Rectangle 2"/>
           <p:cNvSpPr>
             <a:spLocks noGrp="1" noChangeArrowheads="1"/>
           </p:cNvSpPr>
@@ -7005,15 +7495,15 @@
           <a:p>
             <a:r>
               <a:rPr lang="pt-BR" dirty="0" smtClean="0"/>
-              <a:t>Diagrama Caso Uso</a:t>
-            </a:r>
-            <a:endParaRPr lang="pt-BR" dirty="0"/>
-          </a:p>
-        </p:txBody>
-      </p:sp>
-      <p:sp>
-        <p:nvSpPr>
-          <p:cNvPr id="19459" name="Rectangle 3"/>
+              <a:t>Usuários </a:t>
+            </a:r>
+            <a:endParaRPr lang="pt-BR" dirty="0"/>
+          </a:p>
+        </p:txBody>
+      </p:sp>
+      <p:sp>
+        <p:nvSpPr>
+          <p:cNvPr id="18435" name="Rectangle 3"/>
           <p:cNvSpPr>
             <a:spLocks noGrp="1" noChangeArrowheads="1"/>
           </p:cNvSpPr>
@@ -7021,14 +7511,77 @@
             <p:ph type="body" idx="1"/>
           </p:nvPr>
         </p:nvSpPr>
-        <p:spPr/>
-        <p:txBody>
-          <a:bodyPr/>
-          <a:lstStyle/>
-          <a:p>
+        <p:spPr>
+          <a:xfrm>
+            <a:off x="539552" y="1556792"/>
+            <a:ext cx="8229600" cy="4530725"/>
+          </a:xfrm>
+        </p:spPr>
+        <p:txBody>
+          <a:bodyPr/>
+          <a:lstStyle/>
+          <a:p>
+            <a:r>
+              <a:rPr lang="pt-BR" dirty="0" smtClean="0"/>
+              <a:t>Professores</a:t>
+            </a:r>
+          </a:p>
+          <a:p>
+            <a:pPr>
+              <a:buNone/>
+            </a:pPr>
+            <a:endParaRPr lang="pt-BR" sz="1800" dirty="0" smtClean="0"/>
+          </a:p>
+          <a:p>
+            <a:pPr algn="ctr">
+              <a:buNone/>
+            </a:pPr>
+            <a:r>
+              <a:rPr lang="pt-BR" sz="2400" dirty="0" smtClean="0"/>
+              <a:t>  Profissionais com formação na área da educação, com documentação adequada para atuação em sala de aula.</a:t>
+            </a:r>
+          </a:p>
+          <a:p>
+            <a:pPr algn="ctr">
+              <a:buNone/>
+            </a:pPr>
+            <a:endParaRPr lang="pt-BR" sz="1800" dirty="0" smtClean="0"/>
+          </a:p>
+          <a:p>
+            <a:pPr>
+              <a:buNone/>
+            </a:pPr>
+            <a:r>
+              <a:rPr lang="pt-BR" dirty="0" smtClean="0"/>
+              <a:t>- Organizar e planejar o conteúdo curricular.</a:t>
+            </a:r>
+          </a:p>
+          <a:p>
+            <a:pPr>
+              <a:buNone/>
+            </a:pPr>
             <a:r>
               <a:rPr lang="en-US" dirty="0" smtClean="0"/>
-              <a:t>ALUNO</a:t>
+              <a:t>- Ministrar aulas </a:t>
+            </a:r>
+          </a:p>
+          <a:p>
+            <a:pPr>
+              <a:buNone/>
+            </a:pPr>
+            <a:r>
+              <a:rPr lang="en-US" dirty="0" smtClean="0"/>
+              <a:t>- Acompanhar a aprendizagem individual do aluno</a:t>
+            </a:r>
+            <a:endParaRPr lang="pt-BR" dirty="0" smtClean="0"/>
+          </a:p>
+          <a:p>
+            <a:pPr>
+              <a:buNone/>
+            </a:pPr>
+            <a:r>
+              <a:rPr lang="pt-BR" dirty="0" smtClean="0"/>
+              <a:t>- Registra notas, faltas, ocorrências e atividades curriculares como tarefa, trabalho e avaliação.</a:t>
             </a:r>
             <a:endParaRPr lang="pt-BR" dirty="0"/>
           </a:p>
@@ -7112,34 +7665,6 @@
           </a:p>
         </p:txBody>
       </p:sp>
-      <p:pic>
-        <p:nvPicPr>
-          <p:cNvPr id="9" name="Imagem 8"/>
-          <p:cNvPicPr/>
-          <p:nvPr/>
-        </p:nvPicPr>
-        <p:blipFill>
-          <a:blip r:embed="rId2" cstate="print">
-            <a:extLst>
-              <a:ext uri="{28A0092B-C50C-407E-A947-70E740481C1C}">
-                <a14:useLocalDpi xmlns:ve="http://schemas.openxmlformats.org/markup-compatibility/2006" xmlns:m="http://schemas.openxmlformats.org/officeDocument/2006/math" xmlns:wp="http://schemas.openxmlformats.org/drawingml/2006/wordprocessingDrawing" xmlns:wne="http://schemas.microsoft.com/office/word/2006/wordml" xmlns="" xmlns:wpc="http://schemas.microsoft.com/office/word/2010/wordprocessingCanvas" xmlns:mc="http://schemas.openxmlformats.org/markup-compatibility/2006" xmlns:o="urn:schemas-microsoft-com:office:office" xmlns:v="urn:schemas-microsoft-com:vml" xmlns:wp14="http://schemas.microsoft.com/office/word/2010/wordprocessingDrawing" xmlns:w10="urn:schemas-microsoft-com:office:word" xmlns:w="http://schemas.openxmlformats.org/wordprocessingml/2006/main" xmlns:w14="http://schemas.microsoft.com/office/word/2010/wordml" xmlns:w15="http://schemas.microsoft.com/office/word/2012/wordml" xmlns:wpg="http://schemas.microsoft.com/office/word/2010/wordprocessingGroup" xmlns:wpi="http://schemas.microsoft.com/office/word/2010/wordprocessingInk" xmlns:wps="http://schemas.microsoft.com/office/word/2010/wordprocessingShape" xmlns:a14="http://schemas.microsoft.com/office/drawing/2010/main" xmlns:pic="http://schemas.openxmlformats.org/drawingml/2006/picture" xmlns:lc="http://schemas.openxmlformats.org/drawingml/2006/lockedCanvas" val="0"/>
-              </a:ext>
-            </a:extLst>
-          </a:blip>
-          <a:stretch>
-            <a:fillRect/>
-          </a:stretch>
-        </p:blipFill>
-        <p:spPr>
-          <a:xfrm>
-            <a:off x="2555776" y="1628800"/>
-            <a:ext cx="5832648" cy="4606037"/>
-          </a:xfrm>
-          <a:prstGeom prst="rect">
-            <a:avLst/>
-          </a:prstGeom>
-        </p:spPr>
-      </p:pic>
     </p:spTree>
   </p:cSld>
   <p:clrMapOvr>
@@ -7177,7 +7702,7 @@
       </p:grpSpPr>
       <p:sp>
         <p:nvSpPr>
-          <p:cNvPr id="19458" name="Rectangle 2"/>
+          <p:cNvPr id="18434" name="Rectangle 2"/>
           <p:cNvSpPr>
             <a:spLocks noGrp="1" noChangeArrowheads="1"/>
           </p:cNvSpPr>
@@ -7192,15 +7717,15 @@
           <a:p>
             <a:r>
               <a:rPr lang="pt-BR" dirty="0" smtClean="0"/>
-              <a:t>Diagrama Caso Uso</a:t>
-            </a:r>
-            <a:endParaRPr lang="pt-BR" dirty="0"/>
-          </a:p>
-        </p:txBody>
-      </p:sp>
-      <p:sp>
-        <p:nvSpPr>
-          <p:cNvPr id="19459" name="Rectangle 3"/>
+              <a:t>Usuários </a:t>
+            </a:r>
+            <a:endParaRPr lang="pt-BR" dirty="0"/>
+          </a:p>
+        </p:txBody>
+      </p:sp>
+      <p:sp>
+        <p:nvSpPr>
+          <p:cNvPr id="18435" name="Rectangle 3"/>
           <p:cNvSpPr>
             <a:spLocks noGrp="1" noChangeArrowheads="1"/>
           </p:cNvSpPr>
@@ -7208,14 +7733,49 @@
             <p:ph type="body" idx="1"/>
           </p:nvPr>
         </p:nvSpPr>
-        <p:spPr/>
-        <p:txBody>
-          <a:bodyPr/>
-          <a:lstStyle/>
-          <a:p>
-            <a:r>
-              <a:rPr lang="en-US" dirty="0" smtClean="0"/>
-              <a:t>Gestor</a:t>
+        <p:spPr>
+          <a:xfrm>
+            <a:off x="539552" y="1556792"/>
+            <a:ext cx="8229600" cy="4530725"/>
+          </a:xfrm>
+        </p:spPr>
+        <p:txBody>
+          <a:bodyPr/>
+          <a:lstStyle/>
+          <a:p>
+            <a:r>
+              <a:rPr lang="pt-BR" dirty="0" smtClean="0"/>
+              <a:t>Pais e/ou responsáveis</a:t>
+            </a:r>
+          </a:p>
+          <a:p>
+            <a:pPr>
+              <a:buNone/>
+            </a:pPr>
+            <a:endParaRPr lang="pt-BR" sz="1800" dirty="0" smtClean="0"/>
+          </a:p>
+          <a:p>
+            <a:pPr algn="ctr">
+              <a:buNone/>
+            </a:pPr>
+            <a:r>
+              <a:rPr lang="pt-BR" sz="2400" dirty="0" smtClean="0"/>
+              <a:t>  São os coadjuvantes no processo de aprendizado, fora da escola. Utilizam o sistema para acompanhar o processo escolar e comportamento dos alunos, seus filhos/responsáveis</a:t>
+            </a:r>
+          </a:p>
+          <a:p>
+            <a:pPr algn="ctr">
+              <a:buNone/>
+            </a:pPr>
+            <a:endParaRPr lang="pt-BR" sz="1800" dirty="0" smtClean="0"/>
+          </a:p>
+          <a:p>
+            <a:pPr>
+              <a:buNone/>
+            </a:pPr>
+            <a:r>
+              <a:rPr lang="pt-BR" dirty="0" smtClean="0"/>
+              <a:t>- Verificar: notas, frequência, ocorrências, comunicados e convites e notícias da escola.</a:t>
             </a:r>
             <a:endParaRPr lang="pt-BR" dirty="0"/>
           </a:p>
@@ -7295,46 +7855,10 @@
             </a:r>
           </a:p>
           <a:p>
-            <a:endParaRPr lang="pt-BR" dirty="0" smtClean="0"/>
-          </a:p>
-          <a:p>
-            <a:endParaRPr lang="pt-BR" dirty="0"/>
-          </a:p>
-        </p:txBody>
-      </p:sp>
-      <p:pic>
-        <p:nvPicPr>
-          <p:cNvPr id="1028" name="Picture 4"/>
-          <p:cNvPicPr>
-            <a:picLocks noChangeAspect="1" noChangeArrowheads="1"/>
-          </p:cNvPicPr>
-          <p:nvPr/>
-        </p:nvPicPr>
-        <p:blipFill>
-          <a:blip r:embed="rId2"/>
-          <a:srcRect/>
-          <a:stretch>
-            <a:fillRect/>
-          </a:stretch>
-        </p:blipFill>
-        <p:spPr bwMode="auto">
-          <a:xfrm>
-            <a:off x="2928926" y="1500174"/>
-            <a:ext cx="4200525" cy="4800600"/>
-          </a:xfrm>
-          <a:prstGeom prst="rect">
-            <a:avLst/>
-          </a:prstGeom>
-          <a:noFill/>
-          <a:ln w="9525">
-            <a:noFill/>
-            <a:miter lim="800000"/>
-            <a:headEnd/>
-            <a:tailEnd/>
-          </a:ln>
-          <a:effectLst/>
-        </p:spPr>
-      </p:pic>
+            <a:endParaRPr lang="pt-BR" dirty="0"/>
+          </a:p>
+        </p:txBody>
+      </p:sp>
     </p:spTree>
   </p:cSld>
   <p:clrMapOvr>

</xml_diff>